<commit_message>
small arrangement change to ACE2 figure
</commit_message>
<xml_diff>
--- a/figures/ACE2_figure2.pptx
+++ b/figures/ACE2_figure2.pptx
@@ -3337,42 +3337,12 @@
           <a:chExt cx="0" cy="0"/>
         </a:xfrm>
       </p:grpSpPr>
-      <p:pic>
-        <p:nvPicPr>
-          <p:cNvPr id="3" name="Picture 2" descr="A close up of a logo&#10;&#10;Description automatically generated">
-            <a:extLst>
-              <a:ext uri="{FF2B5EF4-FFF2-40B4-BE49-F238E27FC236}">
-                <a16:creationId xmlns:a16="http://schemas.microsoft.com/office/drawing/2014/main" id="{9DB29891-2710-E040-86A8-BDEE5243C8A6}"/>
-              </a:ext>
-            </a:extLst>
-          </p:cNvPr>
-          <p:cNvPicPr>
-            <a:picLocks noChangeAspect="1"/>
-          </p:cNvPicPr>
-          <p:nvPr/>
-        </p:nvPicPr>
-        <p:blipFill>
-          <a:blip r:embed="rId2"/>
-          <a:stretch>
-            <a:fillRect/>
-          </a:stretch>
-        </p:blipFill>
-        <p:spPr>
-          <a:xfrm>
-            <a:off x="-82825" y="351166"/>
-            <a:ext cx="3768239" cy="3686543"/>
-          </a:xfrm>
-          <a:prstGeom prst="rect">
-            <a:avLst/>
-          </a:prstGeom>
-        </p:spPr>
-      </p:pic>
       <p:grpSp>
         <p:nvGrpSpPr>
-          <p:cNvPr id="32" name="Group 31">
-            <a:extLst>
-              <a:ext uri="{FF2B5EF4-FFF2-40B4-BE49-F238E27FC236}">
-                <a16:creationId xmlns:a16="http://schemas.microsoft.com/office/drawing/2014/main" id="{73AF3747-2FEE-0E46-A41F-691F3B157DC0}"/>
+          <p:cNvPr id="43" name="Group 42">
+            <a:extLst>
+              <a:ext uri="{FF2B5EF4-FFF2-40B4-BE49-F238E27FC236}">
+                <a16:creationId xmlns:a16="http://schemas.microsoft.com/office/drawing/2014/main" id="{0050209A-F953-A142-8C34-2E3B1ABCB358}"/>
               </a:ext>
             </a:extLst>
           </p:cNvPr>
@@ -3381,18 +3351,48 @@
         </p:nvGrpSpPr>
         <p:grpSpPr>
           <a:xfrm>
-            <a:off x="8201" y="1167613"/>
-            <a:ext cx="2998248" cy="2850546"/>
-            <a:chOff x="504451" y="1664713"/>
-            <a:chExt cx="4071912" cy="3945797"/>
+            <a:off x="-82825" y="223239"/>
+            <a:ext cx="9436369" cy="3814470"/>
+            <a:chOff x="-82825" y="223239"/>
+            <a:chExt cx="9436369" cy="3814470"/>
           </a:xfrm>
         </p:grpSpPr>
+        <p:pic>
+          <p:nvPicPr>
+            <p:cNvPr id="3" name="Picture 2" descr="A close up of a logo&#10;&#10;Description automatically generated">
+              <a:extLst>
+                <a:ext uri="{FF2B5EF4-FFF2-40B4-BE49-F238E27FC236}">
+                  <a16:creationId xmlns:a16="http://schemas.microsoft.com/office/drawing/2014/main" id="{9DB29891-2710-E040-86A8-BDEE5243C8A6}"/>
+                </a:ext>
+              </a:extLst>
+            </p:cNvPr>
+            <p:cNvPicPr>
+              <a:picLocks noChangeAspect="1"/>
+            </p:cNvPicPr>
+            <p:nvPr/>
+          </p:nvPicPr>
+          <p:blipFill>
+            <a:blip r:embed="rId2"/>
+            <a:stretch>
+              <a:fillRect/>
+            </a:stretch>
+          </p:blipFill>
+          <p:spPr>
+            <a:xfrm>
+              <a:off x="-82825" y="351166"/>
+              <a:ext cx="3768239" cy="3686543"/>
+            </a:xfrm>
+            <a:prstGeom prst="rect">
+              <a:avLst/>
+            </a:prstGeom>
+          </p:spPr>
+        </p:pic>
         <p:grpSp>
           <p:nvGrpSpPr>
-            <p:cNvPr id="16" name="Group 15">
+            <p:cNvPr id="32" name="Group 31">
               <a:extLst>
                 <a:ext uri="{FF2B5EF4-FFF2-40B4-BE49-F238E27FC236}">
-                  <a16:creationId xmlns:a16="http://schemas.microsoft.com/office/drawing/2014/main" id="{A466165F-47D3-1B4D-A913-B9BF30F80048}"/>
+                  <a16:creationId xmlns:a16="http://schemas.microsoft.com/office/drawing/2014/main" id="{73AF3747-2FEE-0E46-A41F-691F3B157DC0}"/>
                 </a:ext>
               </a:extLst>
             </p:cNvPr>
@@ -3401,721 +3401,742 @@
           </p:nvGrpSpPr>
           <p:grpSpPr>
             <a:xfrm>
-              <a:off x="3146148" y="3086072"/>
-              <a:ext cx="1430215" cy="933558"/>
-              <a:chOff x="2231746" y="5348626"/>
-              <a:chExt cx="1430215" cy="933558"/>
+              <a:off x="8201" y="1167613"/>
+              <a:ext cx="2998248" cy="2850546"/>
+              <a:chOff x="504451" y="1664713"/>
+              <a:chExt cx="4071912" cy="3945797"/>
             </a:xfrm>
           </p:grpSpPr>
-          <p:sp>
-            <p:nvSpPr>
-              <p:cNvPr id="15" name="Rectangle 14">
+          <p:grpSp>
+            <p:nvGrpSpPr>
+              <p:cNvPr id="16" name="Group 15">
                 <a:extLst>
                   <a:ext uri="{FF2B5EF4-FFF2-40B4-BE49-F238E27FC236}">
-                    <a16:creationId xmlns:a16="http://schemas.microsoft.com/office/drawing/2014/main" id="{8571AE90-5EAF-E94F-BEE6-2D64BD8B5DB7}"/>
+                    <a16:creationId xmlns:a16="http://schemas.microsoft.com/office/drawing/2014/main" id="{A466165F-47D3-1B4D-A913-B9BF30F80048}"/>
                   </a:ext>
                 </a:extLst>
               </p:cNvPr>
-              <p:cNvSpPr/>
+              <p:cNvGrpSpPr/>
               <p:nvPr/>
-            </p:nvSpPr>
-            <p:spPr>
+            </p:nvGrpSpPr>
+            <p:grpSpPr>
               <a:xfrm>
-                <a:off x="2231746" y="5348626"/>
-                <a:ext cx="1430215" cy="474785"/>
+                <a:off x="3146148" y="3086072"/>
+                <a:ext cx="1430215" cy="933558"/>
+                <a:chOff x="2231746" y="5348626"/>
+                <a:chExt cx="1430215" cy="933558"/>
               </a:xfrm>
-              <a:prstGeom prst="rect">
-                <a:avLst/>
-              </a:prstGeom>
-              <a:solidFill>
-                <a:schemeClr val="bg1"/>
-              </a:solidFill>
-              <a:ln>
-                <a:noFill/>
-              </a:ln>
-            </p:spPr>
-            <p:style>
-              <a:lnRef idx="2">
-                <a:schemeClr val="accent1">
-                  <a:shade val="50000"/>
-                </a:schemeClr>
-              </a:lnRef>
-              <a:fillRef idx="1">
-                <a:schemeClr val="accent1"/>
-              </a:fillRef>
-              <a:effectRef idx="0">
-                <a:schemeClr val="accent1"/>
-              </a:effectRef>
-              <a:fontRef idx="minor">
-                <a:schemeClr val="lt1"/>
-              </a:fontRef>
-            </p:style>
-            <p:txBody>
-              <a:bodyPr rot="0" spcFirstLastPara="0" vertOverflow="overflow" horzOverflow="overflow" vert="horz" wrap="square" lIns="91440" tIns="45720" rIns="91440" bIns="45720" numCol="1" spcCol="0" rtlCol="0" fromWordArt="0" anchor="ctr" anchorCtr="0" forceAA="0" compatLnSpc="1">
-                <a:prstTxWarp prst="textNoShape">
+            </p:grpSpPr>
+            <p:sp>
+              <p:nvSpPr>
+                <p:cNvPr id="15" name="Rectangle 14">
+                  <a:extLst>
+                    <a:ext uri="{FF2B5EF4-FFF2-40B4-BE49-F238E27FC236}">
+                      <a16:creationId xmlns:a16="http://schemas.microsoft.com/office/drawing/2014/main" id="{8571AE90-5EAF-E94F-BEE6-2D64BD8B5DB7}"/>
+                    </a:ext>
+                  </a:extLst>
+                </p:cNvPr>
+                <p:cNvSpPr/>
+                <p:nvPr/>
+              </p:nvSpPr>
+              <p:spPr>
+                <a:xfrm>
+                  <a:off x="2231746" y="5348626"/>
+                  <a:ext cx="1430215" cy="474785"/>
+                </a:xfrm>
+                <a:prstGeom prst="rect">
                   <a:avLst/>
-                </a:prstTxWarp>
-                <a:noAutofit/>
-              </a:bodyPr>
-              <a:lstStyle/>
-              <a:p>
-                <a:pPr algn="ctr"/>
-                <a:endParaRPr lang="en-US"/>
-              </a:p>
-            </p:txBody>
-          </p:sp>
-          <p:sp>
-            <p:nvSpPr>
-              <p:cNvPr id="14" name="TextBox 13">
+                </a:prstGeom>
+                <a:solidFill>
+                  <a:schemeClr val="bg1"/>
+                </a:solidFill>
+                <a:ln>
+                  <a:noFill/>
+                </a:ln>
+              </p:spPr>
+              <p:style>
+                <a:lnRef idx="2">
+                  <a:schemeClr val="accent1">
+                    <a:shade val="50000"/>
+                  </a:schemeClr>
+                </a:lnRef>
+                <a:fillRef idx="1">
+                  <a:schemeClr val="accent1"/>
+                </a:fillRef>
+                <a:effectRef idx="0">
+                  <a:schemeClr val="accent1"/>
+                </a:effectRef>
+                <a:fontRef idx="minor">
+                  <a:schemeClr val="lt1"/>
+                </a:fontRef>
+              </p:style>
+              <p:txBody>
+                <a:bodyPr rot="0" spcFirstLastPara="0" vertOverflow="overflow" horzOverflow="overflow" vert="horz" wrap="square" lIns="91440" tIns="45720" rIns="91440" bIns="45720" numCol="1" spcCol="0" rtlCol="0" fromWordArt="0" anchor="ctr" anchorCtr="0" forceAA="0" compatLnSpc="1">
+                  <a:prstTxWarp prst="textNoShape">
+                    <a:avLst/>
+                  </a:prstTxWarp>
+                  <a:noAutofit/>
+                </a:bodyPr>
+                <a:lstStyle/>
+                <a:p>
+                  <a:pPr algn="ctr"/>
+                  <a:endParaRPr lang="en-US"/>
+                </a:p>
+              </p:txBody>
+            </p:sp>
+            <p:sp>
+              <p:nvSpPr>
+                <p:cNvPr id="14" name="TextBox 13">
+                  <a:extLst>
+                    <a:ext uri="{FF2B5EF4-FFF2-40B4-BE49-F238E27FC236}">
+                      <a16:creationId xmlns:a16="http://schemas.microsoft.com/office/drawing/2014/main" id="{5BC300F2-E2A2-E74C-9E4E-EBE52316215F}"/>
+                    </a:ext>
+                  </a:extLst>
+                </p:cNvPr>
+                <p:cNvSpPr txBox="1"/>
+                <p:nvPr/>
+              </p:nvSpPr>
+              <p:spPr>
+                <a:xfrm>
+                  <a:off x="2591575" y="5770945"/>
+                  <a:ext cx="1030172" cy="511239"/>
+                </a:xfrm>
+                <a:prstGeom prst="rect">
+                  <a:avLst/>
+                </a:prstGeom>
+                <a:solidFill>
+                  <a:schemeClr val="bg1"/>
+                </a:solidFill>
+              </p:spPr>
+              <p:txBody>
+                <a:bodyPr wrap="none" rtlCol="0">
+                  <a:spAutoFit/>
+                </a:bodyPr>
+                <a:lstStyle/>
+                <a:p>
+                  <a:r>
+                    <a:rPr lang="en-US" dirty="0"/>
+                    <a:t>85.9%</a:t>
+                  </a:r>
+                </a:p>
+              </p:txBody>
+            </p:sp>
+          </p:grpSp>
+          <p:grpSp>
+            <p:nvGrpSpPr>
+              <p:cNvPr id="17" name="Group 16">
                 <a:extLst>
                   <a:ext uri="{FF2B5EF4-FFF2-40B4-BE49-F238E27FC236}">
-                    <a16:creationId xmlns:a16="http://schemas.microsoft.com/office/drawing/2014/main" id="{5BC300F2-E2A2-E74C-9E4E-EBE52316215F}"/>
+                    <a16:creationId xmlns:a16="http://schemas.microsoft.com/office/drawing/2014/main" id="{95D22B9C-3935-904E-96C9-E5CDE9BA38FC}"/>
                   </a:ext>
                 </a:extLst>
               </p:cNvPr>
-              <p:cNvSpPr txBox="1"/>
+              <p:cNvGrpSpPr/>
               <p:nvPr/>
-            </p:nvSpPr>
-            <p:spPr>
+            </p:nvGrpSpPr>
+            <p:grpSpPr>
               <a:xfrm>
-                <a:off x="2591575" y="5770945"/>
-                <a:ext cx="1030172" cy="511239"/>
+                <a:off x="2117023" y="5044456"/>
+                <a:ext cx="2405828" cy="566054"/>
+                <a:chOff x="2080426" y="5480866"/>
+                <a:chExt cx="2405828" cy="566054"/>
               </a:xfrm>
-              <a:prstGeom prst="rect">
-                <a:avLst/>
-              </a:prstGeom>
-              <a:solidFill>
-                <a:schemeClr val="bg1"/>
-              </a:solidFill>
-            </p:spPr>
-            <p:txBody>
-              <a:bodyPr wrap="none" rtlCol="0">
-                <a:spAutoFit/>
-              </a:bodyPr>
-              <a:lstStyle/>
-              <a:p>
-                <a:r>
-                  <a:rPr lang="en-US" dirty="0"/>
-                  <a:t>85.9%</a:t>
-                </a:r>
-              </a:p>
-            </p:txBody>
-          </p:sp>
+            </p:grpSpPr>
+            <p:sp>
+              <p:nvSpPr>
+                <p:cNvPr id="18" name="Rectangle 17">
+                  <a:extLst>
+                    <a:ext uri="{FF2B5EF4-FFF2-40B4-BE49-F238E27FC236}">
+                      <a16:creationId xmlns:a16="http://schemas.microsoft.com/office/drawing/2014/main" id="{E4129BC9-D03F-4F43-BDFA-2BEC2E992274}"/>
+                    </a:ext>
+                  </a:extLst>
+                </p:cNvPr>
+                <p:cNvSpPr/>
+                <p:nvPr/>
+              </p:nvSpPr>
+              <p:spPr>
+                <a:xfrm>
+                  <a:off x="2080426" y="5480866"/>
+                  <a:ext cx="1430216" cy="474786"/>
+                </a:xfrm>
+                <a:prstGeom prst="rect">
+                  <a:avLst/>
+                </a:prstGeom>
+                <a:solidFill>
+                  <a:schemeClr val="bg1"/>
+                </a:solidFill>
+                <a:ln>
+                  <a:noFill/>
+                </a:ln>
+              </p:spPr>
+              <p:style>
+                <a:lnRef idx="2">
+                  <a:schemeClr val="accent1">
+                    <a:shade val="50000"/>
+                  </a:schemeClr>
+                </a:lnRef>
+                <a:fillRef idx="1">
+                  <a:schemeClr val="accent1"/>
+                </a:fillRef>
+                <a:effectRef idx="0">
+                  <a:schemeClr val="accent1"/>
+                </a:effectRef>
+                <a:fontRef idx="minor">
+                  <a:schemeClr val="lt1"/>
+                </a:fontRef>
+              </p:style>
+              <p:txBody>
+                <a:bodyPr rot="0" spcFirstLastPara="0" vertOverflow="overflow" horzOverflow="overflow" vert="horz" wrap="square" lIns="91440" tIns="45720" rIns="91440" bIns="45720" numCol="1" spcCol="0" rtlCol="0" fromWordArt="0" anchor="ctr" anchorCtr="0" forceAA="0" compatLnSpc="1">
+                  <a:prstTxWarp prst="textNoShape">
+                    <a:avLst/>
+                  </a:prstTxWarp>
+                  <a:noAutofit/>
+                </a:bodyPr>
+                <a:lstStyle/>
+                <a:p>
+                  <a:pPr algn="ctr"/>
+                  <a:endParaRPr lang="en-US"/>
+                </a:p>
+              </p:txBody>
+            </p:sp>
+            <p:sp>
+              <p:nvSpPr>
+                <p:cNvPr id="19" name="TextBox 18">
+                  <a:extLst>
+                    <a:ext uri="{FF2B5EF4-FFF2-40B4-BE49-F238E27FC236}">
+                      <a16:creationId xmlns:a16="http://schemas.microsoft.com/office/drawing/2014/main" id="{68295819-7C05-B246-9D4A-C3417ECB9F78}"/>
+                    </a:ext>
+                  </a:extLst>
+                </p:cNvPr>
+                <p:cNvSpPr txBox="1"/>
+                <p:nvPr/>
+              </p:nvSpPr>
+              <p:spPr>
+                <a:xfrm>
+                  <a:off x="2441670" y="5535681"/>
+                  <a:ext cx="2044584" cy="511239"/>
+                </a:xfrm>
+                <a:prstGeom prst="rect">
+                  <a:avLst/>
+                </a:prstGeom>
+                <a:solidFill>
+                  <a:schemeClr val="bg1"/>
+                </a:solidFill>
+              </p:spPr>
+              <p:txBody>
+                <a:bodyPr wrap="none" rtlCol="0">
+                  <a:spAutoFit/>
+                </a:bodyPr>
+                <a:lstStyle/>
+                <a:p>
+                  <a:r>
+                    <a:rPr lang="en-US" dirty="0"/>
+                    <a:t>ACE2 (AF488)</a:t>
+                  </a:r>
+                </a:p>
+              </p:txBody>
+            </p:sp>
+          </p:grpSp>
+          <p:grpSp>
+            <p:nvGrpSpPr>
+              <p:cNvPr id="20" name="Group 19">
+                <a:extLst>
+                  <a:ext uri="{FF2B5EF4-FFF2-40B4-BE49-F238E27FC236}">
+                    <a16:creationId xmlns:a16="http://schemas.microsoft.com/office/drawing/2014/main" id="{B584272C-808E-3A47-BF36-32771A31CAE0}"/>
+                  </a:ext>
+                </a:extLst>
+              </p:cNvPr>
+              <p:cNvGrpSpPr/>
+              <p:nvPr/>
+            </p:nvGrpSpPr>
+            <p:grpSpPr>
+              <a:xfrm rot="16200000">
+                <a:off x="-607448" y="2776612"/>
+                <a:ext cx="2842718" cy="618920"/>
+                <a:chOff x="2394444" y="5365537"/>
+                <a:chExt cx="1430215" cy="618920"/>
+              </a:xfrm>
+            </p:grpSpPr>
+            <p:sp>
+              <p:nvSpPr>
+                <p:cNvPr id="21" name="Rectangle 20">
+                  <a:extLst>
+                    <a:ext uri="{FF2B5EF4-FFF2-40B4-BE49-F238E27FC236}">
+                      <a16:creationId xmlns:a16="http://schemas.microsoft.com/office/drawing/2014/main" id="{4A41C815-B779-C046-ABAF-8BE7CA869C79}"/>
+                    </a:ext>
+                  </a:extLst>
+                </p:cNvPr>
+                <p:cNvSpPr/>
+                <p:nvPr/>
+              </p:nvSpPr>
+              <p:spPr>
+                <a:xfrm>
+                  <a:off x="2394444" y="5365537"/>
+                  <a:ext cx="1430215" cy="589815"/>
+                </a:xfrm>
+                <a:prstGeom prst="rect">
+                  <a:avLst/>
+                </a:prstGeom>
+                <a:solidFill>
+                  <a:schemeClr val="bg1"/>
+                </a:solidFill>
+                <a:ln>
+                  <a:noFill/>
+                </a:ln>
+              </p:spPr>
+              <p:style>
+                <a:lnRef idx="2">
+                  <a:schemeClr val="accent1">
+                    <a:shade val="50000"/>
+                  </a:schemeClr>
+                </a:lnRef>
+                <a:fillRef idx="1">
+                  <a:schemeClr val="accent1"/>
+                </a:fillRef>
+                <a:effectRef idx="0">
+                  <a:schemeClr val="accent1"/>
+                </a:effectRef>
+                <a:fontRef idx="minor">
+                  <a:schemeClr val="lt1"/>
+                </a:fontRef>
+              </p:style>
+              <p:txBody>
+                <a:bodyPr rot="0" spcFirstLastPara="0" vertOverflow="overflow" horzOverflow="overflow" vert="horz" wrap="square" lIns="91440" tIns="45720" rIns="91440" bIns="45720" numCol="1" spcCol="0" rtlCol="0" fromWordArt="0" anchor="ctr" anchorCtr="0" forceAA="0" compatLnSpc="1">
+                  <a:prstTxWarp prst="textNoShape">
+                    <a:avLst/>
+                  </a:prstTxWarp>
+                  <a:noAutofit/>
+                </a:bodyPr>
+                <a:lstStyle/>
+                <a:p>
+                  <a:pPr algn="ctr"/>
+                  <a:endParaRPr lang="en-US"/>
+                </a:p>
+              </p:txBody>
+            </p:sp>
+            <p:sp>
+              <p:nvSpPr>
+                <p:cNvPr id="22" name="TextBox 21">
+                  <a:extLst>
+                    <a:ext uri="{FF2B5EF4-FFF2-40B4-BE49-F238E27FC236}">
+                      <a16:creationId xmlns:a16="http://schemas.microsoft.com/office/drawing/2014/main" id="{ED772C2D-2AD8-8748-AB74-F4896D8B7C82}"/>
+                    </a:ext>
+                  </a:extLst>
+                </p:cNvPr>
+                <p:cNvSpPr txBox="1"/>
+                <p:nvPr/>
+              </p:nvSpPr>
+              <p:spPr>
+                <a:xfrm>
+                  <a:off x="2870680" y="5615125"/>
+                  <a:ext cx="777978" cy="369332"/>
+                </a:xfrm>
+                <a:prstGeom prst="rect">
+                  <a:avLst/>
+                </a:prstGeom>
+                <a:solidFill>
+                  <a:schemeClr val="bg1"/>
+                </a:solidFill>
+              </p:spPr>
+              <p:txBody>
+                <a:bodyPr wrap="none" rtlCol="0">
+                  <a:spAutoFit/>
+                </a:bodyPr>
+                <a:lstStyle/>
+                <a:p>
+                  <a:pPr algn="ctr"/>
+                  <a:r>
+                    <a:rPr lang="en-US" dirty="0"/>
+                    <a:t>Relative Count</a:t>
+                  </a:r>
+                </a:p>
+              </p:txBody>
+            </p:sp>
+          </p:grpSp>
         </p:grpSp>
-        <p:grpSp>
-          <p:nvGrpSpPr>
-            <p:cNvPr id="17" name="Group 16">
+        <p:sp>
+          <p:nvSpPr>
+            <p:cNvPr id="24" name="TextBox 23">
               <a:extLst>
                 <a:ext uri="{FF2B5EF4-FFF2-40B4-BE49-F238E27FC236}">
-                  <a16:creationId xmlns:a16="http://schemas.microsoft.com/office/drawing/2014/main" id="{95D22B9C-3935-904E-96C9-E5CDE9BA38FC}"/>
+                  <a16:creationId xmlns:a16="http://schemas.microsoft.com/office/drawing/2014/main" id="{3C695BBA-2EC7-BF4F-87AD-BBCD46BA4862}"/>
                 </a:ext>
               </a:extLst>
             </p:cNvPr>
-            <p:cNvGrpSpPr/>
+            <p:cNvSpPr txBox="1"/>
             <p:nvPr/>
-          </p:nvGrpSpPr>
-          <p:grpSpPr>
+          </p:nvSpPr>
+          <p:spPr>
             <a:xfrm>
-              <a:off x="2117023" y="5044456"/>
-              <a:ext cx="2405828" cy="566054"/>
-              <a:chOff x="2080426" y="5480866"/>
-              <a:chExt cx="2405828" cy="566054"/>
+              <a:off x="4374535" y="1240193"/>
+              <a:ext cx="647934" cy="369332"/>
             </a:xfrm>
-          </p:grpSpPr>
-          <p:sp>
-            <p:nvSpPr>
-              <p:cNvPr id="18" name="Rectangle 17">
-                <a:extLst>
-                  <a:ext uri="{FF2B5EF4-FFF2-40B4-BE49-F238E27FC236}">
-                    <a16:creationId xmlns:a16="http://schemas.microsoft.com/office/drawing/2014/main" id="{E4129BC9-D03F-4F43-BDFA-2BEC2E992274}"/>
-                  </a:ext>
-                </a:extLst>
-              </p:cNvPr>
-              <p:cNvSpPr/>
-              <p:nvPr/>
-            </p:nvSpPr>
-            <p:spPr>
-              <a:xfrm>
-                <a:off x="2080426" y="5480866"/>
-                <a:ext cx="1430216" cy="474786"/>
-              </a:xfrm>
-              <a:prstGeom prst="rect">
-                <a:avLst/>
-              </a:prstGeom>
-              <a:solidFill>
-                <a:schemeClr val="bg1"/>
-              </a:solidFill>
-              <a:ln>
-                <a:noFill/>
-              </a:ln>
-            </p:spPr>
-            <p:style>
-              <a:lnRef idx="2">
-                <a:schemeClr val="accent1">
-                  <a:shade val="50000"/>
-                </a:schemeClr>
-              </a:lnRef>
-              <a:fillRef idx="1">
-                <a:schemeClr val="accent1"/>
-              </a:fillRef>
-              <a:effectRef idx="0">
-                <a:schemeClr val="accent1"/>
-              </a:effectRef>
-              <a:fontRef idx="minor">
-                <a:schemeClr val="lt1"/>
-              </a:fontRef>
-            </p:style>
-            <p:txBody>
-              <a:bodyPr rot="0" spcFirstLastPara="0" vertOverflow="overflow" horzOverflow="overflow" vert="horz" wrap="square" lIns="91440" tIns="45720" rIns="91440" bIns="45720" numCol="1" spcCol="0" rtlCol="0" fromWordArt="0" anchor="ctr" anchorCtr="0" forceAA="0" compatLnSpc="1">
-                <a:prstTxWarp prst="textNoShape">
-                  <a:avLst/>
-                </a:prstTxWarp>
-                <a:noAutofit/>
-              </a:bodyPr>
-              <a:lstStyle/>
-              <a:p>
-                <a:pPr algn="ctr"/>
-                <a:endParaRPr lang="en-US"/>
-              </a:p>
-            </p:txBody>
-          </p:sp>
-          <p:sp>
-            <p:nvSpPr>
-              <p:cNvPr id="19" name="TextBox 18">
-                <a:extLst>
-                  <a:ext uri="{FF2B5EF4-FFF2-40B4-BE49-F238E27FC236}">
-                    <a16:creationId xmlns:a16="http://schemas.microsoft.com/office/drawing/2014/main" id="{68295819-7C05-B246-9D4A-C3417ECB9F78}"/>
-                  </a:ext>
-                </a:extLst>
-              </p:cNvPr>
-              <p:cNvSpPr txBox="1"/>
-              <p:nvPr/>
-            </p:nvSpPr>
-            <p:spPr>
-              <a:xfrm>
-                <a:off x="2441670" y="5535681"/>
-                <a:ext cx="2044584" cy="511239"/>
-              </a:xfrm>
-              <a:prstGeom prst="rect">
-                <a:avLst/>
-              </a:prstGeom>
-              <a:solidFill>
-                <a:schemeClr val="bg1"/>
-              </a:solidFill>
-            </p:spPr>
-            <p:txBody>
-              <a:bodyPr wrap="none" rtlCol="0">
-                <a:spAutoFit/>
-              </a:bodyPr>
-              <a:lstStyle/>
-              <a:p>
-                <a:r>
-                  <a:rPr lang="en-US" dirty="0"/>
-                  <a:t>ACE2 (AF488)</a:t>
-                </a:r>
-              </a:p>
-            </p:txBody>
-          </p:sp>
-        </p:grpSp>
-        <p:grpSp>
-          <p:nvGrpSpPr>
-            <p:cNvPr id="20" name="Group 19">
+            <a:prstGeom prst="rect">
+              <a:avLst/>
+            </a:prstGeom>
+            <a:noFill/>
+          </p:spPr>
+          <p:txBody>
+            <a:bodyPr wrap="none" rtlCol="0">
+              <a:spAutoFit/>
+            </a:bodyPr>
+            <a:lstStyle/>
+            <a:p>
+              <a:pPr algn="ctr"/>
+              <a:r>
+                <a:rPr lang="en-US" dirty="0"/>
+                <a:t>293T</a:t>
+              </a:r>
+            </a:p>
+          </p:txBody>
+        </p:sp>
+        <p:sp>
+          <p:nvSpPr>
+            <p:cNvPr id="25" name="TextBox 24">
               <a:extLst>
                 <a:ext uri="{FF2B5EF4-FFF2-40B4-BE49-F238E27FC236}">
-                  <a16:creationId xmlns:a16="http://schemas.microsoft.com/office/drawing/2014/main" id="{B584272C-808E-3A47-BF36-32771A31CAE0}"/>
+                  <a16:creationId xmlns:a16="http://schemas.microsoft.com/office/drawing/2014/main" id="{6B66B998-2304-5743-BA19-0DD6E0305591}"/>
                 </a:ext>
               </a:extLst>
             </p:cNvPr>
-            <p:cNvGrpSpPr/>
+            <p:cNvSpPr txBox="1"/>
             <p:nvPr/>
-          </p:nvGrpSpPr>
-          <p:grpSpPr>
-            <a:xfrm rot="16200000">
-              <a:off x="-607448" y="2776612"/>
-              <a:ext cx="2842718" cy="618920"/>
-              <a:chOff x="2394444" y="5365537"/>
-              <a:chExt cx="1430215" cy="618920"/>
+          </p:nvSpPr>
+          <p:spPr>
+            <a:xfrm>
+              <a:off x="3862657" y="2786314"/>
+              <a:ext cx="1184491" cy="369332"/>
             </a:xfrm>
-          </p:grpSpPr>
-          <p:sp>
-            <p:nvSpPr>
-              <p:cNvPr id="21" name="Rectangle 20">
-                <a:extLst>
-                  <a:ext uri="{FF2B5EF4-FFF2-40B4-BE49-F238E27FC236}">
-                    <a16:creationId xmlns:a16="http://schemas.microsoft.com/office/drawing/2014/main" id="{4A41C815-B779-C046-ABAF-8BE7CA869C79}"/>
-                  </a:ext>
-                </a:extLst>
-              </p:cNvPr>
-              <p:cNvSpPr/>
-              <p:nvPr/>
-            </p:nvSpPr>
-            <p:spPr>
-              <a:xfrm>
-                <a:off x="2394444" y="5365537"/>
-                <a:ext cx="1430215" cy="589815"/>
-              </a:xfrm>
-              <a:prstGeom prst="rect">
-                <a:avLst/>
-              </a:prstGeom>
-              <a:solidFill>
-                <a:schemeClr val="bg1"/>
-              </a:solidFill>
-              <a:ln>
-                <a:noFill/>
-              </a:ln>
-            </p:spPr>
-            <p:style>
-              <a:lnRef idx="2">
-                <a:schemeClr val="accent1">
-                  <a:shade val="50000"/>
-                </a:schemeClr>
-              </a:lnRef>
-              <a:fillRef idx="1">
-                <a:schemeClr val="accent1"/>
-              </a:fillRef>
-              <a:effectRef idx="0">
-                <a:schemeClr val="accent1"/>
-              </a:effectRef>
-              <a:fontRef idx="minor">
-                <a:schemeClr val="lt1"/>
-              </a:fontRef>
-            </p:style>
-            <p:txBody>
-              <a:bodyPr rot="0" spcFirstLastPara="0" vertOverflow="overflow" horzOverflow="overflow" vert="horz" wrap="square" lIns="91440" tIns="45720" rIns="91440" bIns="45720" numCol="1" spcCol="0" rtlCol="0" fromWordArt="0" anchor="ctr" anchorCtr="0" forceAA="0" compatLnSpc="1">
-                <a:prstTxWarp prst="textNoShape">
-                  <a:avLst/>
-                </a:prstTxWarp>
-                <a:noAutofit/>
-              </a:bodyPr>
-              <a:lstStyle/>
-              <a:p>
-                <a:pPr algn="ctr"/>
-                <a:endParaRPr lang="en-US"/>
-              </a:p>
-            </p:txBody>
-          </p:sp>
-          <p:sp>
-            <p:nvSpPr>
-              <p:cNvPr id="22" name="TextBox 21">
-                <a:extLst>
-                  <a:ext uri="{FF2B5EF4-FFF2-40B4-BE49-F238E27FC236}">
-                    <a16:creationId xmlns:a16="http://schemas.microsoft.com/office/drawing/2014/main" id="{ED772C2D-2AD8-8748-AB74-F4896D8B7C82}"/>
-                  </a:ext>
-                </a:extLst>
-              </p:cNvPr>
-              <p:cNvSpPr txBox="1"/>
-              <p:nvPr/>
-            </p:nvSpPr>
-            <p:spPr>
-              <a:xfrm>
-                <a:off x="2870680" y="5615125"/>
-                <a:ext cx="777978" cy="369332"/>
-              </a:xfrm>
-              <a:prstGeom prst="rect">
-                <a:avLst/>
-              </a:prstGeom>
-              <a:solidFill>
-                <a:schemeClr val="bg1"/>
-              </a:solidFill>
-            </p:spPr>
-            <p:txBody>
-              <a:bodyPr wrap="none" rtlCol="0">
-                <a:spAutoFit/>
-              </a:bodyPr>
-              <a:lstStyle/>
-              <a:p>
-                <a:pPr algn="ctr"/>
-                <a:r>
-                  <a:rPr lang="en-US" dirty="0"/>
-                  <a:t>Relative Count</a:t>
-                </a:r>
-              </a:p>
-            </p:txBody>
-          </p:sp>
-        </p:grpSp>
+            <a:prstGeom prst="rect">
+              <a:avLst/>
+            </a:prstGeom>
+            <a:noFill/>
+          </p:spPr>
+          <p:txBody>
+            <a:bodyPr wrap="none" rtlCol="0">
+              <a:spAutoFit/>
+            </a:bodyPr>
+            <a:lstStyle/>
+            <a:p>
+              <a:pPr algn="ctr"/>
+              <a:r>
+                <a:rPr lang="en-US" dirty="0"/>
+                <a:t>293T-ACE2</a:t>
+              </a:r>
+            </a:p>
+          </p:txBody>
+        </p:sp>
+        <p:sp>
+          <p:nvSpPr>
+            <p:cNvPr id="33" name="TextBox 32">
+              <a:extLst>
+                <a:ext uri="{FF2B5EF4-FFF2-40B4-BE49-F238E27FC236}">
+                  <a16:creationId xmlns:a16="http://schemas.microsoft.com/office/drawing/2014/main" id="{EBA48315-3CBE-6F45-909C-99B48B65748C}"/>
+                </a:ext>
+              </a:extLst>
+            </p:cNvPr>
+            <p:cNvSpPr txBox="1"/>
+            <p:nvPr/>
+          </p:nvSpPr>
+          <p:spPr>
+            <a:xfrm>
+              <a:off x="4106" y="223239"/>
+              <a:ext cx="433132" cy="584775"/>
+            </a:xfrm>
+            <a:prstGeom prst="rect">
+              <a:avLst/>
+            </a:prstGeom>
+            <a:noFill/>
+          </p:spPr>
+          <p:txBody>
+            <a:bodyPr wrap="none" rtlCol="0">
+              <a:spAutoFit/>
+            </a:bodyPr>
+            <a:lstStyle/>
+            <a:p>
+              <a:r>
+                <a:rPr lang="en-US" sz="3200" b="1" dirty="0"/>
+                <a:t>A</a:t>
+              </a:r>
+            </a:p>
+          </p:txBody>
+        </p:sp>
+        <p:sp>
+          <p:nvSpPr>
+            <p:cNvPr id="34" name="TextBox 33">
+              <a:extLst>
+                <a:ext uri="{FF2B5EF4-FFF2-40B4-BE49-F238E27FC236}">
+                  <a16:creationId xmlns:a16="http://schemas.microsoft.com/office/drawing/2014/main" id="{507EA388-573B-E845-8631-B4812B1687E1}"/>
+                </a:ext>
+              </a:extLst>
+            </p:cNvPr>
+            <p:cNvSpPr txBox="1"/>
+            <p:nvPr/>
+          </p:nvSpPr>
+          <p:spPr>
+            <a:xfrm>
+              <a:off x="3573458" y="223239"/>
+              <a:ext cx="415498" cy="584775"/>
+            </a:xfrm>
+            <a:prstGeom prst="rect">
+              <a:avLst/>
+            </a:prstGeom>
+            <a:noFill/>
+          </p:spPr>
+          <p:txBody>
+            <a:bodyPr wrap="none" rtlCol="0">
+              <a:spAutoFit/>
+            </a:bodyPr>
+            <a:lstStyle/>
+            <a:p>
+              <a:r>
+                <a:rPr lang="en-US" sz="3200" b="1" dirty="0"/>
+                <a:t>B</a:t>
+              </a:r>
+            </a:p>
+          </p:txBody>
+        </p:sp>
+        <p:sp>
+          <p:nvSpPr>
+            <p:cNvPr id="35" name="TextBox 34">
+              <a:extLst>
+                <a:ext uri="{FF2B5EF4-FFF2-40B4-BE49-F238E27FC236}">
+                  <a16:creationId xmlns:a16="http://schemas.microsoft.com/office/drawing/2014/main" id="{5BFC600C-8C94-E945-A745-6E67074998A7}"/>
+                </a:ext>
+              </a:extLst>
+            </p:cNvPr>
+            <p:cNvSpPr txBox="1"/>
+            <p:nvPr/>
+          </p:nvSpPr>
+          <p:spPr>
+            <a:xfrm>
+              <a:off x="5761119" y="304053"/>
+              <a:ext cx="749179" cy="369332"/>
+            </a:xfrm>
+            <a:prstGeom prst="rect">
+              <a:avLst/>
+            </a:prstGeom>
+            <a:noFill/>
+          </p:spPr>
+          <p:txBody>
+            <a:bodyPr wrap="none" rtlCol="0">
+              <a:spAutoFit/>
+            </a:bodyPr>
+            <a:lstStyle/>
+            <a:p>
+              <a:pPr algn="r"/>
+              <a:r>
+                <a:rPr lang="en-US" dirty="0"/>
+                <a:t>VSV G</a:t>
+              </a:r>
+            </a:p>
+          </p:txBody>
+        </p:sp>
+        <p:sp>
+          <p:nvSpPr>
+            <p:cNvPr id="36" name="TextBox 35">
+              <a:extLst>
+                <a:ext uri="{FF2B5EF4-FFF2-40B4-BE49-F238E27FC236}">
+                  <a16:creationId xmlns:a16="http://schemas.microsoft.com/office/drawing/2014/main" id="{2BAB72F2-0CE4-7244-9682-402A0C7B4D50}"/>
+                </a:ext>
+              </a:extLst>
+            </p:cNvPr>
+            <p:cNvSpPr txBox="1"/>
+            <p:nvPr/>
+          </p:nvSpPr>
+          <p:spPr>
+            <a:xfrm>
+              <a:off x="7783416" y="304053"/>
+              <a:ext cx="677365" cy="369332"/>
+            </a:xfrm>
+            <a:prstGeom prst="rect">
+              <a:avLst/>
+            </a:prstGeom>
+            <a:noFill/>
+          </p:spPr>
+          <p:txBody>
+            <a:bodyPr wrap="none" rtlCol="0">
+              <a:spAutoFit/>
+            </a:bodyPr>
+            <a:lstStyle/>
+            <a:p>
+              <a:pPr algn="r"/>
+              <a:r>
+                <a:rPr lang="en-US" dirty="0"/>
+                <a:t>Spike</a:t>
+              </a:r>
+            </a:p>
+          </p:txBody>
+        </p:sp>
+        <p:pic>
+          <p:nvPicPr>
+            <p:cNvPr id="11" name="Picture 10" descr="A picture containing indoor, sitting, laptop, looking&#10;&#10;Description automatically generated">
+              <a:extLst>
+                <a:ext uri="{FF2B5EF4-FFF2-40B4-BE49-F238E27FC236}">
+                  <a16:creationId xmlns:a16="http://schemas.microsoft.com/office/drawing/2014/main" id="{B17CA679-96A2-BE4A-80E0-ACFE2D224AE5}"/>
+                </a:ext>
+              </a:extLst>
+            </p:cNvPr>
+            <p:cNvPicPr>
+              <a:picLocks noChangeAspect="1"/>
+            </p:cNvPicPr>
+            <p:nvPr/>
+          </p:nvPicPr>
+          <p:blipFill>
+            <a:blip r:embed="rId3">
+              <a:extLst>
+                <a:ext uri="{BEBA8EAE-BF5A-486C-A8C5-ECC9F3942E4B}">
+                  <a14:imgProps xmlns:a14="http://schemas.microsoft.com/office/drawing/2010/main">
+                    <a14:imgLayer r:embed="rId4">
+                      <a14:imgEffect>
+                        <a14:brightnessContrast bright="40000" contrast="40000"/>
+                      </a14:imgEffect>
+                    </a14:imgLayer>
+                  </a14:imgProps>
+                </a:ext>
+              </a:extLst>
+            </a:blip>
+            <a:stretch>
+              <a:fillRect/>
+            </a:stretch>
+          </p:blipFill>
+          <p:spPr>
+            <a:xfrm>
+              <a:off x="7291306" y="2259543"/>
+              <a:ext cx="2062238" cy="1540752"/>
+            </a:xfrm>
+            <a:prstGeom prst="rect">
+              <a:avLst/>
+            </a:prstGeom>
+          </p:spPr>
+        </p:pic>
+        <p:pic>
+          <p:nvPicPr>
+            <p:cNvPr id="28" name="Picture 27" descr="A picture containing food, flower, white&#10;&#10;Description automatically generated">
+              <a:extLst>
+                <a:ext uri="{FF2B5EF4-FFF2-40B4-BE49-F238E27FC236}">
+                  <a16:creationId xmlns:a16="http://schemas.microsoft.com/office/drawing/2014/main" id="{CBE89257-C1E7-AA49-8868-0E4B6BA5EB3D}"/>
+                </a:ext>
+              </a:extLst>
+            </p:cNvPr>
+            <p:cNvPicPr>
+              <a:picLocks noChangeAspect="1"/>
+            </p:cNvPicPr>
+            <p:nvPr/>
+          </p:nvPicPr>
+          <p:blipFill>
+            <a:blip r:embed="rId5">
+              <a:extLst>
+                <a:ext uri="{BEBA8EAE-BF5A-486C-A8C5-ECC9F3942E4B}">
+                  <a14:imgProps xmlns:a14="http://schemas.microsoft.com/office/drawing/2010/main">
+                    <a14:imgLayer r:embed="rId6">
+                      <a14:imgEffect>
+                        <a14:brightnessContrast bright="40000" contrast="40000"/>
+                      </a14:imgEffect>
+                    </a14:imgLayer>
+                  </a14:imgProps>
+                </a:ext>
+              </a:extLst>
+            </a:blip>
+            <a:stretch>
+              <a:fillRect/>
+            </a:stretch>
+          </p:blipFill>
+          <p:spPr>
+            <a:xfrm>
+              <a:off x="7291306" y="653686"/>
+              <a:ext cx="2062238" cy="1540752"/>
+            </a:xfrm>
+            <a:prstGeom prst="rect">
+              <a:avLst/>
+            </a:prstGeom>
+          </p:spPr>
+        </p:pic>
+        <p:pic>
+          <p:nvPicPr>
+            <p:cNvPr id="30" name="Picture 29" descr="A picture containing sitting, black, holding, apple&#10;&#10;Description automatically generated">
+              <a:extLst>
+                <a:ext uri="{FF2B5EF4-FFF2-40B4-BE49-F238E27FC236}">
+                  <a16:creationId xmlns:a16="http://schemas.microsoft.com/office/drawing/2014/main" id="{C3171383-A4CB-B141-A180-341BCAA37A37}"/>
+                </a:ext>
+              </a:extLst>
+            </p:cNvPr>
+            <p:cNvPicPr>
+              <a:picLocks noChangeAspect="1"/>
+            </p:cNvPicPr>
+            <p:nvPr/>
+          </p:nvPicPr>
+          <p:blipFill>
+            <a:blip r:embed="rId7">
+              <a:extLst>
+                <a:ext uri="{BEBA8EAE-BF5A-486C-A8C5-ECC9F3942E4B}">
+                  <a14:imgProps xmlns:a14="http://schemas.microsoft.com/office/drawing/2010/main">
+                    <a14:imgLayer r:embed="rId8">
+                      <a14:imgEffect>
+                        <a14:brightnessContrast bright="40000" contrast="40000"/>
+                      </a14:imgEffect>
+                    </a14:imgLayer>
+                  </a14:imgProps>
+                </a:ext>
+              </a:extLst>
+            </a:blip>
+            <a:stretch>
+              <a:fillRect/>
+            </a:stretch>
+          </p:blipFill>
+          <p:spPr>
+            <a:xfrm>
+              <a:off x="5166632" y="656160"/>
+              <a:ext cx="2062237" cy="1540752"/>
+            </a:xfrm>
+            <a:prstGeom prst="rect">
+              <a:avLst/>
+            </a:prstGeom>
+          </p:spPr>
+        </p:pic>
+        <p:pic>
+          <p:nvPicPr>
+            <p:cNvPr id="39" name="Picture 38" descr="A picture containing holding, sitting, apple, black&#10;&#10;Description automatically generated">
+              <a:extLst>
+                <a:ext uri="{FF2B5EF4-FFF2-40B4-BE49-F238E27FC236}">
+                  <a16:creationId xmlns:a16="http://schemas.microsoft.com/office/drawing/2014/main" id="{5153449B-29CD-0F4C-A005-EEC3286E0CE3}"/>
+                </a:ext>
+              </a:extLst>
+            </p:cNvPr>
+            <p:cNvPicPr>
+              <a:picLocks noChangeAspect="1"/>
+            </p:cNvPicPr>
+            <p:nvPr/>
+          </p:nvPicPr>
+          <p:blipFill>
+            <a:blip r:embed="rId9">
+              <a:extLst>
+                <a:ext uri="{BEBA8EAE-BF5A-486C-A8C5-ECC9F3942E4B}">
+                  <a14:imgProps xmlns:a14="http://schemas.microsoft.com/office/drawing/2010/main">
+                    <a14:imgLayer r:embed="rId10">
+                      <a14:imgEffect>
+                        <a14:brightnessContrast bright="40000" contrast="40000"/>
+                      </a14:imgEffect>
+                    </a14:imgLayer>
+                  </a14:imgProps>
+                </a:ext>
+              </a:extLst>
+            </a:blip>
+            <a:stretch>
+              <a:fillRect/>
+            </a:stretch>
+          </p:blipFill>
+          <p:spPr>
+            <a:xfrm>
+              <a:off x="5166632" y="2259543"/>
+              <a:ext cx="2062237" cy="1540752"/>
+            </a:xfrm>
+            <a:prstGeom prst="rect">
+              <a:avLst/>
+            </a:prstGeom>
+          </p:spPr>
+        </p:pic>
       </p:grpSp>
-      <p:sp>
-        <p:nvSpPr>
-          <p:cNvPr id="24" name="TextBox 23">
-            <a:extLst>
-              <a:ext uri="{FF2B5EF4-FFF2-40B4-BE49-F238E27FC236}">
-                <a16:creationId xmlns:a16="http://schemas.microsoft.com/office/drawing/2014/main" id="{3C695BBA-2EC7-BF4F-87AD-BBCD46BA4862}"/>
-              </a:ext>
-            </a:extLst>
-          </p:cNvPr>
-          <p:cNvSpPr txBox="1"/>
-          <p:nvPr/>
-        </p:nvSpPr>
-        <p:spPr>
-          <a:xfrm>
-            <a:off x="4374535" y="1240193"/>
-            <a:ext cx="647934" cy="369332"/>
-          </a:xfrm>
-          <a:prstGeom prst="rect">
-            <a:avLst/>
-          </a:prstGeom>
-          <a:noFill/>
-        </p:spPr>
-        <p:txBody>
-          <a:bodyPr wrap="none" rtlCol="0">
-            <a:spAutoFit/>
-          </a:bodyPr>
-          <a:lstStyle/>
-          <a:p>
-            <a:pPr algn="ctr"/>
-            <a:r>
-              <a:rPr lang="en-US" dirty="0"/>
-              <a:t>293T</a:t>
-            </a:r>
-          </a:p>
-        </p:txBody>
-      </p:sp>
-      <p:sp>
-        <p:nvSpPr>
-          <p:cNvPr id="25" name="TextBox 24">
-            <a:extLst>
-              <a:ext uri="{FF2B5EF4-FFF2-40B4-BE49-F238E27FC236}">
-                <a16:creationId xmlns:a16="http://schemas.microsoft.com/office/drawing/2014/main" id="{6B66B998-2304-5743-BA19-0DD6E0305591}"/>
-              </a:ext>
-            </a:extLst>
-          </p:cNvPr>
-          <p:cNvSpPr txBox="1"/>
-          <p:nvPr/>
-        </p:nvSpPr>
-        <p:spPr>
-          <a:xfrm>
-            <a:off x="3862657" y="2786314"/>
-            <a:ext cx="1184491" cy="369332"/>
-          </a:xfrm>
-          <a:prstGeom prst="rect">
-            <a:avLst/>
-          </a:prstGeom>
-          <a:noFill/>
-        </p:spPr>
-        <p:txBody>
-          <a:bodyPr wrap="none" rtlCol="0">
-            <a:spAutoFit/>
-          </a:bodyPr>
-          <a:lstStyle/>
-          <a:p>
-            <a:pPr algn="ctr"/>
-            <a:r>
-              <a:rPr lang="en-US" dirty="0"/>
-              <a:t>293T-ACE2</a:t>
-            </a:r>
-          </a:p>
-        </p:txBody>
-      </p:sp>
-      <p:sp>
-        <p:nvSpPr>
-          <p:cNvPr id="33" name="TextBox 32">
-            <a:extLst>
-              <a:ext uri="{FF2B5EF4-FFF2-40B4-BE49-F238E27FC236}">
-                <a16:creationId xmlns:a16="http://schemas.microsoft.com/office/drawing/2014/main" id="{EBA48315-3CBE-6F45-909C-99B48B65748C}"/>
-              </a:ext>
-            </a:extLst>
-          </p:cNvPr>
-          <p:cNvSpPr txBox="1"/>
-          <p:nvPr/>
-        </p:nvSpPr>
-        <p:spPr>
-          <a:xfrm>
-            <a:off x="4106" y="223239"/>
-            <a:ext cx="433132" cy="584775"/>
-          </a:xfrm>
-          <a:prstGeom prst="rect">
-            <a:avLst/>
-          </a:prstGeom>
-          <a:noFill/>
-        </p:spPr>
-        <p:txBody>
-          <a:bodyPr wrap="none" rtlCol="0">
-            <a:spAutoFit/>
-          </a:bodyPr>
-          <a:lstStyle/>
-          <a:p>
-            <a:r>
-              <a:rPr lang="en-US" sz="3200" b="1" dirty="0"/>
-              <a:t>A</a:t>
-            </a:r>
-          </a:p>
-        </p:txBody>
-      </p:sp>
-      <p:sp>
-        <p:nvSpPr>
-          <p:cNvPr id="34" name="TextBox 33">
-            <a:extLst>
-              <a:ext uri="{FF2B5EF4-FFF2-40B4-BE49-F238E27FC236}">
-                <a16:creationId xmlns:a16="http://schemas.microsoft.com/office/drawing/2014/main" id="{507EA388-573B-E845-8631-B4812B1687E1}"/>
-              </a:ext>
-            </a:extLst>
-          </p:cNvPr>
-          <p:cNvSpPr txBox="1"/>
-          <p:nvPr/>
-        </p:nvSpPr>
-        <p:spPr>
-          <a:xfrm>
-            <a:off x="3573458" y="223239"/>
-            <a:ext cx="415498" cy="584775"/>
-          </a:xfrm>
-          <a:prstGeom prst="rect">
-            <a:avLst/>
-          </a:prstGeom>
-          <a:noFill/>
-        </p:spPr>
-        <p:txBody>
-          <a:bodyPr wrap="none" rtlCol="0">
-            <a:spAutoFit/>
-          </a:bodyPr>
-          <a:lstStyle/>
-          <a:p>
-            <a:r>
-              <a:rPr lang="en-US" sz="3200" b="1" dirty="0"/>
-              <a:t>B</a:t>
-            </a:r>
-          </a:p>
-        </p:txBody>
-      </p:sp>
-      <p:sp>
-        <p:nvSpPr>
-          <p:cNvPr id="35" name="TextBox 34">
-            <a:extLst>
-              <a:ext uri="{FF2B5EF4-FFF2-40B4-BE49-F238E27FC236}">
-                <a16:creationId xmlns:a16="http://schemas.microsoft.com/office/drawing/2014/main" id="{5BFC600C-8C94-E945-A745-6E67074998A7}"/>
-              </a:ext>
-            </a:extLst>
-          </p:cNvPr>
-          <p:cNvSpPr txBox="1"/>
-          <p:nvPr/>
-        </p:nvSpPr>
-        <p:spPr>
-          <a:xfrm>
-            <a:off x="5761119" y="304053"/>
-            <a:ext cx="749179" cy="369332"/>
-          </a:xfrm>
-          <a:prstGeom prst="rect">
-            <a:avLst/>
-          </a:prstGeom>
-          <a:noFill/>
-        </p:spPr>
-        <p:txBody>
-          <a:bodyPr wrap="none" rtlCol="0">
-            <a:spAutoFit/>
-          </a:bodyPr>
-          <a:lstStyle/>
-          <a:p>
-            <a:pPr algn="r"/>
-            <a:r>
-              <a:rPr lang="en-US" dirty="0"/>
-              <a:t>VSV G</a:t>
-            </a:r>
-          </a:p>
-        </p:txBody>
-      </p:sp>
-      <p:sp>
-        <p:nvSpPr>
-          <p:cNvPr id="36" name="TextBox 35">
-            <a:extLst>
-              <a:ext uri="{FF2B5EF4-FFF2-40B4-BE49-F238E27FC236}">
-                <a16:creationId xmlns:a16="http://schemas.microsoft.com/office/drawing/2014/main" id="{2BAB72F2-0CE4-7244-9682-402A0C7B4D50}"/>
-              </a:ext>
-            </a:extLst>
-          </p:cNvPr>
-          <p:cNvSpPr txBox="1"/>
-          <p:nvPr/>
-        </p:nvSpPr>
-        <p:spPr>
-          <a:xfrm>
-            <a:off x="7783416" y="304053"/>
-            <a:ext cx="677365" cy="369332"/>
-          </a:xfrm>
-          <a:prstGeom prst="rect">
-            <a:avLst/>
-          </a:prstGeom>
-          <a:noFill/>
-        </p:spPr>
-        <p:txBody>
-          <a:bodyPr wrap="none" rtlCol="0">
-            <a:spAutoFit/>
-          </a:bodyPr>
-          <a:lstStyle/>
-          <a:p>
-            <a:pPr algn="r"/>
-            <a:r>
-              <a:rPr lang="en-US" dirty="0"/>
-              <a:t>Spike</a:t>
-            </a:r>
-          </a:p>
-        </p:txBody>
-      </p:sp>
-      <p:pic>
-        <p:nvPicPr>
-          <p:cNvPr id="11" name="Picture 10" descr="A picture containing indoor, sitting, laptop, looking&#10;&#10;Description automatically generated">
-            <a:extLst>
-              <a:ext uri="{FF2B5EF4-FFF2-40B4-BE49-F238E27FC236}">
-                <a16:creationId xmlns:a16="http://schemas.microsoft.com/office/drawing/2014/main" id="{B17CA679-96A2-BE4A-80E0-ACFE2D224AE5}"/>
-              </a:ext>
-            </a:extLst>
-          </p:cNvPr>
-          <p:cNvPicPr>
-            <a:picLocks noChangeAspect="1"/>
-          </p:cNvPicPr>
-          <p:nvPr/>
-        </p:nvPicPr>
-        <p:blipFill>
-          <a:blip r:embed="rId3">
-            <a:extLst>
-              <a:ext uri="{BEBA8EAE-BF5A-486C-A8C5-ECC9F3942E4B}">
-                <a14:imgProps xmlns:a14="http://schemas.microsoft.com/office/drawing/2010/main">
-                  <a14:imgLayer r:embed="rId4">
-                    <a14:imgEffect>
-                      <a14:brightnessContrast bright="40000" contrast="40000"/>
-                    </a14:imgEffect>
-                  </a14:imgLayer>
-                </a14:imgProps>
-              </a:ext>
-            </a:extLst>
-          </a:blip>
-          <a:stretch>
-            <a:fillRect/>
-          </a:stretch>
-        </p:blipFill>
-        <p:spPr>
-          <a:xfrm>
-            <a:off x="7291306" y="2259543"/>
-            <a:ext cx="2062238" cy="1540752"/>
-          </a:xfrm>
-          <a:prstGeom prst="rect">
-            <a:avLst/>
-          </a:prstGeom>
-        </p:spPr>
-      </p:pic>
-      <p:pic>
-        <p:nvPicPr>
-          <p:cNvPr id="28" name="Picture 27" descr="A picture containing food, flower, white&#10;&#10;Description automatically generated">
-            <a:extLst>
-              <a:ext uri="{FF2B5EF4-FFF2-40B4-BE49-F238E27FC236}">
-                <a16:creationId xmlns:a16="http://schemas.microsoft.com/office/drawing/2014/main" id="{CBE89257-C1E7-AA49-8868-0E4B6BA5EB3D}"/>
-              </a:ext>
-            </a:extLst>
-          </p:cNvPr>
-          <p:cNvPicPr>
-            <a:picLocks noChangeAspect="1"/>
-          </p:cNvPicPr>
-          <p:nvPr/>
-        </p:nvPicPr>
-        <p:blipFill>
-          <a:blip r:embed="rId5">
-            <a:extLst>
-              <a:ext uri="{BEBA8EAE-BF5A-486C-A8C5-ECC9F3942E4B}">
-                <a14:imgProps xmlns:a14="http://schemas.microsoft.com/office/drawing/2010/main">
-                  <a14:imgLayer r:embed="rId6">
-                    <a14:imgEffect>
-                      <a14:brightnessContrast bright="40000" contrast="40000"/>
-                    </a14:imgEffect>
-                  </a14:imgLayer>
-                </a14:imgProps>
-              </a:ext>
-            </a:extLst>
-          </a:blip>
-          <a:stretch>
-            <a:fillRect/>
-          </a:stretch>
-        </p:blipFill>
-        <p:spPr>
-          <a:xfrm>
-            <a:off x="7291306" y="653686"/>
-            <a:ext cx="2062238" cy="1540752"/>
-          </a:xfrm>
-          <a:prstGeom prst="rect">
-            <a:avLst/>
-          </a:prstGeom>
-        </p:spPr>
-      </p:pic>
-      <p:pic>
-        <p:nvPicPr>
-          <p:cNvPr id="30" name="Picture 29" descr="A picture containing sitting, black, holding, apple&#10;&#10;Description automatically generated">
-            <a:extLst>
-              <a:ext uri="{FF2B5EF4-FFF2-40B4-BE49-F238E27FC236}">
-                <a16:creationId xmlns:a16="http://schemas.microsoft.com/office/drawing/2014/main" id="{C3171383-A4CB-B141-A180-341BCAA37A37}"/>
-              </a:ext>
-            </a:extLst>
-          </p:cNvPr>
-          <p:cNvPicPr>
-            <a:picLocks noChangeAspect="1"/>
-          </p:cNvPicPr>
-          <p:nvPr/>
-        </p:nvPicPr>
-        <p:blipFill>
-          <a:blip r:embed="rId7">
-            <a:extLst>
-              <a:ext uri="{BEBA8EAE-BF5A-486C-A8C5-ECC9F3942E4B}">
-                <a14:imgProps xmlns:a14="http://schemas.microsoft.com/office/drawing/2010/main">
-                  <a14:imgLayer r:embed="rId8">
-                    <a14:imgEffect>
-                      <a14:brightnessContrast bright="40000" contrast="40000"/>
-                    </a14:imgEffect>
-                  </a14:imgLayer>
-                </a14:imgProps>
-              </a:ext>
-            </a:extLst>
-          </a:blip>
-          <a:stretch>
-            <a:fillRect/>
-          </a:stretch>
-        </p:blipFill>
-        <p:spPr>
-          <a:xfrm>
-            <a:off x="5166632" y="656160"/>
-            <a:ext cx="2062237" cy="1540752"/>
-          </a:xfrm>
-          <a:prstGeom prst="rect">
-            <a:avLst/>
-          </a:prstGeom>
-        </p:spPr>
-      </p:pic>
-      <p:pic>
-        <p:nvPicPr>
-          <p:cNvPr id="39" name="Picture 38" descr="A picture containing holding, sitting, apple, black&#10;&#10;Description automatically generated">
-            <a:extLst>
-              <a:ext uri="{FF2B5EF4-FFF2-40B4-BE49-F238E27FC236}">
-                <a16:creationId xmlns:a16="http://schemas.microsoft.com/office/drawing/2014/main" id="{5153449B-29CD-0F4C-A005-EEC3286E0CE3}"/>
-              </a:ext>
-            </a:extLst>
-          </p:cNvPr>
-          <p:cNvPicPr>
-            <a:picLocks noChangeAspect="1"/>
-          </p:cNvPicPr>
-          <p:nvPr/>
-        </p:nvPicPr>
-        <p:blipFill>
-          <a:blip r:embed="rId9">
-            <a:extLst>
-              <a:ext uri="{BEBA8EAE-BF5A-486C-A8C5-ECC9F3942E4B}">
-                <a14:imgProps xmlns:a14="http://schemas.microsoft.com/office/drawing/2010/main">
-                  <a14:imgLayer r:embed="rId10">
-                    <a14:imgEffect>
-                      <a14:brightnessContrast bright="40000" contrast="40000"/>
-                    </a14:imgEffect>
-                  </a14:imgLayer>
-                </a14:imgProps>
-              </a:ext>
-            </a:extLst>
-          </a:blip>
-          <a:stretch>
-            <a:fillRect/>
-          </a:stretch>
-        </p:blipFill>
-        <p:spPr>
-          <a:xfrm>
-            <a:off x="5166632" y="2259543"/>
-            <a:ext cx="2062237" cy="1540752"/>
-          </a:xfrm>
-          <a:prstGeom prst="rect">
-            <a:avLst/>
-          </a:prstGeom>
-        </p:spPr>
-      </p:pic>
     </p:spTree>
     <p:extLst>
       <p:ext uri="{BB962C8B-B14F-4D97-AF65-F5344CB8AC3E}">

</xml_diff>

<commit_message>
submitted to _Viruses_ versions
</commit_message>
<xml_diff>
--- a/figures/ACE2_figure2.pptx
+++ b/figures/ACE2_figure2.pptx
@@ -2,18 +2,18 @@
 <file path=ppt/presentation.xml><?xml version="1.0" encoding="utf-8"?>
 <p:presentation xmlns:a="http://schemas.openxmlformats.org/drawingml/2006/main" xmlns:r="http://schemas.openxmlformats.org/officeDocument/2006/relationships" xmlns:p="http://schemas.openxmlformats.org/presentationml/2006/main" saveSubsetFonts="1" autoCompressPictures="0">
   <p:sldMasterIdLst>
-    <p:sldMasterId id="2147483648" r:id="rId1"/>
+    <p:sldMasterId id="2147483672" r:id="rId1"/>
   </p:sldMasterIdLst>
   <p:sldIdLst>
     <p:sldId id="256" r:id="rId2"/>
   </p:sldIdLst>
-  <p:sldSz cx="12192000" cy="6858000"/>
+  <p:sldSz cx="12192000" cy="4297363"/>
   <p:notesSz cx="6858000" cy="9144000"/>
   <p:defaultTextStyle>
     <a:defPPr>
       <a:defRPr lang="en-US"/>
     </a:defPPr>
-    <a:lvl1pPr marL="0" algn="l" defTabSz="914400" rtl="0" eaLnBrk="1" latinLnBrk="0" hangingPunct="1">
+    <a:lvl1pPr marL="0" algn="l" defTabSz="457200" rtl="0" eaLnBrk="1" latinLnBrk="0" hangingPunct="1">
       <a:defRPr sz="1800" kern="1200">
         <a:solidFill>
           <a:schemeClr val="tx1"/>
@@ -23,7 +23,7 @@
         <a:cs typeface="+mn-cs"/>
       </a:defRPr>
     </a:lvl1pPr>
-    <a:lvl2pPr marL="457200" algn="l" defTabSz="914400" rtl="0" eaLnBrk="1" latinLnBrk="0" hangingPunct="1">
+    <a:lvl2pPr marL="457200" algn="l" defTabSz="457200" rtl="0" eaLnBrk="1" latinLnBrk="0" hangingPunct="1">
       <a:defRPr sz="1800" kern="1200">
         <a:solidFill>
           <a:schemeClr val="tx1"/>
@@ -33,7 +33,7 @@
         <a:cs typeface="+mn-cs"/>
       </a:defRPr>
     </a:lvl2pPr>
-    <a:lvl3pPr marL="914400" algn="l" defTabSz="914400" rtl="0" eaLnBrk="1" latinLnBrk="0" hangingPunct="1">
+    <a:lvl3pPr marL="914400" algn="l" defTabSz="457200" rtl="0" eaLnBrk="1" latinLnBrk="0" hangingPunct="1">
       <a:defRPr sz="1800" kern="1200">
         <a:solidFill>
           <a:schemeClr val="tx1"/>
@@ -43,7 +43,7 @@
         <a:cs typeface="+mn-cs"/>
       </a:defRPr>
     </a:lvl3pPr>
-    <a:lvl4pPr marL="1371600" algn="l" defTabSz="914400" rtl="0" eaLnBrk="1" latinLnBrk="0" hangingPunct="1">
+    <a:lvl4pPr marL="1371600" algn="l" defTabSz="457200" rtl="0" eaLnBrk="1" latinLnBrk="0" hangingPunct="1">
       <a:defRPr sz="1800" kern="1200">
         <a:solidFill>
           <a:schemeClr val="tx1"/>
@@ -53,7 +53,7 @@
         <a:cs typeface="+mn-cs"/>
       </a:defRPr>
     </a:lvl4pPr>
-    <a:lvl5pPr marL="1828800" algn="l" defTabSz="914400" rtl="0" eaLnBrk="1" latinLnBrk="0" hangingPunct="1">
+    <a:lvl5pPr marL="1828800" algn="l" defTabSz="457200" rtl="0" eaLnBrk="1" latinLnBrk="0" hangingPunct="1">
       <a:defRPr sz="1800" kern="1200">
         <a:solidFill>
           <a:schemeClr val="tx1"/>
@@ -63,7 +63,7 @@
         <a:cs typeface="+mn-cs"/>
       </a:defRPr>
     </a:lvl5pPr>
-    <a:lvl6pPr marL="2286000" algn="l" defTabSz="914400" rtl="0" eaLnBrk="1" latinLnBrk="0" hangingPunct="1">
+    <a:lvl6pPr marL="2286000" algn="l" defTabSz="457200" rtl="0" eaLnBrk="1" latinLnBrk="0" hangingPunct="1">
       <a:defRPr sz="1800" kern="1200">
         <a:solidFill>
           <a:schemeClr val="tx1"/>
@@ -73,7 +73,7 @@
         <a:cs typeface="+mn-cs"/>
       </a:defRPr>
     </a:lvl6pPr>
-    <a:lvl7pPr marL="2743200" algn="l" defTabSz="914400" rtl="0" eaLnBrk="1" latinLnBrk="0" hangingPunct="1">
+    <a:lvl7pPr marL="2743200" algn="l" defTabSz="457200" rtl="0" eaLnBrk="1" latinLnBrk="0" hangingPunct="1">
       <a:defRPr sz="1800" kern="1200">
         <a:solidFill>
           <a:schemeClr val="tx1"/>
@@ -83,7 +83,7 @@
         <a:cs typeface="+mn-cs"/>
       </a:defRPr>
     </a:lvl7pPr>
-    <a:lvl8pPr marL="3200400" algn="l" defTabSz="914400" rtl="0" eaLnBrk="1" latinLnBrk="0" hangingPunct="1">
+    <a:lvl8pPr marL="3200400" algn="l" defTabSz="457200" rtl="0" eaLnBrk="1" latinLnBrk="0" hangingPunct="1">
       <a:defRPr sz="1800" kern="1200">
         <a:solidFill>
           <a:schemeClr val="tx1"/>
@@ -93,7 +93,7 @@
         <a:cs typeface="+mn-cs"/>
       </a:defRPr>
     </a:lvl8pPr>
-    <a:lvl9pPr marL="3657600" algn="l" defTabSz="914400" rtl="0" eaLnBrk="1" latinLnBrk="0" hangingPunct="1">
+    <a:lvl9pPr marL="3657600" algn="l" defTabSz="457200" rtl="0" eaLnBrk="1" latinLnBrk="0" hangingPunct="1">
       <a:defRPr sz="1800" kern="1200">
         <a:solidFill>
           <a:schemeClr val="tx1"/>
@@ -107,7 +107,7 @@
   <p:extLst>
     <p:ext uri="{EFAFB233-063F-42B5-8137-9DF3F51BA10A}">
       <p15:sldGuideLst xmlns:p15="http://schemas.microsoft.com/office/powerpoint/2012/main">
-        <p15:guide id="1" orient="horz" pos="2184" userDrawn="1">
+        <p15:guide id="1" orient="horz" pos="1369" userDrawn="1">
           <p15:clr>
             <a:srgbClr val="A4A3A4"/>
           </p15:clr>
@@ -121,6 +121,1039 @@
     </p:ext>
   </p:extLst>
 </p:presentation>
+</file>
+
+<file path=ppt/revisionInfo.xml><?xml version="1.0" encoding="utf-8"?>
+<p1510:revInfo xmlns:a="http://schemas.openxmlformats.org/drawingml/2006/main" xmlns:r="http://schemas.openxmlformats.org/officeDocument/2006/relationships" xmlns:p1510="http://schemas.microsoft.com/office/powerpoint/2015/10/main">
+  <p1510:revLst>
+    <p1510:client id="{0BEA380E-990E-F440-8409-A46B3BA4865E}" v="6" dt="2020-04-20T18:14:54.136"/>
+  </p1510:revLst>
+</p1510:revInfo>
+</file>
+
+<file path=ppt/changesInfos/changesInfo1.xml><?xml version="1.0" encoding="utf-8"?>
+<pc:chgInfo xmlns:a="http://schemas.openxmlformats.org/drawingml/2006/main" xmlns:r="http://schemas.openxmlformats.org/officeDocument/2006/relationships" xmlns:ac="http://schemas.microsoft.com/office/drawing/2013/main/command" xmlns:pc="http://schemas.microsoft.com/office/powerpoint/2013/main/command">
+  <pc:docChgLst>
+    <pc:chgData name="Bloom PhD, Jesse D" userId="e17e4af4-92ba-4f4f-89d8-f6d4f5501821" providerId="ADAL" clId="{0BEA380E-990E-F440-8409-A46B3BA4865E}"/>
+    <pc:docChg chg="modSld modMainMaster">
+      <pc:chgData name="Bloom PhD, Jesse D" userId="e17e4af4-92ba-4f4f-89d8-f6d4f5501821" providerId="ADAL" clId="{0BEA380E-990E-F440-8409-A46B3BA4865E}" dt="2020-04-20T18:14:54.135" v="5"/>
+      <pc:docMkLst>
+        <pc:docMk/>
+      </pc:docMkLst>
+      <pc:sldChg chg="addSp delSp modSp">
+        <pc:chgData name="Bloom PhD, Jesse D" userId="e17e4af4-92ba-4f4f-89d8-f6d4f5501821" providerId="ADAL" clId="{0BEA380E-990E-F440-8409-A46B3BA4865E}" dt="2020-04-20T18:14:54.135" v="5"/>
+        <pc:sldMkLst>
+          <pc:docMk/>
+          <pc:sldMk cId="4002544939" sldId="256"/>
+        </pc:sldMkLst>
+        <pc:spChg chg="mod">
+          <ac:chgData name="Bloom PhD, Jesse D" userId="e17e4af4-92ba-4f4f-89d8-f6d4f5501821" providerId="ADAL" clId="{0BEA380E-990E-F440-8409-A46B3BA4865E}" dt="2020-04-20T18:14:36.433" v="2"/>
+          <ac:spMkLst>
+            <pc:docMk/>
+            <pc:sldMk cId="4002544939" sldId="256"/>
+            <ac:spMk id="40" creationId="{CB1A06FB-C3A8-F846-9ECD-67B8E7F95F34}"/>
+          </ac:spMkLst>
+        </pc:spChg>
+        <pc:spChg chg="mod">
+          <ac:chgData name="Bloom PhD, Jesse D" userId="e17e4af4-92ba-4f4f-89d8-f6d4f5501821" providerId="ADAL" clId="{0BEA380E-990E-F440-8409-A46B3BA4865E}" dt="2020-04-20T18:14:36.433" v="2"/>
+          <ac:spMkLst>
+            <pc:docMk/>
+            <pc:sldMk cId="4002544939" sldId="256"/>
+            <ac:spMk id="41" creationId="{E75417F5-A05B-8141-BAA7-5FB235A6CF24}"/>
+          </ac:spMkLst>
+        </pc:spChg>
+        <pc:spChg chg="mod">
+          <ac:chgData name="Bloom PhD, Jesse D" userId="e17e4af4-92ba-4f4f-89d8-f6d4f5501821" providerId="ADAL" clId="{0BEA380E-990E-F440-8409-A46B3BA4865E}" dt="2020-04-20T18:14:36.433" v="2"/>
+          <ac:spMkLst>
+            <pc:docMk/>
+            <pc:sldMk cId="4002544939" sldId="256"/>
+            <ac:spMk id="42" creationId="{D6565A0F-FC83-C84F-9DCF-4272A5C4E0E8}"/>
+          </ac:spMkLst>
+        </pc:spChg>
+        <pc:spChg chg="mod">
+          <ac:chgData name="Bloom PhD, Jesse D" userId="e17e4af4-92ba-4f4f-89d8-f6d4f5501821" providerId="ADAL" clId="{0BEA380E-990E-F440-8409-A46B3BA4865E}" dt="2020-04-20T18:14:36.433" v="2"/>
+          <ac:spMkLst>
+            <pc:docMk/>
+            <pc:sldMk cId="4002544939" sldId="256"/>
+            <ac:spMk id="43" creationId="{172A959D-4344-8B4C-96FF-D2AB29EF8C33}"/>
+          </ac:spMkLst>
+        </pc:spChg>
+        <pc:spChg chg="mod">
+          <ac:chgData name="Bloom PhD, Jesse D" userId="e17e4af4-92ba-4f4f-89d8-f6d4f5501821" providerId="ADAL" clId="{0BEA380E-990E-F440-8409-A46B3BA4865E}" dt="2020-04-20T18:14:36.433" v="2"/>
+          <ac:spMkLst>
+            <pc:docMk/>
+            <pc:sldMk cId="4002544939" sldId="256"/>
+            <ac:spMk id="45" creationId="{A1C9EE59-3CB8-CB45-9B57-41801B2B5499}"/>
+          </ac:spMkLst>
+        </pc:spChg>
+        <pc:spChg chg="mod">
+          <ac:chgData name="Bloom PhD, Jesse D" userId="e17e4af4-92ba-4f4f-89d8-f6d4f5501821" providerId="ADAL" clId="{0BEA380E-990E-F440-8409-A46B3BA4865E}" dt="2020-04-20T18:14:36.433" v="2"/>
+          <ac:spMkLst>
+            <pc:docMk/>
+            <pc:sldMk cId="4002544939" sldId="256"/>
+            <ac:spMk id="48" creationId="{C7178F0A-88C5-7148-82FF-65105ECBDD0D}"/>
+          </ac:spMkLst>
+        </pc:spChg>
+        <pc:spChg chg="mod">
+          <ac:chgData name="Bloom PhD, Jesse D" userId="e17e4af4-92ba-4f4f-89d8-f6d4f5501821" providerId="ADAL" clId="{0BEA380E-990E-F440-8409-A46B3BA4865E}" dt="2020-04-20T18:14:36.433" v="2"/>
+          <ac:spMkLst>
+            <pc:docMk/>
+            <pc:sldMk cId="4002544939" sldId="256"/>
+            <ac:spMk id="51" creationId="{1E6C4230-A31D-3F4F-9310-1088D9928877}"/>
+          </ac:spMkLst>
+        </pc:spChg>
+        <pc:spChg chg="mod">
+          <ac:chgData name="Bloom PhD, Jesse D" userId="e17e4af4-92ba-4f4f-89d8-f6d4f5501821" providerId="ADAL" clId="{0BEA380E-990E-F440-8409-A46B3BA4865E}" dt="2020-04-20T18:14:36.433" v="2"/>
+          <ac:spMkLst>
+            <pc:docMk/>
+            <pc:sldMk cId="4002544939" sldId="256"/>
+            <ac:spMk id="59" creationId="{AA21024A-D9B4-9340-A2B1-B4970B7ECB2F}"/>
+          </ac:spMkLst>
+        </pc:spChg>
+        <pc:spChg chg="mod">
+          <ac:chgData name="Bloom PhD, Jesse D" userId="e17e4af4-92ba-4f4f-89d8-f6d4f5501821" providerId="ADAL" clId="{0BEA380E-990E-F440-8409-A46B3BA4865E}" dt="2020-04-20T18:14:36.433" v="2"/>
+          <ac:spMkLst>
+            <pc:docMk/>
+            <pc:sldMk cId="4002544939" sldId="256"/>
+            <ac:spMk id="64" creationId="{03434C9A-CF49-EF48-B63E-53B3CB4F19F6}"/>
+          </ac:spMkLst>
+        </pc:spChg>
+        <pc:spChg chg="mod">
+          <ac:chgData name="Bloom PhD, Jesse D" userId="e17e4af4-92ba-4f4f-89d8-f6d4f5501821" providerId="ADAL" clId="{0BEA380E-990E-F440-8409-A46B3BA4865E}" dt="2020-04-20T18:14:36.433" v="2"/>
+          <ac:spMkLst>
+            <pc:docMk/>
+            <pc:sldMk cId="4002544939" sldId="256"/>
+            <ac:spMk id="65" creationId="{EEF70B19-2C1F-A244-AB96-7D35EDA8E91A}"/>
+          </ac:spMkLst>
+        </pc:spChg>
+        <pc:spChg chg="mod">
+          <ac:chgData name="Bloom PhD, Jesse D" userId="e17e4af4-92ba-4f4f-89d8-f6d4f5501821" providerId="ADAL" clId="{0BEA380E-990E-F440-8409-A46B3BA4865E}" dt="2020-04-20T18:14:36.433" v="2"/>
+          <ac:spMkLst>
+            <pc:docMk/>
+            <pc:sldMk cId="4002544939" sldId="256"/>
+            <ac:spMk id="66" creationId="{63372067-340A-7F49-B72F-B0DC0426E031}"/>
+          </ac:spMkLst>
+        </pc:spChg>
+        <pc:spChg chg="mod">
+          <ac:chgData name="Bloom PhD, Jesse D" userId="e17e4af4-92ba-4f4f-89d8-f6d4f5501821" providerId="ADAL" clId="{0BEA380E-990E-F440-8409-A46B3BA4865E}" dt="2020-04-20T18:14:36.433" v="2"/>
+          <ac:spMkLst>
+            <pc:docMk/>
+            <pc:sldMk cId="4002544939" sldId="256"/>
+            <ac:spMk id="67" creationId="{DF853FA5-322F-3043-A87F-74136291C16A}"/>
+          </ac:spMkLst>
+        </pc:spChg>
+        <pc:spChg chg="mod">
+          <ac:chgData name="Bloom PhD, Jesse D" userId="e17e4af4-92ba-4f4f-89d8-f6d4f5501821" providerId="ADAL" clId="{0BEA380E-990E-F440-8409-A46B3BA4865E}" dt="2020-04-20T18:14:36.433" v="2"/>
+          <ac:spMkLst>
+            <pc:docMk/>
+            <pc:sldMk cId="4002544939" sldId="256"/>
+            <ac:spMk id="68" creationId="{9F473CC5-FE9E-3B4B-9089-227632089027}"/>
+          </ac:spMkLst>
+        </pc:spChg>
+        <pc:spChg chg="mod">
+          <ac:chgData name="Bloom PhD, Jesse D" userId="e17e4af4-92ba-4f4f-89d8-f6d4f5501821" providerId="ADAL" clId="{0BEA380E-990E-F440-8409-A46B3BA4865E}" dt="2020-04-20T18:14:36.433" v="2"/>
+          <ac:spMkLst>
+            <pc:docMk/>
+            <pc:sldMk cId="4002544939" sldId="256"/>
+            <ac:spMk id="69" creationId="{B31788BE-2713-CB44-B1E9-3C592CC60883}"/>
+          </ac:spMkLst>
+        </pc:spChg>
+        <pc:spChg chg="mod">
+          <ac:chgData name="Bloom PhD, Jesse D" userId="e17e4af4-92ba-4f4f-89d8-f6d4f5501821" providerId="ADAL" clId="{0BEA380E-990E-F440-8409-A46B3BA4865E}" dt="2020-04-20T18:14:54.135" v="5"/>
+          <ac:spMkLst>
+            <pc:docMk/>
+            <pc:sldMk cId="4002544939" sldId="256"/>
+            <ac:spMk id="73" creationId="{CE940DD5-530C-4549-9588-D7247D0948BB}"/>
+          </ac:spMkLst>
+        </pc:spChg>
+        <pc:spChg chg="mod">
+          <ac:chgData name="Bloom PhD, Jesse D" userId="e17e4af4-92ba-4f4f-89d8-f6d4f5501821" providerId="ADAL" clId="{0BEA380E-990E-F440-8409-A46B3BA4865E}" dt="2020-04-20T18:14:54.135" v="5"/>
+          <ac:spMkLst>
+            <pc:docMk/>
+            <pc:sldMk cId="4002544939" sldId="256"/>
+            <ac:spMk id="74" creationId="{A5032028-B4E4-3447-88E9-AB66851BFD6D}"/>
+          </ac:spMkLst>
+        </pc:spChg>
+        <pc:spChg chg="mod">
+          <ac:chgData name="Bloom PhD, Jesse D" userId="e17e4af4-92ba-4f4f-89d8-f6d4f5501821" providerId="ADAL" clId="{0BEA380E-990E-F440-8409-A46B3BA4865E}" dt="2020-04-20T18:14:54.135" v="5"/>
+          <ac:spMkLst>
+            <pc:docMk/>
+            <pc:sldMk cId="4002544939" sldId="256"/>
+            <ac:spMk id="75" creationId="{4D079CCF-E585-AB47-B069-7F37B5843E16}"/>
+          </ac:spMkLst>
+        </pc:spChg>
+        <pc:spChg chg="mod">
+          <ac:chgData name="Bloom PhD, Jesse D" userId="e17e4af4-92ba-4f4f-89d8-f6d4f5501821" providerId="ADAL" clId="{0BEA380E-990E-F440-8409-A46B3BA4865E}" dt="2020-04-20T18:14:54.135" v="5"/>
+          <ac:spMkLst>
+            <pc:docMk/>
+            <pc:sldMk cId="4002544939" sldId="256"/>
+            <ac:spMk id="76" creationId="{D44EF819-353F-B84C-885D-4B85EDDE003C}"/>
+          </ac:spMkLst>
+        </pc:spChg>
+        <pc:spChg chg="mod">
+          <ac:chgData name="Bloom PhD, Jesse D" userId="e17e4af4-92ba-4f4f-89d8-f6d4f5501821" providerId="ADAL" clId="{0BEA380E-990E-F440-8409-A46B3BA4865E}" dt="2020-04-20T18:14:54.135" v="5"/>
+          <ac:spMkLst>
+            <pc:docMk/>
+            <pc:sldMk cId="4002544939" sldId="256"/>
+            <ac:spMk id="77" creationId="{8AC39CD9-1319-654B-A20E-2E8745F3CC4A}"/>
+          </ac:spMkLst>
+        </pc:spChg>
+        <pc:spChg chg="mod">
+          <ac:chgData name="Bloom PhD, Jesse D" userId="e17e4af4-92ba-4f4f-89d8-f6d4f5501821" providerId="ADAL" clId="{0BEA380E-990E-F440-8409-A46B3BA4865E}" dt="2020-04-20T18:14:54.135" v="5"/>
+          <ac:spMkLst>
+            <pc:docMk/>
+            <pc:sldMk cId="4002544939" sldId="256"/>
+            <ac:spMk id="78" creationId="{4E42B301-6280-2840-A969-CDC50E4512BA}"/>
+          </ac:spMkLst>
+        </pc:spChg>
+        <pc:spChg chg="mod">
+          <ac:chgData name="Bloom PhD, Jesse D" userId="e17e4af4-92ba-4f4f-89d8-f6d4f5501821" providerId="ADAL" clId="{0BEA380E-990E-F440-8409-A46B3BA4865E}" dt="2020-04-20T18:14:54.135" v="5"/>
+          <ac:spMkLst>
+            <pc:docMk/>
+            <pc:sldMk cId="4002544939" sldId="256"/>
+            <ac:spMk id="81" creationId="{0959EFE3-8476-134E-9676-BF5E8FB88C44}"/>
+          </ac:spMkLst>
+        </pc:spChg>
+        <pc:spChg chg="mod">
+          <ac:chgData name="Bloom PhD, Jesse D" userId="e17e4af4-92ba-4f4f-89d8-f6d4f5501821" providerId="ADAL" clId="{0BEA380E-990E-F440-8409-A46B3BA4865E}" dt="2020-04-20T18:14:54.135" v="5"/>
+          <ac:spMkLst>
+            <pc:docMk/>
+            <pc:sldMk cId="4002544939" sldId="256"/>
+            <ac:spMk id="87" creationId="{AAF567C8-666B-DA45-A072-FF6E6253DCF3}"/>
+          </ac:spMkLst>
+        </pc:spChg>
+        <pc:spChg chg="mod">
+          <ac:chgData name="Bloom PhD, Jesse D" userId="e17e4af4-92ba-4f4f-89d8-f6d4f5501821" providerId="ADAL" clId="{0BEA380E-990E-F440-8409-A46B3BA4865E}" dt="2020-04-20T18:14:54.135" v="5"/>
+          <ac:spMkLst>
+            <pc:docMk/>
+            <pc:sldMk cId="4002544939" sldId="256"/>
+            <ac:spMk id="92" creationId="{428DB490-98AC-024C-8BE0-99569C9765B9}"/>
+          </ac:spMkLst>
+        </pc:spChg>
+        <pc:spChg chg="mod">
+          <ac:chgData name="Bloom PhD, Jesse D" userId="e17e4af4-92ba-4f4f-89d8-f6d4f5501821" providerId="ADAL" clId="{0BEA380E-990E-F440-8409-A46B3BA4865E}" dt="2020-04-20T18:14:54.135" v="5"/>
+          <ac:spMkLst>
+            <pc:docMk/>
+            <pc:sldMk cId="4002544939" sldId="256"/>
+            <ac:spMk id="93" creationId="{332D57CA-487C-714F-AFDF-381FF9F187B8}"/>
+          </ac:spMkLst>
+        </pc:spChg>
+        <pc:spChg chg="mod">
+          <ac:chgData name="Bloom PhD, Jesse D" userId="e17e4af4-92ba-4f4f-89d8-f6d4f5501821" providerId="ADAL" clId="{0BEA380E-990E-F440-8409-A46B3BA4865E}" dt="2020-04-20T18:14:54.135" v="5"/>
+          <ac:spMkLst>
+            <pc:docMk/>
+            <pc:sldMk cId="4002544939" sldId="256"/>
+            <ac:spMk id="94" creationId="{CD93ED97-A20A-8249-B2FA-978CA34F6197}"/>
+          </ac:spMkLst>
+        </pc:spChg>
+        <pc:spChg chg="mod">
+          <ac:chgData name="Bloom PhD, Jesse D" userId="e17e4af4-92ba-4f4f-89d8-f6d4f5501821" providerId="ADAL" clId="{0BEA380E-990E-F440-8409-A46B3BA4865E}" dt="2020-04-20T18:14:54.135" v="5"/>
+          <ac:spMkLst>
+            <pc:docMk/>
+            <pc:sldMk cId="4002544939" sldId="256"/>
+            <ac:spMk id="95" creationId="{6C92275D-4293-AD42-8DC7-175C8A9017F1}"/>
+          </ac:spMkLst>
+        </pc:spChg>
+        <pc:spChg chg="mod">
+          <ac:chgData name="Bloom PhD, Jesse D" userId="e17e4af4-92ba-4f4f-89d8-f6d4f5501821" providerId="ADAL" clId="{0BEA380E-990E-F440-8409-A46B3BA4865E}" dt="2020-04-20T18:14:54.135" v="5"/>
+          <ac:spMkLst>
+            <pc:docMk/>
+            <pc:sldMk cId="4002544939" sldId="256"/>
+            <ac:spMk id="96" creationId="{B172B6DD-580D-B44E-912E-7001D0B00D77}"/>
+          </ac:spMkLst>
+        </pc:spChg>
+        <pc:spChg chg="mod">
+          <ac:chgData name="Bloom PhD, Jesse D" userId="e17e4af4-92ba-4f4f-89d8-f6d4f5501821" providerId="ADAL" clId="{0BEA380E-990E-F440-8409-A46B3BA4865E}" dt="2020-04-20T18:14:54.135" v="5"/>
+          <ac:spMkLst>
+            <pc:docMk/>
+            <pc:sldMk cId="4002544939" sldId="256"/>
+            <ac:spMk id="97" creationId="{4D04D4D6-C9CE-B348-B1E2-A1C5B3380ED1}"/>
+          </ac:spMkLst>
+        </pc:spChg>
+        <pc:grpChg chg="add del mod">
+          <ac:chgData name="Bloom PhD, Jesse D" userId="e17e4af4-92ba-4f4f-89d8-f6d4f5501821" providerId="ADAL" clId="{0BEA380E-990E-F440-8409-A46B3BA4865E}" dt="2020-04-20T18:14:44.696" v="3"/>
+          <ac:grpSpMkLst>
+            <pc:docMk/>
+            <pc:sldMk cId="4002544939" sldId="256"/>
+            <ac:grpSpMk id="30" creationId="{EF743A28-FCB4-C445-B374-73CA6156203E}"/>
+          </ac:grpSpMkLst>
+        </pc:grpChg>
+        <pc:grpChg chg="mod">
+          <ac:chgData name="Bloom PhD, Jesse D" userId="e17e4af4-92ba-4f4f-89d8-f6d4f5501821" providerId="ADAL" clId="{0BEA380E-990E-F440-8409-A46B3BA4865E}" dt="2020-04-20T18:14:36.433" v="2"/>
+          <ac:grpSpMkLst>
+            <pc:docMk/>
+            <pc:sldMk cId="4002544939" sldId="256"/>
+            <ac:grpSpMk id="39" creationId="{E5BD8B76-DBBA-AF47-9617-F3C570B7F11B}"/>
+          </ac:grpSpMkLst>
+        </pc:grpChg>
+        <pc:grpChg chg="del">
+          <ac:chgData name="Bloom PhD, Jesse D" userId="e17e4af4-92ba-4f4f-89d8-f6d4f5501821" providerId="ADAL" clId="{0BEA380E-990E-F440-8409-A46B3BA4865E}" dt="2020-04-20T18:14:25.429" v="0"/>
+          <ac:grpSpMkLst>
+            <pc:docMk/>
+            <pc:sldMk cId="4002544939" sldId="256"/>
+            <ac:grpSpMk id="54" creationId="{F63EB59B-5179-D54F-9453-40CE530D9D79}"/>
+          </ac:grpSpMkLst>
+        </pc:grpChg>
+        <pc:grpChg chg="mod">
+          <ac:chgData name="Bloom PhD, Jesse D" userId="e17e4af4-92ba-4f4f-89d8-f6d4f5501821" providerId="ADAL" clId="{0BEA380E-990E-F440-8409-A46B3BA4865E}" dt="2020-04-20T18:14:36.433" v="2"/>
+          <ac:grpSpMkLst>
+            <pc:docMk/>
+            <pc:sldMk cId="4002544939" sldId="256"/>
+            <ac:grpSpMk id="61" creationId="{83186413-6D88-2B43-9FDC-1FE488C10251}"/>
+          </ac:grpSpMkLst>
+        </pc:grpChg>
+        <pc:grpChg chg="mod">
+          <ac:chgData name="Bloom PhD, Jesse D" userId="e17e4af4-92ba-4f4f-89d8-f6d4f5501821" providerId="ADAL" clId="{0BEA380E-990E-F440-8409-A46B3BA4865E}" dt="2020-04-20T18:14:36.433" v="2"/>
+          <ac:grpSpMkLst>
+            <pc:docMk/>
+            <pc:sldMk cId="4002544939" sldId="256"/>
+            <ac:grpSpMk id="62" creationId="{E594E9A5-758A-394C-847C-14E1A500B7BF}"/>
+          </ac:grpSpMkLst>
+        </pc:grpChg>
+        <pc:grpChg chg="mod">
+          <ac:chgData name="Bloom PhD, Jesse D" userId="e17e4af4-92ba-4f4f-89d8-f6d4f5501821" providerId="ADAL" clId="{0BEA380E-990E-F440-8409-A46B3BA4865E}" dt="2020-04-20T18:14:36.433" v="2"/>
+          <ac:grpSpMkLst>
+            <pc:docMk/>
+            <pc:sldMk cId="4002544939" sldId="256"/>
+            <ac:grpSpMk id="63" creationId="{99480EAB-7E97-7E46-B092-A59A91E8E8C8}"/>
+          </ac:grpSpMkLst>
+        </pc:grpChg>
+        <pc:grpChg chg="add mod">
+          <ac:chgData name="Bloom PhD, Jesse D" userId="e17e4af4-92ba-4f4f-89d8-f6d4f5501821" providerId="ADAL" clId="{0BEA380E-990E-F440-8409-A46B3BA4865E}" dt="2020-04-20T18:14:54.135" v="5"/>
+          <ac:grpSpMkLst>
+            <pc:docMk/>
+            <pc:sldMk cId="4002544939" sldId="256"/>
+            <ac:grpSpMk id="70" creationId="{2CC2D490-FB9A-814D-9B02-7A48780F9355}"/>
+          </ac:grpSpMkLst>
+        </pc:grpChg>
+        <pc:grpChg chg="mod">
+          <ac:chgData name="Bloom PhD, Jesse D" userId="e17e4af4-92ba-4f4f-89d8-f6d4f5501821" providerId="ADAL" clId="{0BEA380E-990E-F440-8409-A46B3BA4865E}" dt="2020-04-20T18:14:54.135" v="5"/>
+          <ac:grpSpMkLst>
+            <pc:docMk/>
+            <pc:sldMk cId="4002544939" sldId="256"/>
+            <ac:grpSpMk id="72" creationId="{3AF85463-1FE1-534D-8189-16C044F23930}"/>
+          </ac:grpSpMkLst>
+        </pc:grpChg>
+        <pc:grpChg chg="mod">
+          <ac:chgData name="Bloom PhD, Jesse D" userId="e17e4af4-92ba-4f4f-89d8-f6d4f5501821" providerId="ADAL" clId="{0BEA380E-990E-F440-8409-A46B3BA4865E}" dt="2020-04-20T18:14:54.135" v="5"/>
+          <ac:grpSpMkLst>
+            <pc:docMk/>
+            <pc:sldMk cId="4002544939" sldId="256"/>
+            <ac:grpSpMk id="89" creationId="{33365247-A6DB-0147-9A01-F3B8A8F2051D}"/>
+          </ac:grpSpMkLst>
+        </pc:grpChg>
+        <pc:grpChg chg="mod">
+          <ac:chgData name="Bloom PhD, Jesse D" userId="e17e4af4-92ba-4f4f-89d8-f6d4f5501821" providerId="ADAL" clId="{0BEA380E-990E-F440-8409-A46B3BA4865E}" dt="2020-04-20T18:14:54.135" v="5"/>
+          <ac:grpSpMkLst>
+            <pc:docMk/>
+            <pc:sldMk cId="4002544939" sldId="256"/>
+            <ac:grpSpMk id="90" creationId="{17A89CFF-58F7-E44E-8BFC-BDC90C22A3D5}"/>
+          </ac:grpSpMkLst>
+        </pc:grpChg>
+        <pc:grpChg chg="mod">
+          <ac:chgData name="Bloom PhD, Jesse D" userId="e17e4af4-92ba-4f4f-89d8-f6d4f5501821" providerId="ADAL" clId="{0BEA380E-990E-F440-8409-A46B3BA4865E}" dt="2020-04-20T18:14:54.135" v="5"/>
+          <ac:grpSpMkLst>
+            <pc:docMk/>
+            <pc:sldMk cId="4002544939" sldId="256"/>
+            <ac:grpSpMk id="91" creationId="{26B26385-F39D-9E45-AAC1-0DAF15418F32}"/>
+          </ac:grpSpMkLst>
+        </pc:grpChg>
+        <pc:picChg chg="mod">
+          <ac:chgData name="Bloom PhD, Jesse D" userId="e17e4af4-92ba-4f4f-89d8-f6d4f5501821" providerId="ADAL" clId="{0BEA380E-990E-F440-8409-A46B3BA4865E}" dt="2020-04-20T18:14:36.433" v="2"/>
+          <ac:picMkLst>
+            <pc:docMk/>
+            <pc:sldMk cId="4002544939" sldId="256"/>
+            <ac:picMk id="37" creationId="{7B910B56-5EF4-F842-A169-9233F3EC8BED}"/>
+          </ac:picMkLst>
+        </pc:picChg>
+        <pc:picChg chg="mod">
+          <ac:chgData name="Bloom PhD, Jesse D" userId="e17e4af4-92ba-4f4f-89d8-f6d4f5501821" providerId="ADAL" clId="{0BEA380E-990E-F440-8409-A46B3BA4865E}" dt="2020-04-20T18:14:36.433" v="2"/>
+          <ac:picMkLst>
+            <pc:docMk/>
+            <pc:sldMk cId="4002544939" sldId="256"/>
+            <ac:picMk id="49" creationId="{70CDBE2E-6303-3747-9BCA-881EB22FF44B}"/>
+          </ac:picMkLst>
+        </pc:picChg>
+        <pc:picChg chg="mod">
+          <ac:chgData name="Bloom PhD, Jesse D" userId="e17e4af4-92ba-4f4f-89d8-f6d4f5501821" providerId="ADAL" clId="{0BEA380E-990E-F440-8409-A46B3BA4865E}" dt="2020-04-20T18:14:36.433" v="2"/>
+          <ac:picMkLst>
+            <pc:docMk/>
+            <pc:sldMk cId="4002544939" sldId="256"/>
+            <ac:picMk id="50" creationId="{8C66D78F-4F5D-1844-A4DE-69CD3A0CBBA2}"/>
+          </ac:picMkLst>
+        </pc:picChg>
+        <pc:picChg chg="mod">
+          <ac:chgData name="Bloom PhD, Jesse D" userId="e17e4af4-92ba-4f4f-89d8-f6d4f5501821" providerId="ADAL" clId="{0BEA380E-990E-F440-8409-A46B3BA4865E}" dt="2020-04-20T18:14:36.433" v="2"/>
+          <ac:picMkLst>
+            <pc:docMk/>
+            <pc:sldMk cId="4002544939" sldId="256"/>
+            <ac:picMk id="52" creationId="{BCB28F9C-0E61-4644-A7D5-986E466AE486}"/>
+          </ac:picMkLst>
+        </pc:picChg>
+        <pc:picChg chg="mod">
+          <ac:chgData name="Bloom PhD, Jesse D" userId="e17e4af4-92ba-4f4f-89d8-f6d4f5501821" providerId="ADAL" clId="{0BEA380E-990E-F440-8409-A46B3BA4865E}" dt="2020-04-20T18:14:36.433" v="2"/>
+          <ac:picMkLst>
+            <pc:docMk/>
+            <pc:sldMk cId="4002544939" sldId="256"/>
+            <ac:picMk id="55" creationId="{CD2BC234-7B28-374E-80FC-D659CCD9C743}"/>
+          </ac:picMkLst>
+        </pc:picChg>
+        <pc:picChg chg="mod">
+          <ac:chgData name="Bloom PhD, Jesse D" userId="e17e4af4-92ba-4f4f-89d8-f6d4f5501821" providerId="ADAL" clId="{0BEA380E-990E-F440-8409-A46B3BA4865E}" dt="2020-04-20T18:14:36.433" v="2"/>
+          <ac:picMkLst>
+            <pc:docMk/>
+            <pc:sldMk cId="4002544939" sldId="256"/>
+            <ac:picMk id="56" creationId="{4BA12CDF-46BA-F844-AFC1-1951ADC2B1E9}"/>
+          </ac:picMkLst>
+        </pc:picChg>
+        <pc:picChg chg="mod">
+          <ac:chgData name="Bloom PhD, Jesse D" userId="e17e4af4-92ba-4f4f-89d8-f6d4f5501821" providerId="ADAL" clId="{0BEA380E-990E-F440-8409-A46B3BA4865E}" dt="2020-04-20T18:14:36.433" v="2"/>
+          <ac:picMkLst>
+            <pc:docMk/>
+            <pc:sldMk cId="4002544939" sldId="256"/>
+            <ac:picMk id="57" creationId="{0E511890-5981-6444-8A34-B1BAF866BF1E}"/>
+          </ac:picMkLst>
+        </pc:picChg>
+        <pc:picChg chg="mod">
+          <ac:chgData name="Bloom PhD, Jesse D" userId="e17e4af4-92ba-4f4f-89d8-f6d4f5501821" providerId="ADAL" clId="{0BEA380E-990E-F440-8409-A46B3BA4865E}" dt="2020-04-20T18:14:36.433" v="2"/>
+          <ac:picMkLst>
+            <pc:docMk/>
+            <pc:sldMk cId="4002544939" sldId="256"/>
+            <ac:picMk id="58" creationId="{122DCABD-7916-844D-B9D7-BB83971FD7E9}"/>
+          </ac:picMkLst>
+        </pc:picChg>
+        <pc:picChg chg="mod">
+          <ac:chgData name="Bloom PhD, Jesse D" userId="e17e4af4-92ba-4f4f-89d8-f6d4f5501821" providerId="ADAL" clId="{0BEA380E-990E-F440-8409-A46B3BA4865E}" dt="2020-04-20T18:14:36.433" v="2"/>
+          <ac:picMkLst>
+            <pc:docMk/>
+            <pc:sldMk cId="4002544939" sldId="256"/>
+            <ac:picMk id="60" creationId="{AB4C7BC9-C317-C746-8D51-EB960269BAED}"/>
+          </ac:picMkLst>
+        </pc:picChg>
+        <pc:picChg chg="mod">
+          <ac:chgData name="Bloom PhD, Jesse D" userId="e17e4af4-92ba-4f4f-89d8-f6d4f5501821" providerId="ADAL" clId="{0BEA380E-990E-F440-8409-A46B3BA4865E}" dt="2020-04-20T18:14:54.135" v="5"/>
+          <ac:picMkLst>
+            <pc:docMk/>
+            <pc:sldMk cId="4002544939" sldId="256"/>
+            <ac:picMk id="71" creationId="{EF86D33E-52E6-5943-AF52-B965E43154F2}"/>
+          </ac:picMkLst>
+        </pc:picChg>
+        <pc:picChg chg="mod">
+          <ac:chgData name="Bloom PhD, Jesse D" userId="e17e4af4-92ba-4f4f-89d8-f6d4f5501821" providerId="ADAL" clId="{0BEA380E-990E-F440-8409-A46B3BA4865E}" dt="2020-04-20T18:14:54.135" v="5"/>
+          <ac:picMkLst>
+            <pc:docMk/>
+            <pc:sldMk cId="4002544939" sldId="256"/>
+            <ac:picMk id="79" creationId="{1D6D2E8E-BF3E-194F-AD2B-180F8CB28C29}"/>
+          </ac:picMkLst>
+        </pc:picChg>
+        <pc:picChg chg="mod">
+          <ac:chgData name="Bloom PhD, Jesse D" userId="e17e4af4-92ba-4f4f-89d8-f6d4f5501821" providerId="ADAL" clId="{0BEA380E-990E-F440-8409-A46B3BA4865E}" dt="2020-04-20T18:14:54.135" v="5"/>
+          <ac:picMkLst>
+            <pc:docMk/>
+            <pc:sldMk cId="4002544939" sldId="256"/>
+            <ac:picMk id="80" creationId="{9A270CFE-F746-5F4A-A95A-550B74F2B4D2}"/>
+          </ac:picMkLst>
+        </pc:picChg>
+        <pc:picChg chg="mod">
+          <ac:chgData name="Bloom PhD, Jesse D" userId="e17e4af4-92ba-4f4f-89d8-f6d4f5501821" providerId="ADAL" clId="{0BEA380E-990E-F440-8409-A46B3BA4865E}" dt="2020-04-20T18:14:54.135" v="5"/>
+          <ac:picMkLst>
+            <pc:docMk/>
+            <pc:sldMk cId="4002544939" sldId="256"/>
+            <ac:picMk id="82" creationId="{9003552E-E384-1440-B8AF-568BBAB2497D}"/>
+          </ac:picMkLst>
+        </pc:picChg>
+        <pc:picChg chg="mod">
+          <ac:chgData name="Bloom PhD, Jesse D" userId="e17e4af4-92ba-4f4f-89d8-f6d4f5501821" providerId="ADAL" clId="{0BEA380E-990E-F440-8409-A46B3BA4865E}" dt="2020-04-20T18:14:54.135" v="5"/>
+          <ac:picMkLst>
+            <pc:docMk/>
+            <pc:sldMk cId="4002544939" sldId="256"/>
+            <ac:picMk id="83" creationId="{4FCD2AAA-FC84-7F4C-B276-41720EECD003}"/>
+          </ac:picMkLst>
+        </pc:picChg>
+        <pc:picChg chg="mod">
+          <ac:chgData name="Bloom PhD, Jesse D" userId="e17e4af4-92ba-4f4f-89d8-f6d4f5501821" providerId="ADAL" clId="{0BEA380E-990E-F440-8409-A46B3BA4865E}" dt="2020-04-20T18:14:54.135" v="5"/>
+          <ac:picMkLst>
+            <pc:docMk/>
+            <pc:sldMk cId="4002544939" sldId="256"/>
+            <ac:picMk id="84" creationId="{0C918422-FE28-004C-B24A-F72883A33784}"/>
+          </ac:picMkLst>
+        </pc:picChg>
+        <pc:picChg chg="mod">
+          <ac:chgData name="Bloom PhD, Jesse D" userId="e17e4af4-92ba-4f4f-89d8-f6d4f5501821" providerId="ADAL" clId="{0BEA380E-990E-F440-8409-A46B3BA4865E}" dt="2020-04-20T18:14:54.135" v="5"/>
+          <ac:picMkLst>
+            <pc:docMk/>
+            <pc:sldMk cId="4002544939" sldId="256"/>
+            <ac:picMk id="85" creationId="{BF7907FB-5D83-BA4E-9587-ACA9CF1158D4}"/>
+          </ac:picMkLst>
+        </pc:picChg>
+        <pc:picChg chg="mod">
+          <ac:chgData name="Bloom PhD, Jesse D" userId="e17e4af4-92ba-4f4f-89d8-f6d4f5501821" providerId="ADAL" clId="{0BEA380E-990E-F440-8409-A46B3BA4865E}" dt="2020-04-20T18:14:54.135" v="5"/>
+          <ac:picMkLst>
+            <pc:docMk/>
+            <pc:sldMk cId="4002544939" sldId="256"/>
+            <ac:picMk id="86" creationId="{D937654F-E457-EF4C-9153-E51B1B75B78D}"/>
+          </ac:picMkLst>
+        </pc:picChg>
+        <pc:picChg chg="mod">
+          <ac:chgData name="Bloom PhD, Jesse D" userId="e17e4af4-92ba-4f4f-89d8-f6d4f5501821" providerId="ADAL" clId="{0BEA380E-990E-F440-8409-A46B3BA4865E}" dt="2020-04-20T18:14:54.135" v="5"/>
+          <ac:picMkLst>
+            <pc:docMk/>
+            <pc:sldMk cId="4002544939" sldId="256"/>
+            <ac:picMk id="88" creationId="{D211E6C9-9674-7D40-BDCE-1BFFDD167F34}"/>
+          </ac:picMkLst>
+        </pc:picChg>
+      </pc:sldChg>
+      <pc:sldMasterChg chg="modSp modSldLayout">
+        <pc:chgData name="Bloom PhD, Jesse D" userId="e17e4af4-92ba-4f4f-89d8-f6d4f5501821" providerId="ADAL" clId="{0BEA380E-990E-F440-8409-A46B3BA4865E}" dt="2020-04-20T18:14:35.083" v="1"/>
+        <pc:sldMasterMkLst>
+          <pc:docMk/>
+          <pc:sldMasterMk cId="1699699990" sldId="2147483648"/>
+        </pc:sldMasterMkLst>
+        <pc:spChg chg="mod">
+          <ac:chgData name="Bloom PhD, Jesse D" userId="e17e4af4-92ba-4f4f-89d8-f6d4f5501821" providerId="ADAL" clId="{0BEA380E-990E-F440-8409-A46B3BA4865E}" dt="2020-04-20T18:14:35.083" v="1"/>
+          <ac:spMkLst>
+            <pc:docMk/>
+            <pc:sldMasterMk cId="1699699990" sldId="2147483648"/>
+            <ac:spMk id="2" creationId="{8F917708-077B-424A-8247-574FC47C7C85}"/>
+          </ac:spMkLst>
+        </pc:spChg>
+        <pc:spChg chg="mod">
+          <ac:chgData name="Bloom PhD, Jesse D" userId="e17e4af4-92ba-4f4f-89d8-f6d4f5501821" providerId="ADAL" clId="{0BEA380E-990E-F440-8409-A46B3BA4865E}" dt="2020-04-20T18:14:35.083" v="1"/>
+          <ac:spMkLst>
+            <pc:docMk/>
+            <pc:sldMasterMk cId="1699699990" sldId="2147483648"/>
+            <ac:spMk id="3" creationId="{14591573-FA67-4548-B010-619E87EF2F61}"/>
+          </ac:spMkLst>
+        </pc:spChg>
+        <pc:spChg chg="mod">
+          <ac:chgData name="Bloom PhD, Jesse D" userId="e17e4af4-92ba-4f4f-89d8-f6d4f5501821" providerId="ADAL" clId="{0BEA380E-990E-F440-8409-A46B3BA4865E}" dt="2020-04-20T18:14:35.083" v="1"/>
+          <ac:spMkLst>
+            <pc:docMk/>
+            <pc:sldMasterMk cId="1699699990" sldId="2147483648"/>
+            <ac:spMk id="4" creationId="{F3DECA9E-7073-2249-9F93-B2A5A64B6FE1}"/>
+          </ac:spMkLst>
+        </pc:spChg>
+        <pc:spChg chg="mod">
+          <ac:chgData name="Bloom PhD, Jesse D" userId="e17e4af4-92ba-4f4f-89d8-f6d4f5501821" providerId="ADAL" clId="{0BEA380E-990E-F440-8409-A46B3BA4865E}" dt="2020-04-20T18:14:35.083" v="1"/>
+          <ac:spMkLst>
+            <pc:docMk/>
+            <pc:sldMasterMk cId="1699699990" sldId="2147483648"/>
+            <ac:spMk id="5" creationId="{2304D58B-5F9D-9C47-8147-4DDD6A4E2B00}"/>
+          </ac:spMkLst>
+        </pc:spChg>
+        <pc:spChg chg="mod">
+          <ac:chgData name="Bloom PhD, Jesse D" userId="e17e4af4-92ba-4f4f-89d8-f6d4f5501821" providerId="ADAL" clId="{0BEA380E-990E-F440-8409-A46B3BA4865E}" dt="2020-04-20T18:14:35.083" v="1"/>
+          <ac:spMkLst>
+            <pc:docMk/>
+            <pc:sldMasterMk cId="1699699990" sldId="2147483648"/>
+            <ac:spMk id="6" creationId="{53C5D6CD-7E87-5C44-93A9-DC1FAA1FF6A1}"/>
+          </ac:spMkLst>
+        </pc:spChg>
+        <pc:sldLayoutChg chg="modSp">
+          <pc:chgData name="Bloom PhD, Jesse D" userId="e17e4af4-92ba-4f4f-89d8-f6d4f5501821" providerId="ADAL" clId="{0BEA380E-990E-F440-8409-A46B3BA4865E}" dt="2020-04-20T18:14:35.083" v="1"/>
+          <pc:sldLayoutMkLst>
+            <pc:docMk/>
+            <pc:sldMasterMk cId="1699699990" sldId="2147483648"/>
+            <pc:sldLayoutMk cId="3863643667" sldId="2147483649"/>
+          </pc:sldLayoutMkLst>
+          <pc:spChg chg="mod">
+            <ac:chgData name="Bloom PhD, Jesse D" userId="e17e4af4-92ba-4f4f-89d8-f6d4f5501821" providerId="ADAL" clId="{0BEA380E-990E-F440-8409-A46B3BA4865E}" dt="2020-04-20T18:14:35.083" v="1"/>
+            <ac:spMkLst>
+              <pc:docMk/>
+              <pc:sldMasterMk cId="1699699990" sldId="2147483648"/>
+              <pc:sldLayoutMk cId="3863643667" sldId="2147483649"/>
+              <ac:spMk id="2" creationId="{8729FCEC-F006-104A-BBCF-37BA4B0B8367}"/>
+            </ac:spMkLst>
+          </pc:spChg>
+          <pc:spChg chg="mod">
+            <ac:chgData name="Bloom PhD, Jesse D" userId="e17e4af4-92ba-4f4f-89d8-f6d4f5501821" providerId="ADAL" clId="{0BEA380E-990E-F440-8409-A46B3BA4865E}" dt="2020-04-20T18:14:35.083" v="1"/>
+            <ac:spMkLst>
+              <pc:docMk/>
+              <pc:sldMasterMk cId="1699699990" sldId="2147483648"/>
+              <pc:sldLayoutMk cId="3863643667" sldId="2147483649"/>
+              <ac:spMk id="3" creationId="{2A70757E-5A91-FE4B-A633-A9CCCAB78673}"/>
+            </ac:spMkLst>
+          </pc:spChg>
+        </pc:sldLayoutChg>
+        <pc:sldLayoutChg chg="modSp">
+          <pc:chgData name="Bloom PhD, Jesse D" userId="e17e4af4-92ba-4f4f-89d8-f6d4f5501821" providerId="ADAL" clId="{0BEA380E-990E-F440-8409-A46B3BA4865E}" dt="2020-04-20T18:14:35.083" v="1"/>
+          <pc:sldLayoutMkLst>
+            <pc:docMk/>
+            <pc:sldMasterMk cId="1699699990" sldId="2147483648"/>
+            <pc:sldLayoutMk cId="2333014299" sldId="2147483651"/>
+          </pc:sldLayoutMkLst>
+          <pc:spChg chg="mod">
+            <ac:chgData name="Bloom PhD, Jesse D" userId="e17e4af4-92ba-4f4f-89d8-f6d4f5501821" providerId="ADAL" clId="{0BEA380E-990E-F440-8409-A46B3BA4865E}" dt="2020-04-20T18:14:35.083" v="1"/>
+            <ac:spMkLst>
+              <pc:docMk/>
+              <pc:sldMasterMk cId="1699699990" sldId="2147483648"/>
+              <pc:sldLayoutMk cId="2333014299" sldId="2147483651"/>
+              <ac:spMk id="2" creationId="{E6262A6B-B922-B540-B4A1-D2E2DA70AE69}"/>
+            </ac:spMkLst>
+          </pc:spChg>
+          <pc:spChg chg="mod">
+            <ac:chgData name="Bloom PhD, Jesse D" userId="e17e4af4-92ba-4f4f-89d8-f6d4f5501821" providerId="ADAL" clId="{0BEA380E-990E-F440-8409-A46B3BA4865E}" dt="2020-04-20T18:14:35.083" v="1"/>
+            <ac:spMkLst>
+              <pc:docMk/>
+              <pc:sldMasterMk cId="1699699990" sldId="2147483648"/>
+              <pc:sldLayoutMk cId="2333014299" sldId="2147483651"/>
+              <ac:spMk id="3" creationId="{B2C9540B-439D-9340-B7A1-B0188CDE759F}"/>
+            </ac:spMkLst>
+          </pc:spChg>
+        </pc:sldLayoutChg>
+        <pc:sldLayoutChg chg="modSp">
+          <pc:chgData name="Bloom PhD, Jesse D" userId="e17e4af4-92ba-4f4f-89d8-f6d4f5501821" providerId="ADAL" clId="{0BEA380E-990E-F440-8409-A46B3BA4865E}" dt="2020-04-20T18:14:35.083" v="1"/>
+          <pc:sldLayoutMkLst>
+            <pc:docMk/>
+            <pc:sldMasterMk cId="1699699990" sldId="2147483648"/>
+            <pc:sldLayoutMk cId="3029280367" sldId="2147483652"/>
+          </pc:sldLayoutMkLst>
+          <pc:spChg chg="mod">
+            <ac:chgData name="Bloom PhD, Jesse D" userId="e17e4af4-92ba-4f4f-89d8-f6d4f5501821" providerId="ADAL" clId="{0BEA380E-990E-F440-8409-A46B3BA4865E}" dt="2020-04-20T18:14:35.083" v="1"/>
+            <ac:spMkLst>
+              <pc:docMk/>
+              <pc:sldMasterMk cId="1699699990" sldId="2147483648"/>
+              <pc:sldLayoutMk cId="3029280367" sldId="2147483652"/>
+              <ac:spMk id="3" creationId="{87D9ED6A-AAF7-2C45-BAC8-E31CFF6EA612}"/>
+            </ac:spMkLst>
+          </pc:spChg>
+          <pc:spChg chg="mod">
+            <ac:chgData name="Bloom PhD, Jesse D" userId="e17e4af4-92ba-4f4f-89d8-f6d4f5501821" providerId="ADAL" clId="{0BEA380E-990E-F440-8409-A46B3BA4865E}" dt="2020-04-20T18:14:35.083" v="1"/>
+            <ac:spMkLst>
+              <pc:docMk/>
+              <pc:sldMasterMk cId="1699699990" sldId="2147483648"/>
+              <pc:sldLayoutMk cId="3029280367" sldId="2147483652"/>
+              <ac:spMk id="4" creationId="{4A9589E7-5AD7-914B-8399-23F76171F757}"/>
+            </ac:spMkLst>
+          </pc:spChg>
+        </pc:sldLayoutChg>
+        <pc:sldLayoutChg chg="modSp">
+          <pc:chgData name="Bloom PhD, Jesse D" userId="e17e4af4-92ba-4f4f-89d8-f6d4f5501821" providerId="ADAL" clId="{0BEA380E-990E-F440-8409-A46B3BA4865E}" dt="2020-04-20T18:14:35.083" v="1"/>
+          <pc:sldLayoutMkLst>
+            <pc:docMk/>
+            <pc:sldMasterMk cId="1699699990" sldId="2147483648"/>
+            <pc:sldLayoutMk cId="1760712501" sldId="2147483653"/>
+          </pc:sldLayoutMkLst>
+          <pc:spChg chg="mod">
+            <ac:chgData name="Bloom PhD, Jesse D" userId="e17e4af4-92ba-4f4f-89d8-f6d4f5501821" providerId="ADAL" clId="{0BEA380E-990E-F440-8409-A46B3BA4865E}" dt="2020-04-20T18:14:35.083" v="1"/>
+            <ac:spMkLst>
+              <pc:docMk/>
+              <pc:sldMasterMk cId="1699699990" sldId="2147483648"/>
+              <pc:sldLayoutMk cId="1760712501" sldId="2147483653"/>
+              <ac:spMk id="2" creationId="{968CA58E-93F1-524F-A714-88163ACBF71F}"/>
+            </ac:spMkLst>
+          </pc:spChg>
+          <pc:spChg chg="mod">
+            <ac:chgData name="Bloom PhD, Jesse D" userId="e17e4af4-92ba-4f4f-89d8-f6d4f5501821" providerId="ADAL" clId="{0BEA380E-990E-F440-8409-A46B3BA4865E}" dt="2020-04-20T18:14:35.083" v="1"/>
+            <ac:spMkLst>
+              <pc:docMk/>
+              <pc:sldMasterMk cId="1699699990" sldId="2147483648"/>
+              <pc:sldLayoutMk cId="1760712501" sldId="2147483653"/>
+              <ac:spMk id="3" creationId="{425AC7B9-511F-7247-9AC5-3A3C6873633D}"/>
+            </ac:spMkLst>
+          </pc:spChg>
+          <pc:spChg chg="mod">
+            <ac:chgData name="Bloom PhD, Jesse D" userId="e17e4af4-92ba-4f4f-89d8-f6d4f5501821" providerId="ADAL" clId="{0BEA380E-990E-F440-8409-A46B3BA4865E}" dt="2020-04-20T18:14:35.083" v="1"/>
+            <ac:spMkLst>
+              <pc:docMk/>
+              <pc:sldMasterMk cId="1699699990" sldId="2147483648"/>
+              <pc:sldLayoutMk cId="1760712501" sldId="2147483653"/>
+              <ac:spMk id="4" creationId="{6EACFB2F-EF95-3B47-96AE-0C8279FD6F5F}"/>
+            </ac:spMkLst>
+          </pc:spChg>
+          <pc:spChg chg="mod">
+            <ac:chgData name="Bloom PhD, Jesse D" userId="e17e4af4-92ba-4f4f-89d8-f6d4f5501821" providerId="ADAL" clId="{0BEA380E-990E-F440-8409-A46B3BA4865E}" dt="2020-04-20T18:14:35.083" v="1"/>
+            <ac:spMkLst>
+              <pc:docMk/>
+              <pc:sldMasterMk cId="1699699990" sldId="2147483648"/>
+              <pc:sldLayoutMk cId="1760712501" sldId="2147483653"/>
+              <ac:spMk id="5" creationId="{F2C6B8B1-1646-ED4A-A835-9B6A1B3F51B4}"/>
+            </ac:spMkLst>
+          </pc:spChg>
+          <pc:spChg chg="mod">
+            <ac:chgData name="Bloom PhD, Jesse D" userId="e17e4af4-92ba-4f4f-89d8-f6d4f5501821" providerId="ADAL" clId="{0BEA380E-990E-F440-8409-A46B3BA4865E}" dt="2020-04-20T18:14:35.083" v="1"/>
+            <ac:spMkLst>
+              <pc:docMk/>
+              <pc:sldMasterMk cId="1699699990" sldId="2147483648"/>
+              <pc:sldLayoutMk cId="1760712501" sldId="2147483653"/>
+              <ac:spMk id="6" creationId="{A210DBCC-EEEF-434F-B4C2-6FBC06553900}"/>
+            </ac:spMkLst>
+          </pc:spChg>
+        </pc:sldLayoutChg>
+        <pc:sldLayoutChg chg="modSp">
+          <pc:chgData name="Bloom PhD, Jesse D" userId="e17e4af4-92ba-4f4f-89d8-f6d4f5501821" providerId="ADAL" clId="{0BEA380E-990E-F440-8409-A46B3BA4865E}" dt="2020-04-20T18:14:35.083" v="1"/>
+          <pc:sldLayoutMkLst>
+            <pc:docMk/>
+            <pc:sldMasterMk cId="1699699990" sldId="2147483648"/>
+            <pc:sldLayoutMk cId="307566853" sldId="2147483656"/>
+          </pc:sldLayoutMkLst>
+          <pc:spChg chg="mod">
+            <ac:chgData name="Bloom PhD, Jesse D" userId="e17e4af4-92ba-4f4f-89d8-f6d4f5501821" providerId="ADAL" clId="{0BEA380E-990E-F440-8409-A46B3BA4865E}" dt="2020-04-20T18:14:35.083" v="1"/>
+            <ac:spMkLst>
+              <pc:docMk/>
+              <pc:sldMasterMk cId="1699699990" sldId="2147483648"/>
+              <pc:sldLayoutMk cId="307566853" sldId="2147483656"/>
+              <ac:spMk id="2" creationId="{DDDBC59C-D487-C242-9ACF-E60BE15B56C3}"/>
+            </ac:spMkLst>
+          </pc:spChg>
+          <pc:spChg chg="mod">
+            <ac:chgData name="Bloom PhD, Jesse D" userId="e17e4af4-92ba-4f4f-89d8-f6d4f5501821" providerId="ADAL" clId="{0BEA380E-990E-F440-8409-A46B3BA4865E}" dt="2020-04-20T18:14:35.083" v="1"/>
+            <ac:spMkLst>
+              <pc:docMk/>
+              <pc:sldMasterMk cId="1699699990" sldId="2147483648"/>
+              <pc:sldLayoutMk cId="307566853" sldId="2147483656"/>
+              <ac:spMk id="3" creationId="{EFAB8420-DD75-A841-A9A4-AC3B707D4BAC}"/>
+            </ac:spMkLst>
+          </pc:spChg>
+          <pc:spChg chg="mod">
+            <ac:chgData name="Bloom PhD, Jesse D" userId="e17e4af4-92ba-4f4f-89d8-f6d4f5501821" providerId="ADAL" clId="{0BEA380E-990E-F440-8409-A46B3BA4865E}" dt="2020-04-20T18:14:35.083" v="1"/>
+            <ac:spMkLst>
+              <pc:docMk/>
+              <pc:sldMasterMk cId="1699699990" sldId="2147483648"/>
+              <pc:sldLayoutMk cId="307566853" sldId="2147483656"/>
+              <ac:spMk id="4" creationId="{A2437F99-86C2-634B-8538-92F1293C57FC}"/>
+            </ac:spMkLst>
+          </pc:spChg>
+        </pc:sldLayoutChg>
+        <pc:sldLayoutChg chg="modSp">
+          <pc:chgData name="Bloom PhD, Jesse D" userId="e17e4af4-92ba-4f4f-89d8-f6d4f5501821" providerId="ADAL" clId="{0BEA380E-990E-F440-8409-A46B3BA4865E}" dt="2020-04-20T18:14:35.083" v="1"/>
+          <pc:sldLayoutMkLst>
+            <pc:docMk/>
+            <pc:sldMasterMk cId="1699699990" sldId="2147483648"/>
+            <pc:sldLayoutMk cId="2402241040" sldId="2147483657"/>
+          </pc:sldLayoutMkLst>
+          <pc:spChg chg="mod">
+            <ac:chgData name="Bloom PhD, Jesse D" userId="e17e4af4-92ba-4f4f-89d8-f6d4f5501821" providerId="ADAL" clId="{0BEA380E-990E-F440-8409-A46B3BA4865E}" dt="2020-04-20T18:14:35.083" v="1"/>
+            <ac:spMkLst>
+              <pc:docMk/>
+              <pc:sldMasterMk cId="1699699990" sldId="2147483648"/>
+              <pc:sldLayoutMk cId="2402241040" sldId="2147483657"/>
+              <ac:spMk id="2" creationId="{E93D0A6D-4D63-9243-B20A-7A43B6B61295}"/>
+            </ac:spMkLst>
+          </pc:spChg>
+          <pc:spChg chg="mod">
+            <ac:chgData name="Bloom PhD, Jesse D" userId="e17e4af4-92ba-4f4f-89d8-f6d4f5501821" providerId="ADAL" clId="{0BEA380E-990E-F440-8409-A46B3BA4865E}" dt="2020-04-20T18:14:35.083" v="1"/>
+            <ac:spMkLst>
+              <pc:docMk/>
+              <pc:sldMasterMk cId="1699699990" sldId="2147483648"/>
+              <pc:sldLayoutMk cId="2402241040" sldId="2147483657"/>
+              <ac:spMk id="3" creationId="{A4643E54-F805-B741-9908-EACDD1E3D67B}"/>
+            </ac:spMkLst>
+          </pc:spChg>
+          <pc:spChg chg="mod">
+            <ac:chgData name="Bloom PhD, Jesse D" userId="e17e4af4-92ba-4f4f-89d8-f6d4f5501821" providerId="ADAL" clId="{0BEA380E-990E-F440-8409-A46B3BA4865E}" dt="2020-04-20T18:14:35.083" v="1"/>
+            <ac:spMkLst>
+              <pc:docMk/>
+              <pc:sldMasterMk cId="1699699990" sldId="2147483648"/>
+              <pc:sldLayoutMk cId="2402241040" sldId="2147483657"/>
+              <ac:spMk id="4" creationId="{C740557C-F911-5F41-8B89-C9223CB94609}"/>
+            </ac:spMkLst>
+          </pc:spChg>
+        </pc:sldLayoutChg>
+        <pc:sldLayoutChg chg="modSp">
+          <pc:chgData name="Bloom PhD, Jesse D" userId="e17e4af4-92ba-4f4f-89d8-f6d4f5501821" providerId="ADAL" clId="{0BEA380E-990E-F440-8409-A46B3BA4865E}" dt="2020-04-20T18:14:35.083" v="1"/>
+          <pc:sldLayoutMkLst>
+            <pc:docMk/>
+            <pc:sldMasterMk cId="1699699990" sldId="2147483648"/>
+            <pc:sldLayoutMk cId="2925570438" sldId="2147483659"/>
+          </pc:sldLayoutMkLst>
+          <pc:spChg chg="mod">
+            <ac:chgData name="Bloom PhD, Jesse D" userId="e17e4af4-92ba-4f4f-89d8-f6d4f5501821" providerId="ADAL" clId="{0BEA380E-990E-F440-8409-A46B3BA4865E}" dt="2020-04-20T18:14:35.083" v="1"/>
+            <ac:spMkLst>
+              <pc:docMk/>
+              <pc:sldMasterMk cId="1699699990" sldId="2147483648"/>
+              <pc:sldLayoutMk cId="2925570438" sldId="2147483659"/>
+              <ac:spMk id="2" creationId="{ED7792B9-7997-6C4E-B4FF-DBF9ECB21D44}"/>
+            </ac:spMkLst>
+          </pc:spChg>
+          <pc:spChg chg="mod">
+            <ac:chgData name="Bloom PhD, Jesse D" userId="e17e4af4-92ba-4f4f-89d8-f6d4f5501821" providerId="ADAL" clId="{0BEA380E-990E-F440-8409-A46B3BA4865E}" dt="2020-04-20T18:14:35.083" v="1"/>
+            <ac:spMkLst>
+              <pc:docMk/>
+              <pc:sldMasterMk cId="1699699990" sldId="2147483648"/>
+              <pc:sldLayoutMk cId="2925570438" sldId="2147483659"/>
+              <ac:spMk id="3" creationId="{FADCCA66-95B7-A645-A0FC-07AA78CB448F}"/>
+            </ac:spMkLst>
+          </pc:spChg>
+        </pc:sldLayoutChg>
+      </pc:sldMasterChg>
+      <pc:sldMasterChg chg="modSp modSldLayout">
+        <pc:chgData name="Bloom PhD, Jesse D" userId="e17e4af4-92ba-4f4f-89d8-f6d4f5501821" providerId="ADAL" clId="{0BEA380E-990E-F440-8409-A46B3BA4865E}" dt="2020-04-20T18:14:52.900" v="4"/>
+        <pc:sldMasterMkLst>
+          <pc:docMk/>
+          <pc:sldMasterMk cId="1178353171" sldId="2147483660"/>
+        </pc:sldMasterMkLst>
+        <pc:spChg chg="mod">
+          <ac:chgData name="Bloom PhD, Jesse D" userId="e17e4af4-92ba-4f4f-89d8-f6d4f5501821" providerId="ADAL" clId="{0BEA380E-990E-F440-8409-A46B3BA4865E}" dt="2020-04-20T18:14:52.900" v="4"/>
+          <ac:spMkLst>
+            <pc:docMk/>
+            <pc:sldMasterMk cId="1178353171" sldId="2147483660"/>
+            <ac:spMk id="2" creationId="{00000000-0000-0000-0000-000000000000}"/>
+          </ac:spMkLst>
+        </pc:spChg>
+        <pc:spChg chg="mod">
+          <ac:chgData name="Bloom PhD, Jesse D" userId="e17e4af4-92ba-4f4f-89d8-f6d4f5501821" providerId="ADAL" clId="{0BEA380E-990E-F440-8409-A46B3BA4865E}" dt="2020-04-20T18:14:52.900" v="4"/>
+          <ac:spMkLst>
+            <pc:docMk/>
+            <pc:sldMasterMk cId="1178353171" sldId="2147483660"/>
+            <ac:spMk id="3" creationId="{00000000-0000-0000-0000-000000000000}"/>
+          </ac:spMkLst>
+        </pc:spChg>
+        <pc:spChg chg="mod">
+          <ac:chgData name="Bloom PhD, Jesse D" userId="e17e4af4-92ba-4f4f-89d8-f6d4f5501821" providerId="ADAL" clId="{0BEA380E-990E-F440-8409-A46B3BA4865E}" dt="2020-04-20T18:14:52.900" v="4"/>
+          <ac:spMkLst>
+            <pc:docMk/>
+            <pc:sldMasterMk cId="1178353171" sldId="2147483660"/>
+            <ac:spMk id="4" creationId="{00000000-0000-0000-0000-000000000000}"/>
+          </ac:spMkLst>
+        </pc:spChg>
+        <pc:spChg chg="mod">
+          <ac:chgData name="Bloom PhD, Jesse D" userId="e17e4af4-92ba-4f4f-89d8-f6d4f5501821" providerId="ADAL" clId="{0BEA380E-990E-F440-8409-A46B3BA4865E}" dt="2020-04-20T18:14:52.900" v="4"/>
+          <ac:spMkLst>
+            <pc:docMk/>
+            <pc:sldMasterMk cId="1178353171" sldId="2147483660"/>
+            <ac:spMk id="5" creationId="{00000000-0000-0000-0000-000000000000}"/>
+          </ac:spMkLst>
+        </pc:spChg>
+        <pc:spChg chg="mod">
+          <ac:chgData name="Bloom PhD, Jesse D" userId="e17e4af4-92ba-4f4f-89d8-f6d4f5501821" providerId="ADAL" clId="{0BEA380E-990E-F440-8409-A46B3BA4865E}" dt="2020-04-20T18:14:52.900" v="4"/>
+          <ac:spMkLst>
+            <pc:docMk/>
+            <pc:sldMasterMk cId="1178353171" sldId="2147483660"/>
+            <ac:spMk id="6" creationId="{00000000-0000-0000-0000-000000000000}"/>
+          </ac:spMkLst>
+        </pc:spChg>
+        <pc:sldLayoutChg chg="modSp">
+          <pc:chgData name="Bloom PhD, Jesse D" userId="e17e4af4-92ba-4f4f-89d8-f6d4f5501821" providerId="ADAL" clId="{0BEA380E-990E-F440-8409-A46B3BA4865E}" dt="2020-04-20T18:14:52.900" v="4"/>
+          <pc:sldLayoutMkLst>
+            <pc:docMk/>
+            <pc:sldMasterMk cId="1178353171" sldId="2147483660"/>
+            <pc:sldLayoutMk cId="3788799717" sldId="2147483661"/>
+          </pc:sldLayoutMkLst>
+          <pc:spChg chg="mod">
+            <ac:chgData name="Bloom PhD, Jesse D" userId="e17e4af4-92ba-4f4f-89d8-f6d4f5501821" providerId="ADAL" clId="{0BEA380E-990E-F440-8409-A46B3BA4865E}" dt="2020-04-20T18:14:52.900" v="4"/>
+            <ac:spMkLst>
+              <pc:docMk/>
+              <pc:sldMasterMk cId="1178353171" sldId="2147483660"/>
+              <pc:sldLayoutMk cId="3788799717" sldId="2147483661"/>
+              <ac:spMk id="2" creationId="{00000000-0000-0000-0000-000000000000}"/>
+            </ac:spMkLst>
+          </pc:spChg>
+          <pc:spChg chg="mod">
+            <ac:chgData name="Bloom PhD, Jesse D" userId="e17e4af4-92ba-4f4f-89d8-f6d4f5501821" providerId="ADAL" clId="{0BEA380E-990E-F440-8409-A46B3BA4865E}" dt="2020-04-20T18:14:52.900" v="4"/>
+            <ac:spMkLst>
+              <pc:docMk/>
+              <pc:sldMasterMk cId="1178353171" sldId="2147483660"/>
+              <pc:sldLayoutMk cId="3788799717" sldId="2147483661"/>
+              <ac:spMk id="3" creationId="{00000000-0000-0000-0000-000000000000}"/>
+            </ac:spMkLst>
+          </pc:spChg>
+        </pc:sldLayoutChg>
+        <pc:sldLayoutChg chg="modSp">
+          <pc:chgData name="Bloom PhD, Jesse D" userId="e17e4af4-92ba-4f4f-89d8-f6d4f5501821" providerId="ADAL" clId="{0BEA380E-990E-F440-8409-A46B3BA4865E}" dt="2020-04-20T18:14:52.900" v="4"/>
+          <pc:sldLayoutMkLst>
+            <pc:docMk/>
+            <pc:sldMasterMk cId="1178353171" sldId="2147483660"/>
+            <pc:sldLayoutMk cId="4135412706" sldId="2147483663"/>
+          </pc:sldLayoutMkLst>
+          <pc:spChg chg="mod">
+            <ac:chgData name="Bloom PhD, Jesse D" userId="e17e4af4-92ba-4f4f-89d8-f6d4f5501821" providerId="ADAL" clId="{0BEA380E-990E-F440-8409-A46B3BA4865E}" dt="2020-04-20T18:14:52.900" v="4"/>
+            <ac:spMkLst>
+              <pc:docMk/>
+              <pc:sldMasterMk cId="1178353171" sldId="2147483660"/>
+              <pc:sldLayoutMk cId="4135412706" sldId="2147483663"/>
+              <ac:spMk id="2" creationId="{00000000-0000-0000-0000-000000000000}"/>
+            </ac:spMkLst>
+          </pc:spChg>
+          <pc:spChg chg="mod">
+            <ac:chgData name="Bloom PhD, Jesse D" userId="e17e4af4-92ba-4f4f-89d8-f6d4f5501821" providerId="ADAL" clId="{0BEA380E-990E-F440-8409-A46B3BA4865E}" dt="2020-04-20T18:14:52.900" v="4"/>
+            <ac:spMkLst>
+              <pc:docMk/>
+              <pc:sldMasterMk cId="1178353171" sldId="2147483660"/>
+              <pc:sldLayoutMk cId="4135412706" sldId="2147483663"/>
+              <ac:spMk id="3" creationId="{00000000-0000-0000-0000-000000000000}"/>
+            </ac:spMkLst>
+          </pc:spChg>
+        </pc:sldLayoutChg>
+        <pc:sldLayoutChg chg="modSp">
+          <pc:chgData name="Bloom PhD, Jesse D" userId="e17e4af4-92ba-4f4f-89d8-f6d4f5501821" providerId="ADAL" clId="{0BEA380E-990E-F440-8409-A46B3BA4865E}" dt="2020-04-20T18:14:52.900" v="4"/>
+          <pc:sldLayoutMkLst>
+            <pc:docMk/>
+            <pc:sldMasterMk cId="1178353171" sldId="2147483660"/>
+            <pc:sldLayoutMk cId="4196831669" sldId="2147483664"/>
+          </pc:sldLayoutMkLst>
+          <pc:spChg chg="mod">
+            <ac:chgData name="Bloom PhD, Jesse D" userId="e17e4af4-92ba-4f4f-89d8-f6d4f5501821" providerId="ADAL" clId="{0BEA380E-990E-F440-8409-A46B3BA4865E}" dt="2020-04-20T18:14:52.900" v="4"/>
+            <ac:spMkLst>
+              <pc:docMk/>
+              <pc:sldMasterMk cId="1178353171" sldId="2147483660"/>
+              <pc:sldLayoutMk cId="4196831669" sldId="2147483664"/>
+              <ac:spMk id="3" creationId="{00000000-0000-0000-0000-000000000000}"/>
+            </ac:spMkLst>
+          </pc:spChg>
+          <pc:spChg chg="mod">
+            <ac:chgData name="Bloom PhD, Jesse D" userId="e17e4af4-92ba-4f4f-89d8-f6d4f5501821" providerId="ADAL" clId="{0BEA380E-990E-F440-8409-A46B3BA4865E}" dt="2020-04-20T18:14:52.900" v="4"/>
+            <ac:spMkLst>
+              <pc:docMk/>
+              <pc:sldMasterMk cId="1178353171" sldId="2147483660"/>
+              <pc:sldLayoutMk cId="4196831669" sldId="2147483664"/>
+              <ac:spMk id="4" creationId="{00000000-0000-0000-0000-000000000000}"/>
+            </ac:spMkLst>
+          </pc:spChg>
+        </pc:sldLayoutChg>
+        <pc:sldLayoutChg chg="modSp">
+          <pc:chgData name="Bloom PhD, Jesse D" userId="e17e4af4-92ba-4f4f-89d8-f6d4f5501821" providerId="ADAL" clId="{0BEA380E-990E-F440-8409-A46B3BA4865E}" dt="2020-04-20T18:14:52.900" v="4"/>
+          <pc:sldLayoutMkLst>
+            <pc:docMk/>
+            <pc:sldMasterMk cId="1178353171" sldId="2147483660"/>
+            <pc:sldLayoutMk cId="2925986300" sldId="2147483665"/>
+          </pc:sldLayoutMkLst>
+          <pc:spChg chg="mod">
+            <ac:chgData name="Bloom PhD, Jesse D" userId="e17e4af4-92ba-4f4f-89d8-f6d4f5501821" providerId="ADAL" clId="{0BEA380E-990E-F440-8409-A46B3BA4865E}" dt="2020-04-20T18:14:52.900" v="4"/>
+            <ac:spMkLst>
+              <pc:docMk/>
+              <pc:sldMasterMk cId="1178353171" sldId="2147483660"/>
+              <pc:sldLayoutMk cId="2925986300" sldId="2147483665"/>
+              <ac:spMk id="2" creationId="{00000000-0000-0000-0000-000000000000}"/>
+            </ac:spMkLst>
+          </pc:spChg>
+          <pc:spChg chg="mod">
+            <ac:chgData name="Bloom PhD, Jesse D" userId="e17e4af4-92ba-4f4f-89d8-f6d4f5501821" providerId="ADAL" clId="{0BEA380E-990E-F440-8409-A46B3BA4865E}" dt="2020-04-20T18:14:52.900" v="4"/>
+            <ac:spMkLst>
+              <pc:docMk/>
+              <pc:sldMasterMk cId="1178353171" sldId="2147483660"/>
+              <pc:sldLayoutMk cId="2925986300" sldId="2147483665"/>
+              <ac:spMk id="3" creationId="{00000000-0000-0000-0000-000000000000}"/>
+            </ac:spMkLst>
+          </pc:spChg>
+          <pc:spChg chg="mod">
+            <ac:chgData name="Bloom PhD, Jesse D" userId="e17e4af4-92ba-4f4f-89d8-f6d4f5501821" providerId="ADAL" clId="{0BEA380E-990E-F440-8409-A46B3BA4865E}" dt="2020-04-20T18:14:52.900" v="4"/>
+            <ac:spMkLst>
+              <pc:docMk/>
+              <pc:sldMasterMk cId="1178353171" sldId="2147483660"/>
+              <pc:sldLayoutMk cId="2925986300" sldId="2147483665"/>
+              <ac:spMk id="4" creationId="{00000000-0000-0000-0000-000000000000}"/>
+            </ac:spMkLst>
+          </pc:spChg>
+          <pc:spChg chg="mod">
+            <ac:chgData name="Bloom PhD, Jesse D" userId="e17e4af4-92ba-4f4f-89d8-f6d4f5501821" providerId="ADAL" clId="{0BEA380E-990E-F440-8409-A46B3BA4865E}" dt="2020-04-20T18:14:52.900" v="4"/>
+            <ac:spMkLst>
+              <pc:docMk/>
+              <pc:sldMasterMk cId="1178353171" sldId="2147483660"/>
+              <pc:sldLayoutMk cId="2925986300" sldId="2147483665"/>
+              <ac:spMk id="5" creationId="{00000000-0000-0000-0000-000000000000}"/>
+            </ac:spMkLst>
+          </pc:spChg>
+          <pc:spChg chg="mod">
+            <ac:chgData name="Bloom PhD, Jesse D" userId="e17e4af4-92ba-4f4f-89d8-f6d4f5501821" providerId="ADAL" clId="{0BEA380E-990E-F440-8409-A46B3BA4865E}" dt="2020-04-20T18:14:52.900" v="4"/>
+            <ac:spMkLst>
+              <pc:docMk/>
+              <pc:sldMasterMk cId="1178353171" sldId="2147483660"/>
+              <pc:sldLayoutMk cId="2925986300" sldId="2147483665"/>
+              <ac:spMk id="6" creationId="{00000000-0000-0000-0000-000000000000}"/>
+            </ac:spMkLst>
+          </pc:spChg>
+        </pc:sldLayoutChg>
+        <pc:sldLayoutChg chg="modSp">
+          <pc:chgData name="Bloom PhD, Jesse D" userId="e17e4af4-92ba-4f4f-89d8-f6d4f5501821" providerId="ADAL" clId="{0BEA380E-990E-F440-8409-A46B3BA4865E}" dt="2020-04-20T18:14:52.900" v="4"/>
+          <pc:sldLayoutMkLst>
+            <pc:docMk/>
+            <pc:sldMasterMk cId="1178353171" sldId="2147483660"/>
+            <pc:sldLayoutMk cId="2907885777" sldId="2147483668"/>
+          </pc:sldLayoutMkLst>
+          <pc:spChg chg="mod">
+            <ac:chgData name="Bloom PhD, Jesse D" userId="e17e4af4-92ba-4f4f-89d8-f6d4f5501821" providerId="ADAL" clId="{0BEA380E-990E-F440-8409-A46B3BA4865E}" dt="2020-04-20T18:14:52.900" v="4"/>
+            <ac:spMkLst>
+              <pc:docMk/>
+              <pc:sldMasterMk cId="1178353171" sldId="2147483660"/>
+              <pc:sldLayoutMk cId="2907885777" sldId="2147483668"/>
+              <ac:spMk id="2" creationId="{00000000-0000-0000-0000-000000000000}"/>
+            </ac:spMkLst>
+          </pc:spChg>
+          <pc:spChg chg="mod">
+            <ac:chgData name="Bloom PhD, Jesse D" userId="e17e4af4-92ba-4f4f-89d8-f6d4f5501821" providerId="ADAL" clId="{0BEA380E-990E-F440-8409-A46B3BA4865E}" dt="2020-04-20T18:14:52.900" v="4"/>
+            <ac:spMkLst>
+              <pc:docMk/>
+              <pc:sldMasterMk cId="1178353171" sldId="2147483660"/>
+              <pc:sldLayoutMk cId="2907885777" sldId="2147483668"/>
+              <ac:spMk id="3" creationId="{00000000-0000-0000-0000-000000000000}"/>
+            </ac:spMkLst>
+          </pc:spChg>
+          <pc:spChg chg="mod">
+            <ac:chgData name="Bloom PhD, Jesse D" userId="e17e4af4-92ba-4f4f-89d8-f6d4f5501821" providerId="ADAL" clId="{0BEA380E-990E-F440-8409-A46B3BA4865E}" dt="2020-04-20T18:14:52.900" v="4"/>
+            <ac:spMkLst>
+              <pc:docMk/>
+              <pc:sldMasterMk cId="1178353171" sldId="2147483660"/>
+              <pc:sldLayoutMk cId="2907885777" sldId="2147483668"/>
+              <ac:spMk id="4" creationId="{00000000-0000-0000-0000-000000000000}"/>
+            </ac:spMkLst>
+          </pc:spChg>
+        </pc:sldLayoutChg>
+        <pc:sldLayoutChg chg="modSp">
+          <pc:chgData name="Bloom PhD, Jesse D" userId="e17e4af4-92ba-4f4f-89d8-f6d4f5501821" providerId="ADAL" clId="{0BEA380E-990E-F440-8409-A46B3BA4865E}" dt="2020-04-20T18:14:52.900" v="4"/>
+          <pc:sldLayoutMkLst>
+            <pc:docMk/>
+            <pc:sldMasterMk cId="1178353171" sldId="2147483660"/>
+            <pc:sldLayoutMk cId="3479516020" sldId="2147483669"/>
+          </pc:sldLayoutMkLst>
+          <pc:spChg chg="mod">
+            <ac:chgData name="Bloom PhD, Jesse D" userId="e17e4af4-92ba-4f4f-89d8-f6d4f5501821" providerId="ADAL" clId="{0BEA380E-990E-F440-8409-A46B3BA4865E}" dt="2020-04-20T18:14:52.900" v="4"/>
+            <ac:spMkLst>
+              <pc:docMk/>
+              <pc:sldMasterMk cId="1178353171" sldId="2147483660"/>
+              <pc:sldLayoutMk cId="3479516020" sldId="2147483669"/>
+              <ac:spMk id="2" creationId="{00000000-0000-0000-0000-000000000000}"/>
+            </ac:spMkLst>
+          </pc:spChg>
+          <pc:spChg chg="mod">
+            <ac:chgData name="Bloom PhD, Jesse D" userId="e17e4af4-92ba-4f4f-89d8-f6d4f5501821" providerId="ADAL" clId="{0BEA380E-990E-F440-8409-A46B3BA4865E}" dt="2020-04-20T18:14:52.900" v="4"/>
+            <ac:spMkLst>
+              <pc:docMk/>
+              <pc:sldMasterMk cId="1178353171" sldId="2147483660"/>
+              <pc:sldLayoutMk cId="3479516020" sldId="2147483669"/>
+              <ac:spMk id="3" creationId="{00000000-0000-0000-0000-000000000000}"/>
+            </ac:spMkLst>
+          </pc:spChg>
+          <pc:spChg chg="mod">
+            <ac:chgData name="Bloom PhD, Jesse D" userId="e17e4af4-92ba-4f4f-89d8-f6d4f5501821" providerId="ADAL" clId="{0BEA380E-990E-F440-8409-A46B3BA4865E}" dt="2020-04-20T18:14:52.900" v="4"/>
+            <ac:spMkLst>
+              <pc:docMk/>
+              <pc:sldMasterMk cId="1178353171" sldId="2147483660"/>
+              <pc:sldLayoutMk cId="3479516020" sldId="2147483669"/>
+              <ac:spMk id="4" creationId="{00000000-0000-0000-0000-000000000000}"/>
+            </ac:spMkLst>
+          </pc:spChg>
+        </pc:sldLayoutChg>
+        <pc:sldLayoutChg chg="modSp">
+          <pc:chgData name="Bloom PhD, Jesse D" userId="e17e4af4-92ba-4f4f-89d8-f6d4f5501821" providerId="ADAL" clId="{0BEA380E-990E-F440-8409-A46B3BA4865E}" dt="2020-04-20T18:14:52.900" v="4"/>
+          <pc:sldLayoutMkLst>
+            <pc:docMk/>
+            <pc:sldMasterMk cId="1178353171" sldId="2147483660"/>
+            <pc:sldLayoutMk cId="1210615460" sldId="2147483671"/>
+          </pc:sldLayoutMkLst>
+          <pc:spChg chg="mod">
+            <ac:chgData name="Bloom PhD, Jesse D" userId="e17e4af4-92ba-4f4f-89d8-f6d4f5501821" providerId="ADAL" clId="{0BEA380E-990E-F440-8409-A46B3BA4865E}" dt="2020-04-20T18:14:52.900" v="4"/>
+            <ac:spMkLst>
+              <pc:docMk/>
+              <pc:sldMasterMk cId="1178353171" sldId="2147483660"/>
+              <pc:sldLayoutMk cId="1210615460" sldId="2147483671"/>
+              <ac:spMk id="2" creationId="{00000000-0000-0000-0000-000000000000}"/>
+            </ac:spMkLst>
+          </pc:spChg>
+          <pc:spChg chg="mod">
+            <ac:chgData name="Bloom PhD, Jesse D" userId="e17e4af4-92ba-4f4f-89d8-f6d4f5501821" providerId="ADAL" clId="{0BEA380E-990E-F440-8409-A46B3BA4865E}" dt="2020-04-20T18:14:52.900" v="4"/>
+            <ac:spMkLst>
+              <pc:docMk/>
+              <pc:sldMasterMk cId="1178353171" sldId="2147483660"/>
+              <pc:sldLayoutMk cId="1210615460" sldId="2147483671"/>
+              <ac:spMk id="3" creationId="{00000000-0000-0000-0000-000000000000}"/>
+            </ac:spMkLst>
+          </pc:spChg>
+        </pc:sldLayoutChg>
+      </pc:sldMasterChg>
+    </pc:docChg>
+  </pc:docChgLst>
+</pc:chgInfo>
 </file>
 
 <file path=ppt/slideLayouts/slideLayout1.xml><?xml version="1.0" encoding="utf-8"?>
@@ -142,13 +1175,7 @@
       </p:grpSpPr>
       <p:sp>
         <p:nvSpPr>
-          <p:cNvPr id="2" name="Title 1">
-            <a:extLst>
-              <a:ext uri="{FF2B5EF4-FFF2-40B4-BE49-F238E27FC236}">
-                <a16:creationId xmlns:a16="http://schemas.microsoft.com/office/drawing/2014/main" id="{8729FCEC-F006-104A-BBCF-37BA4B0B8367}"/>
-              </a:ext>
-            </a:extLst>
-          </p:cNvPr>
+          <p:cNvPr id="2" name="Title 1"/>
           <p:cNvSpPr>
             <a:spLocks noGrp="1"/>
           </p:cNvSpPr>
@@ -158,15 +1185,15 @@
         </p:nvSpPr>
         <p:spPr>
           <a:xfrm>
-            <a:off x="1524000" y="1122363"/>
-            <a:ext cx="9144000" cy="2387600"/>
+            <a:off x="1524000" y="703296"/>
+            <a:ext cx="9144000" cy="1496119"/>
           </a:xfrm>
         </p:spPr>
         <p:txBody>
           <a:bodyPr anchor="b"/>
           <a:lstStyle>
             <a:lvl1pPr algn="ctr">
-              <a:defRPr sz="6000"/>
+              <a:defRPr sz="3760"/>
             </a:lvl1pPr>
           </a:lstStyle>
           <a:p>
@@ -174,18 +1201,13 @@
               <a:rPr lang="en-US"/>
               <a:t>Click to edit Master title style</a:t>
             </a:r>
-          </a:p>
-        </p:txBody>
-      </p:sp>
-      <p:sp>
-        <p:nvSpPr>
-          <p:cNvPr id="3" name="Subtitle 2">
-            <a:extLst>
-              <a:ext uri="{FF2B5EF4-FFF2-40B4-BE49-F238E27FC236}">
-                <a16:creationId xmlns:a16="http://schemas.microsoft.com/office/drawing/2014/main" id="{2A70757E-5A91-FE4B-A633-A9CCCAB78673}"/>
-              </a:ext>
-            </a:extLst>
-          </p:cNvPr>
+            <a:endParaRPr lang="en-US" dirty="0"/>
+          </a:p>
+        </p:txBody>
+      </p:sp>
+      <p:sp>
+        <p:nvSpPr>
+          <p:cNvPr id="3" name="Subtitle 2"/>
           <p:cNvSpPr>
             <a:spLocks noGrp="1"/>
           </p:cNvSpPr>
@@ -195,8 +1217,8 @@
         </p:nvSpPr>
         <p:spPr>
           <a:xfrm>
-            <a:off x="1524000" y="3602038"/>
-            <a:ext cx="9144000" cy="1655762"/>
+            <a:off x="1524000" y="2257111"/>
+            <a:ext cx="9144000" cy="1037534"/>
           </a:xfrm>
         </p:spPr>
         <p:txBody>
@@ -204,39 +1226,39 @@
           <a:lstStyle>
             <a:lvl1pPr marL="0" indent="0" algn="ctr">
               <a:buNone/>
-              <a:defRPr sz="2400"/>
+              <a:defRPr sz="1504"/>
             </a:lvl1pPr>
-            <a:lvl2pPr marL="457200" indent="0" algn="ctr">
-              <a:buNone/>
-              <a:defRPr sz="2000"/>
+            <a:lvl2pPr marL="286482" indent="0" algn="ctr">
+              <a:buNone/>
+              <a:defRPr sz="1253"/>
             </a:lvl2pPr>
-            <a:lvl3pPr marL="914400" indent="0" algn="ctr">
-              <a:buNone/>
-              <a:defRPr sz="1800"/>
+            <a:lvl3pPr marL="572963" indent="0" algn="ctr">
+              <a:buNone/>
+              <a:defRPr sz="1128"/>
             </a:lvl3pPr>
-            <a:lvl4pPr marL="1371600" indent="0" algn="ctr">
-              <a:buNone/>
-              <a:defRPr sz="1600"/>
+            <a:lvl4pPr marL="859445" indent="0" algn="ctr">
+              <a:buNone/>
+              <a:defRPr sz="1003"/>
             </a:lvl4pPr>
-            <a:lvl5pPr marL="1828800" indent="0" algn="ctr">
-              <a:buNone/>
-              <a:defRPr sz="1600"/>
+            <a:lvl5pPr marL="1145926" indent="0" algn="ctr">
+              <a:buNone/>
+              <a:defRPr sz="1003"/>
             </a:lvl5pPr>
-            <a:lvl6pPr marL="2286000" indent="0" algn="ctr">
-              <a:buNone/>
-              <a:defRPr sz="1600"/>
+            <a:lvl6pPr marL="1432408" indent="0" algn="ctr">
+              <a:buNone/>
+              <a:defRPr sz="1003"/>
             </a:lvl6pPr>
-            <a:lvl7pPr marL="2743200" indent="0" algn="ctr">
-              <a:buNone/>
-              <a:defRPr sz="1600"/>
+            <a:lvl7pPr marL="1718889" indent="0" algn="ctr">
+              <a:buNone/>
+              <a:defRPr sz="1003"/>
             </a:lvl7pPr>
-            <a:lvl8pPr marL="3200400" indent="0" algn="ctr">
-              <a:buNone/>
-              <a:defRPr sz="1600"/>
+            <a:lvl8pPr marL="2005371" indent="0" algn="ctr">
+              <a:buNone/>
+              <a:defRPr sz="1003"/>
             </a:lvl8pPr>
-            <a:lvl9pPr marL="3657600" indent="0" algn="ctr">
-              <a:buNone/>
-              <a:defRPr sz="1600"/>
+            <a:lvl9pPr marL="2291852" indent="0" algn="ctr">
+              <a:buNone/>
+              <a:defRPr sz="1003"/>
             </a:lvl9pPr>
           </a:lstStyle>
           <a:p>
@@ -244,18 +1266,13 @@
               <a:rPr lang="en-US"/>
               <a:t>Click to edit Master subtitle style</a:t>
             </a:r>
-          </a:p>
-        </p:txBody>
-      </p:sp>
-      <p:sp>
-        <p:nvSpPr>
-          <p:cNvPr id="4" name="Date Placeholder 3">
-            <a:extLst>
-              <a:ext uri="{FF2B5EF4-FFF2-40B4-BE49-F238E27FC236}">
-                <a16:creationId xmlns:a16="http://schemas.microsoft.com/office/drawing/2014/main" id="{13526BBF-8625-B74E-82CA-DFDC18F73125}"/>
-              </a:ext>
-            </a:extLst>
-          </p:cNvPr>
+            <a:endParaRPr lang="en-US" dirty="0"/>
+          </a:p>
+        </p:txBody>
+      </p:sp>
+      <p:sp>
+        <p:nvSpPr>
+          <p:cNvPr id="4" name="Date Placeholder 3"/>
           <p:cNvSpPr>
             <a:spLocks noGrp="1"/>
           </p:cNvSpPr>
@@ -278,13 +1295,7 @@
       </p:sp>
       <p:sp>
         <p:nvSpPr>
-          <p:cNvPr id="5" name="Footer Placeholder 4">
-            <a:extLst>
-              <a:ext uri="{FF2B5EF4-FFF2-40B4-BE49-F238E27FC236}">
-                <a16:creationId xmlns:a16="http://schemas.microsoft.com/office/drawing/2014/main" id="{A73AEC57-D451-6F41-9DCB-57AC082A924A}"/>
-              </a:ext>
-            </a:extLst>
-          </p:cNvPr>
+          <p:cNvPr id="5" name="Footer Placeholder 4"/>
           <p:cNvSpPr>
             <a:spLocks noGrp="1"/>
           </p:cNvSpPr>
@@ -303,13 +1314,7 @@
       </p:sp>
       <p:sp>
         <p:nvSpPr>
-          <p:cNvPr id="6" name="Slide Number Placeholder 5">
-            <a:extLst>
-              <a:ext uri="{FF2B5EF4-FFF2-40B4-BE49-F238E27FC236}">
-                <a16:creationId xmlns:a16="http://schemas.microsoft.com/office/drawing/2014/main" id="{5D5C9204-1CC8-A849-87B6-C0E305B8A582}"/>
-              </a:ext>
-            </a:extLst>
-          </p:cNvPr>
+          <p:cNvPr id="6" name="Slide Number Placeholder 5"/>
           <p:cNvSpPr>
             <a:spLocks noGrp="1"/>
           </p:cNvSpPr>
@@ -333,7 +1338,7 @@
     </p:spTree>
     <p:extLst>
       <p:ext uri="{BB962C8B-B14F-4D97-AF65-F5344CB8AC3E}">
-        <p14:creationId xmlns:p14="http://schemas.microsoft.com/office/powerpoint/2010/main" val="3863643667"/>
+        <p14:creationId xmlns:p14="http://schemas.microsoft.com/office/powerpoint/2010/main" val="1413917320"/>
       </p:ext>
     </p:extLst>
   </p:cSld>
@@ -362,13 +1367,7 @@
       </p:grpSpPr>
       <p:sp>
         <p:nvSpPr>
-          <p:cNvPr id="2" name="Title 1">
-            <a:extLst>
-              <a:ext uri="{FF2B5EF4-FFF2-40B4-BE49-F238E27FC236}">
-                <a16:creationId xmlns:a16="http://schemas.microsoft.com/office/drawing/2014/main" id="{CEA9FDE0-1F68-8647-9ED6-3622FD404A49}"/>
-              </a:ext>
-            </a:extLst>
-          </p:cNvPr>
+          <p:cNvPr id="2" name="Title 1"/>
           <p:cNvSpPr>
             <a:spLocks noGrp="1"/>
           </p:cNvSpPr>
@@ -385,18 +1384,13 @@
               <a:rPr lang="en-US"/>
               <a:t>Click to edit Master title style</a:t>
             </a:r>
-          </a:p>
-        </p:txBody>
-      </p:sp>
-      <p:sp>
-        <p:nvSpPr>
-          <p:cNvPr id="3" name="Vertical Text Placeholder 2">
-            <a:extLst>
-              <a:ext uri="{FF2B5EF4-FFF2-40B4-BE49-F238E27FC236}">
-                <a16:creationId xmlns:a16="http://schemas.microsoft.com/office/drawing/2014/main" id="{565420EC-0C74-1F43-800F-914D10086C0A}"/>
-              </a:ext>
-            </a:extLst>
-          </p:cNvPr>
+            <a:endParaRPr lang="en-US" dirty="0"/>
+          </a:p>
+        </p:txBody>
+      </p:sp>
+      <p:sp>
+        <p:nvSpPr>
+          <p:cNvPr id="3" name="Vertical Text Placeholder 2"/>
           <p:cNvSpPr>
             <a:spLocks noGrp="1"/>
           </p:cNvSpPr>
@@ -442,18 +1436,13 @@
               <a:rPr lang="en-US"/>
               <a:t>Fifth level</a:t>
             </a:r>
-          </a:p>
-        </p:txBody>
-      </p:sp>
-      <p:sp>
-        <p:nvSpPr>
-          <p:cNvPr id="4" name="Date Placeholder 3">
-            <a:extLst>
-              <a:ext uri="{FF2B5EF4-FFF2-40B4-BE49-F238E27FC236}">
-                <a16:creationId xmlns:a16="http://schemas.microsoft.com/office/drawing/2014/main" id="{85F61C94-BA61-334F-AD09-0AF36EC4D29F}"/>
-              </a:ext>
-            </a:extLst>
-          </p:cNvPr>
+            <a:endParaRPr lang="en-US" dirty="0"/>
+          </a:p>
+        </p:txBody>
+      </p:sp>
+      <p:sp>
+        <p:nvSpPr>
+          <p:cNvPr id="4" name="Date Placeholder 3"/>
           <p:cNvSpPr>
             <a:spLocks noGrp="1"/>
           </p:cNvSpPr>
@@ -476,13 +1465,7 @@
       </p:sp>
       <p:sp>
         <p:nvSpPr>
-          <p:cNvPr id="5" name="Footer Placeholder 4">
-            <a:extLst>
-              <a:ext uri="{FF2B5EF4-FFF2-40B4-BE49-F238E27FC236}">
-                <a16:creationId xmlns:a16="http://schemas.microsoft.com/office/drawing/2014/main" id="{F03D274C-C67D-484F-B906-FC668050CAAA}"/>
-              </a:ext>
-            </a:extLst>
-          </p:cNvPr>
+          <p:cNvPr id="5" name="Footer Placeholder 4"/>
           <p:cNvSpPr>
             <a:spLocks noGrp="1"/>
           </p:cNvSpPr>
@@ -501,13 +1484,7 @@
       </p:sp>
       <p:sp>
         <p:nvSpPr>
-          <p:cNvPr id="6" name="Slide Number Placeholder 5">
-            <a:extLst>
-              <a:ext uri="{FF2B5EF4-FFF2-40B4-BE49-F238E27FC236}">
-                <a16:creationId xmlns:a16="http://schemas.microsoft.com/office/drawing/2014/main" id="{70C97D8D-9BA3-1C46-8B34-269D068562EE}"/>
-              </a:ext>
-            </a:extLst>
-          </p:cNvPr>
+          <p:cNvPr id="6" name="Slide Number Placeholder 5"/>
           <p:cNvSpPr>
             <a:spLocks noGrp="1"/>
           </p:cNvSpPr>
@@ -531,7 +1508,7 @@
     </p:spTree>
     <p:extLst>
       <p:ext uri="{BB962C8B-B14F-4D97-AF65-F5344CB8AC3E}">
-        <p14:creationId xmlns:p14="http://schemas.microsoft.com/office/powerpoint/2010/main" val="2443390172"/>
+        <p14:creationId xmlns:p14="http://schemas.microsoft.com/office/powerpoint/2010/main" val="201264247"/>
       </p:ext>
     </p:extLst>
   </p:cSld>
@@ -560,13 +1537,7 @@
       </p:grpSpPr>
       <p:sp>
         <p:nvSpPr>
-          <p:cNvPr id="2" name="Vertical Title 1">
-            <a:extLst>
-              <a:ext uri="{FF2B5EF4-FFF2-40B4-BE49-F238E27FC236}">
-                <a16:creationId xmlns:a16="http://schemas.microsoft.com/office/drawing/2014/main" id="{ED7792B9-7997-6C4E-B4FF-DBF9ECB21D44}"/>
-              </a:ext>
-            </a:extLst>
-          </p:cNvPr>
+          <p:cNvPr id="2" name="Vertical Title 1"/>
           <p:cNvSpPr>
             <a:spLocks noGrp="1"/>
           </p:cNvSpPr>
@@ -576,8 +1547,8 @@
         </p:nvSpPr>
         <p:spPr>
           <a:xfrm>
-            <a:off x="8724901" y="365125"/>
-            <a:ext cx="2628900" cy="5811838"/>
+            <a:off x="8724900" y="228795"/>
+            <a:ext cx="2628900" cy="3641817"/>
           </a:xfrm>
         </p:spPr>
         <p:txBody>
@@ -588,18 +1559,13 @@
               <a:rPr lang="en-US"/>
               <a:t>Click to edit Master title style</a:t>
             </a:r>
-          </a:p>
-        </p:txBody>
-      </p:sp>
-      <p:sp>
-        <p:nvSpPr>
-          <p:cNvPr id="3" name="Vertical Text Placeholder 2">
-            <a:extLst>
-              <a:ext uri="{FF2B5EF4-FFF2-40B4-BE49-F238E27FC236}">
-                <a16:creationId xmlns:a16="http://schemas.microsoft.com/office/drawing/2014/main" id="{FADCCA66-95B7-A645-A0FC-07AA78CB448F}"/>
-              </a:ext>
-            </a:extLst>
-          </p:cNvPr>
+            <a:endParaRPr lang="en-US" dirty="0"/>
+          </a:p>
+        </p:txBody>
+      </p:sp>
+      <p:sp>
+        <p:nvSpPr>
+          <p:cNvPr id="3" name="Vertical Text Placeholder 2"/>
           <p:cNvSpPr>
             <a:spLocks noGrp="1"/>
           </p:cNvSpPr>
@@ -609,8 +1575,8 @@
         </p:nvSpPr>
         <p:spPr>
           <a:xfrm>
-            <a:off x="838201" y="365125"/>
-            <a:ext cx="7734300" cy="5811838"/>
+            <a:off x="838200" y="228795"/>
+            <a:ext cx="7734300" cy="3641817"/>
           </a:xfrm>
         </p:spPr>
         <p:txBody>
@@ -650,18 +1616,13 @@
               <a:rPr lang="en-US"/>
               <a:t>Fifth level</a:t>
             </a:r>
-          </a:p>
-        </p:txBody>
-      </p:sp>
-      <p:sp>
-        <p:nvSpPr>
-          <p:cNvPr id="4" name="Date Placeholder 3">
-            <a:extLst>
-              <a:ext uri="{FF2B5EF4-FFF2-40B4-BE49-F238E27FC236}">
-                <a16:creationId xmlns:a16="http://schemas.microsoft.com/office/drawing/2014/main" id="{2D8A59D1-00C1-754C-90BA-A4F76D3B0BCB}"/>
-              </a:ext>
-            </a:extLst>
-          </p:cNvPr>
+            <a:endParaRPr lang="en-US" dirty="0"/>
+          </a:p>
+        </p:txBody>
+      </p:sp>
+      <p:sp>
+        <p:nvSpPr>
+          <p:cNvPr id="4" name="Date Placeholder 3"/>
           <p:cNvSpPr>
             <a:spLocks noGrp="1"/>
           </p:cNvSpPr>
@@ -684,13 +1645,7 @@
       </p:sp>
       <p:sp>
         <p:nvSpPr>
-          <p:cNvPr id="5" name="Footer Placeholder 4">
-            <a:extLst>
-              <a:ext uri="{FF2B5EF4-FFF2-40B4-BE49-F238E27FC236}">
-                <a16:creationId xmlns:a16="http://schemas.microsoft.com/office/drawing/2014/main" id="{C9BF7B47-B82D-B64A-B8A9-8AB309F932DA}"/>
-              </a:ext>
-            </a:extLst>
-          </p:cNvPr>
+          <p:cNvPr id="5" name="Footer Placeholder 4"/>
           <p:cNvSpPr>
             <a:spLocks noGrp="1"/>
           </p:cNvSpPr>
@@ -709,13 +1664,7 @@
       </p:sp>
       <p:sp>
         <p:nvSpPr>
-          <p:cNvPr id="6" name="Slide Number Placeholder 5">
-            <a:extLst>
-              <a:ext uri="{FF2B5EF4-FFF2-40B4-BE49-F238E27FC236}">
-                <a16:creationId xmlns:a16="http://schemas.microsoft.com/office/drawing/2014/main" id="{8DBB0A78-6CCE-4845-B969-5C1FF5747D10}"/>
-              </a:ext>
-            </a:extLst>
-          </p:cNvPr>
+          <p:cNvPr id="6" name="Slide Number Placeholder 5"/>
           <p:cNvSpPr>
             <a:spLocks noGrp="1"/>
           </p:cNvSpPr>
@@ -739,7 +1688,7 @@
     </p:spTree>
     <p:extLst>
       <p:ext uri="{BB962C8B-B14F-4D97-AF65-F5344CB8AC3E}">
-        <p14:creationId xmlns:p14="http://schemas.microsoft.com/office/powerpoint/2010/main" val="2925570438"/>
+        <p14:creationId xmlns:p14="http://schemas.microsoft.com/office/powerpoint/2010/main" val="2816857772"/>
       </p:ext>
     </p:extLst>
   </p:cSld>
@@ -768,13 +1717,7 @@
       </p:grpSpPr>
       <p:sp>
         <p:nvSpPr>
-          <p:cNvPr id="2" name="Title 1">
-            <a:extLst>
-              <a:ext uri="{FF2B5EF4-FFF2-40B4-BE49-F238E27FC236}">
-                <a16:creationId xmlns:a16="http://schemas.microsoft.com/office/drawing/2014/main" id="{B7B64FB3-9F3C-9941-8405-C9904CEDE59B}"/>
-              </a:ext>
-            </a:extLst>
-          </p:cNvPr>
+          <p:cNvPr id="2" name="Title 1"/>
           <p:cNvSpPr>
             <a:spLocks noGrp="1"/>
           </p:cNvSpPr>
@@ -791,18 +1734,13 @@
               <a:rPr lang="en-US"/>
               <a:t>Click to edit Master title style</a:t>
             </a:r>
-          </a:p>
-        </p:txBody>
-      </p:sp>
-      <p:sp>
-        <p:nvSpPr>
-          <p:cNvPr id="3" name="Content Placeholder 2">
-            <a:extLst>
-              <a:ext uri="{FF2B5EF4-FFF2-40B4-BE49-F238E27FC236}">
-                <a16:creationId xmlns:a16="http://schemas.microsoft.com/office/drawing/2014/main" id="{CBD1225A-E78E-1F42-911E-F6164A445FD9}"/>
-              </a:ext>
-            </a:extLst>
-          </p:cNvPr>
+            <a:endParaRPr lang="en-US" dirty="0"/>
+          </a:p>
+        </p:txBody>
+      </p:sp>
+      <p:sp>
+        <p:nvSpPr>
+          <p:cNvPr id="3" name="Content Placeholder 2"/>
           <p:cNvSpPr>
             <a:spLocks noGrp="1"/>
           </p:cNvSpPr>
@@ -848,18 +1786,13 @@
               <a:rPr lang="en-US"/>
               <a:t>Fifth level</a:t>
             </a:r>
-          </a:p>
-        </p:txBody>
-      </p:sp>
-      <p:sp>
-        <p:nvSpPr>
-          <p:cNvPr id="4" name="Date Placeholder 3">
-            <a:extLst>
-              <a:ext uri="{FF2B5EF4-FFF2-40B4-BE49-F238E27FC236}">
-                <a16:creationId xmlns:a16="http://schemas.microsoft.com/office/drawing/2014/main" id="{1CDD1D8C-5697-054F-A9C9-D23F61F19285}"/>
-              </a:ext>
-            </a:extLst>
-          </p:cNvPr>
+            <a:endParaRPr lang="en-US" dirty="0"/>
+          </a:p>
+        </p:txBody>
+      </p:sp>
+      <p:sp>
+        <p:nvSpPr>
+          <p:cNvPr id="4" name="Date Placeholder 3"/>
           <p:cNvSpPr>
             <a:spLocks noGrp="1"/>
           </p:cNvSpPr>
@@ -882,13 +1815,7 @@
       </p:sp>
       <p:sp>
         <p:nvSpPr>
-          <p:cNvPr id="5" name="Footer Placeholder 4">
-            <a:extLst>
-              <a:ext uri="{FF2B5EF4-FFF2-40B4-BE49-F238E27FC236}">
-                <a16:creationId xmlns:a16="http://schemas.microsoft.com/office/drawing/2014/main" id="{DFCC16CD-1B31-2541-AFD5-5EE35AF7634E}"/>
-              </a:ext>
-            </a:extLst>
-          </p:cNvPr>
+          <p:cNvPr id="5" name="Footer Placeholder 4"/>
           <p:cNvSpPr>
             <a:spLocks noGrp="1"/>
           </p:cNvSpPr>
@@ -907,13 +1834,7 @@
       </p:sp>
       <p:sp>
         <p:nvSpPr>
-          <p:cNvPr id="6" name="Slide Number Placeholder 5">
-            <a:extLst>
-              <a:ext uri="{FF2B5EF4-FFF2-40B4-BE49-F238E27FC236}">
-                <a16:creationId xmlns:a16="http://schemas.microsoft.com/office/drawing/2014/main" id="{4C72690B-00B1-B941-8A84-16C6C93C5268}"/>
-              </a:ext>
-            </a:extLst>
-          </p:cNvPr>
+          <p:cNvPr id="6" name="Slide Number Placeholder 5"/>
           <p:cNvSpPr>
             <a:spLocks noGrp="1"/>
           </p:cNvSpPr>
@@ -937,7 +1858,7 @@
     </p:spTree>
     <p:extLst>
       <p:ext uri="{BB962C8B-B14F-4D97-AF65-F5344CB8AC3E}">
-        <p14:creationId xmlns:p14="http://schemas.microsoft.com/office/powerpoint/2010/main" val="2676997670"/>
+        <p14:creationId xmlns:p14="http://schemas.microsoft.com/office/powerpoint/2010/main" val="4120521806"/>
       </p:ext>
     </p:extLst>
   </p:cSld>
@@ -966,13 +1887,7 @@
       </p:grpSpPr>
       <p:sp>
         <p:nvSpPr>
-          <p:cNvPr id="2" name="Title 1">
-            <a:extLst>
-              <a:ext uri="{FF2B5EF4-FFF2-40B4-BE49-F238E27FC236}">
-                <a16:creationId xmlns:a16="http://schemas.microsoft.com/office/drawing/2014/main" id="{E6262A6B-B922-B540-B4A1-D2E2DA70AE69}"/>
-              </a:ext>
-            </a:extLst>
-          </p:cNvPr>
+          <p:cNvPr id="2" name="Title 1"/>
           <p:cNvSpPr>
             <a:spLocks noGrp="1"/>
           </p:cNvSpPr>
@@ -982,15 +1897,15 @@
         </p:nvSpPr>
         <p:spPr>
           <a:xfrm>
-            <a:off x="831851" y="1709740"/>
-            <a:ext cx="10515600" cy="2852737"/>
+            <a:off x="831850" y="1071357"/>
+            <a:ext cx="10515600" cy="1787583"/>
           </a:xfrm>
         </p:spPr>
         <p:txBody>
           <a:bodyPr anchor="b"/>
           <a:lstStyle>
             <a:lvl1pPr>
-              <a:defRPr sz="6000"/>
+              <a:defRPr sz="3760"/>
             </a:lvl1pPr>
           </a:lstStyle>
           <a:p>
@@ -998,18 +1913,13 @@
               <a:rPr lang="en-US"/>
               <a:t>Click to edit Master title style</a:t>
             </a:r>
-          </a:p>
-        </p:txBody>
-      </p:sp>
-      <p:sp>
-        <p:nvSpPr>
-          <p:cNvPr id="3" name="Text Placeholder 2">
-            <a:extLst>
-              <a:ext uri="{FF2B5EF4-FFF2-40B4-BE49-F238E27FC236}">
-                <a16:creationId xmlns:a16="http://schemas.microsoft.com/office/drawing/2014/main" id="{B2C9540B-439D-9340-B7A1-B0188CDE759F}"/>
-              </a:ext>
-            </a:extLst>
-          </p:cNvPr>
+            <a:endParaRPr lang="en-US" dirty="0"/>
+          </a:p>
+        </p:txBody>
+      </p:sp>
+      <p:sp>
+        <p:nvSpPr>
+          <p:cNvPr id="3" name="Text Placeholder 2"/>
           <p:cNvSpPr>
             <a:spLocks noGrp="1"/>
           </p:cNvSpPr>
@@ -1019,8 +1929,8 @@
         </p:nvSpPr>
         <p:spPr>
           <a:xfrm>
-            <a:off x="831851" y="4589465"/>
-            <a:ext cx="10515600" cy="1500187"/>
+            <a:off x="831850" y="2875852"/>
+            <a:ext cx="10515600" cy="940048"/>
           </a:xfrm>
         </p:spPr>
         <p:txBody>
@@ -1028,7 +1938,7 @@
           <a:lstStyle>
             <a:lvl1pPr marL="0" indent="0">
               <a:buNone/>
-              <a:defRPr sz="2400">
+              <a:defRPr sz="1504">
                 <a:solidFill>
                   <a:schemeClr val="tx1">
                     <a:tint val="75000"/>
@@ -1036,9 +1946,9 @@
                 </a:solidFill>
               </a:defRPr>
             </a:lvl1pPr>
-            <a:lvl2pPr marL="457200" indent="0">
-              <a:buNone/>
-              <a:defRPr sz="2000">
+            <a:lvl2pPr marL="286482" indent="0">
+              <a:buNone/>
+              <a:defRPr sz="1253">
                 <a:solidFill>
                   <a:schemeClr val="tx1">
                     <a:tint val="75000"/>
@@ -1046,9 +1956,9 @@
                 </a:solidFill>
               </a:defRPr>
             </a:lvl2pPr>
-            <a:lvl3pPr marL="914400" indent="0">
-              <a:buNone/>
-              <a:defRPr sz="1800">
+            <a:lvl3pPr marL="572963" indent="0">
+              <a:buNone/>
+              <a:defRPr sz="1128">
                 <a:solidFill>
                   <a:schemeClr val="tx1">
                     <a:tint val="75000"/>
@@ -1056,9 +1966,9 @@
                 </a:solidFill>
               </a:defRPr>
             </a:lvl3pPr>
-            <a:lvl4pPr marL="1371600" indent="0">
-              <a:buNone/>
-              <a:defRPr sz="1600">
+            <a:lvl4pPr marL="859445" indent="0">
+              <a:buNone/>
+              <a:defRPr sz="1003">
                 <a:solidFill>
                   <a:schemeClr val="tx1">
                     <a:tint val="75000"/>
@@ -1066,9 +1976,9 @@
                 </a:solidFill>
               </a:defRPr>
             </a:lvl4pPr>
-            <a:lvl5pPr marL="1828800" indent="0">
-              <a:buNone/>
-              <a:defRPr sz="1600">
+            <a:lvl5pPr marL="1145926" indent="0">
+              <a:buNone/>
+              <a:defRPr sz="1003">
                 <a:solidFill>
                   <a:schemeClr val="tx1">
                     <a:tint val="75000"/>
@@ -1076,9 +1986,9 @@
                 </a:solidFill>
               </a:defRPr>
             </a:lvl5pPr>
-            <a:lvl6pPr marL="2286000" indent="0">
-              <a:buNone/>
-              <a:defRPr sz="1600">
+            <a:lvl6pPr marL="1432408" indent="0">
+              <a:buNone/>
+              <a:defRPr sz="1003">
                 <a:solidFill>
                   <a:schemeClr val="tx1">
                     <a:tint val="75000"/>
@@ -1086,9 +1996,9 @@
                 </a:solidFill>
               </a:defRPr>
             </a:lvl6pPr>
-            <a:lvl7pPr marL="2743200" indent="0">
-              <a:buNone/>
-              <a:defRPr sz="1600">
+            <a:lvl7pPr marL="1718889" indent="0">
+              <a:buNone/>
+              <a:defRPr sz="1003">
                 <a:solidFill>
                   <a:schemeClr val="tx1">
                     <a:tint val="75000"/>
@@ -1096,9 +2006,9 @@
                 </a:solidFill>
               </a:defRPr>
             </a:lvl7pPr>
-            <a:lvl8pPr marL="3200400" indent="0">
-              <a:buNone/>
-              <a:defRPr sz="1600">
+            <a:lvl8pPr marL="2005371" indent="0">
+              <a:buNone/>
+              <a:defRPr sz="1003">
                 <a:solidFill>
                   <a:schemeClr val="tx1">
                     <a:tint val="75000"/>
@@ -1106,9 +2016,9 @@
                 </a:solidFill>
               </a:defRPr>
             </a:lvl8pPr>
-            <a:lvl9pPr marL="3657600" indent="0">
-              <a:buNone/>
-              <a:defRPr sz="1600">
+            <a:lvl9pPr marL="2291852" indent="0">
+              <a:buNone/>
+              <a:defRPr sz="1003">
                 <a:solidFill>
                   <a:schemeClr val="tx1">
                     <a:tint val="75000"/>
@@ -1128,13 +2038,7 @@
       </p:sp>
       <p:sp>
         <p:nvSpPr>
-          <p:cNvPr id="4" name="Date Placeholder 3">
-            <a:extLst>
-              <a:ext uri="{FF2B5EF4-FFF2-40B4-BE49-F238E27FC236}">
-                <a16:creationId xmlns:a16="http://schemas.microsoft.com/office/drawing/2014/main" id="{DB122357-DD78-E04E-A8EE-A6D3858C7731}"/>
-              </a:ext>
-            </a:extLst>
-          </p:cNvPr>
+          <p:cNvPr id="4" name="Date Placeholder 3"/>
           <p:cNvSpPr>
             <a:spLocks noGrp="1"/>
           </p:cNvSpPr>
@@ -1157,13 +2061,7 @@
       </p:sp>
       <p:sp>
         <p:nvSpPr>
-          <p:cNvPr id="5" name="Footer Placeholder 4">
-            <a:extLst>
-              <a:ext uri="{FF2B5EF4-FFF2-40B4-BE49-F238E27FC236}">
-                <a16:creationId xmlns:a16="http://schemas.microsoft.com/office/drawing/2014/main" id="{306CB7CA-3967-ED43-A394-035F3C725AF3}"/>
-              </a:ext>
-            </a:extLst>
-          </p:cNvPr>
+          <p:cNvPr id="5" name="Footer Placeholder 4"/>
           <p:cNvSpPr>
             <a:spLocks noGrp="1"/>
           </p:cNvSpPr>
@@ -1182,13 +2080,7 @@
       </p:sp>
       <p:sp>
         <p:nvSpPr>
-          <p:cNvPr id="6" name="Slide Number Placeholder 5">
-            <a:extLst>
-              <a:ext uri="{FF2B5EF4-FFF2-40B4-BE49-F238E27FC236}">
-                <a16:creationId xmlns:a16="http://schemas.microsoft.com/office/drawing/2014/main" id="{DBB77AEE-44A9-0E44-95E1-DF79FC8159E2}"/>
-              </a:ext>
-            </a:extLst>
-          </p:cNvPr>
+          <p:cNvPr id="6" name="Slide Number Placeholder 5"/>
           <p:cNvSpPr>
             <a:spLocks noGrp="1"/>
           </p:cNvSpPr>
@@ -1212,7 +2104,7 @@
     </p:spTree>
     <p:extLst>
       <p:ext uri="{BB962C8B-B14F-4D97-AF65-F5344CB8AC3E}">
-        <p14:creationId xmlns:p14="http://schemas.microsoft.com/office/powerpoint/2010/main" val="2333014299"/>
+        <p14:creationId xmlns:p14="http://schemas.microsoft.com/office/powerpoint/2010/main" val="2171590465"/>
       </p:ext>
     </p:extLst>
   </p:cSld>
@@ -1241,13 +2133,7 @@
       </p:grpSpPr>
       <p:sp>
         <p:nvSpPr>
-          <p:cNvPr id="2" name="Title 1">
-            <a:extLst>
-              <a:ext uri="{FF2B5EF4-FFF2-40B4-BE49-F238E27FC236}">
-                <a16:creationId xmlns:a16="http://schemas.microsoft.com/office/drawing/2014/main" id="{5CA47A71-60F0-3649-AC76-F85061674BD0}"/>
-              </a:ext>
-            </a:extLst>
-          </p:cNvPr>
+          <p:cNvPr id="2" name="Title 1"/>
           <p:cNvSpPr>
             <a:spLocks noGrp="1"/>
           </p:cNvSpPr>
@@ -1264,18 +2150,13 @@
               <a:rPr lang="en-US"/>
               <a:t>Click to edit Master title style</a:t>
             </a:r>
-          </a:p>
-        </p:txBody>
-      </p:sp>
-      <p:sp>
-        <p:nvSpPr>
-          <p:cNvPr id="3" name="Content Placeholder 2">
-            <a:extLst>
-              <a:ext uri="{FF2B5EF4-FFF2-40B4-BE49-F238E27FC236}">
-                <a16:creationId xmlns:a16="http://schemas.microsoft.com/office/drawing/2014/main" id="{87D9ED6A-AAF7-2C45-BAC8-E31CFF6EA612}"/>
-              </a:ext>
-            </a:extLst>
-          </p:cNvPr>
+            <a:endParaRPr lang="en-US" dirty="0"/>
+          </a:p>
+        </p:txBody>
+      </p:sp>
+      <p:sp>
+        <p:nvSpPr>
+          <p:cNvPr id="3" name="Content Placeholder 2"/>
           <p:cNvSpPr>
             <a:spLocks noGrp="1"/>
           </p:cNvSpPr>
@@ -1285,8 +2166,8 @@
         </p:nvSpPr>
         <p:spPr>
           <a:xfrm>
-            <a:off x="838200" y="1825625"/>
-            <a:ext cx="5181600" cy="4351338"/>
+            <a:off x="838200" y="1143974"/>
+            <a:ext cx="5181600" cy="2726637"/>
           </a:xfrm>
         </p:spPr>
         <p:txBody>
@@ -1326,18 +2207,13 @@
               <a:rPr lang="en-US"/>
               <a:t>Fifth level</a:t>
             </a:r>
-          </a:p>
-        </p:txBody>
-      </p:sp>
-      <p:sp>
-        <p:nvSpPr>
-          <p:cNvPr id="4" name="Content Placeholder 3">
-            <a:extLst>
-              <a:ext uri="{FF2B5EF4-FFF2-40B4-BE49-F238E27FC236}">
-                <a16:creationId xmlns:a16="http://schemas.microsoft.com/office/drawing/2014/main" id="{4A9589E7-5AD7-914B-8399-23F76171F757}"/>
-              </a:ext>
-            </a:extLst>
-          </p:cNvPr>
+            <a:endParaRPr lang="en-US" dirty="0"/>
+          </a:p>
+        </p:txBody>
+      </p:sp>
+      <p:sp>
+        <p:nvSpPr>
+          <p:cNvPr id="4" name="Content Placeholder 3"/>
           <p:cNvSpPr>
             <a:spLocks noGrp="1"/>
           </p:cNvSpPr>
@@ -1347,8 +2223,8 @@
         </p:nvSpPr>
         <p:spPr>
           <a:xfrm>
-            <a:off x="6172200" y="1825625"/>
-            <a:ext cx="5181600" cy="4351338"/>
+            <a:off x="6172200" y="1143974"/>
+            <a:ext cx="5181600" cy="2726637"/>
           </a:xfrm>
         </p:spPr>
         <p:txBody>
@@ -1388,18 +2264,13 @@
               <a:rPr lang="en-US"/>
               <a:t>Fifth level</a:t>
             </a:r>
-          </a:p>
-        </p:txBody>
-      </p:sp>
-      <p:sp>
-        <p:nvSpPr>
-          <p:cNvPr id="5" name="Date Placeholder 4">
-            <a:extLst>
-              <a:ext uri="{FF2B5EF4-FFF2-40B4-BE49-F238E27FC236}">
-                <a16:creationId xmlns:a16="http://schemas.microsoft.com/office/drawing/2014/main" id="{915655D8-3F46-0146-8BBF-DBD1340A01F8}"/>
-              </a:ext>
-            </a:extLst>
-          </p:cNvPr>
+            <a:endParaRPr lang="en-US" dirty="0"/>
+          </a:p>
+        </p:txBody>
+      </p:sp>
+      <p:sp>
+        <p:nvSpPr>
+          <p:cNvPr id="5" name="Date Placeholder 4"/>
           <p:cNvSpPr>
             <a:spLocks noGrp="1"/>
           </p:cNvSpPr>
@@ -1422,13 +2293,7 @@
       </p:sp>
       <p:sp>
         <p:nvSpPr>
-          <p:cNvPr id="6" name="Footer Placeholder 5">
-            <a:extLst>
-              <a:ext uri="{FF2B5EF4-FFF2-40B4-BE49-F238E27FC236}">
-                <a16:creationId xmlns:a16="http://schemas.microsoft.com/office/drawing/2014/main" id="{8B254F5C-A303-7D4F-9E7E-1F41655B7731}"/>
-              </a:ext>
-            </a:extLst>
-          </p:cNvPr>
+          <p:cNvPr id="6" name="Footer Placeholder 5"/>
           <p:cNvSpPr>
             <a:spLocks noGrp="1"/>
           </p:cNvSpPr>
@@ -1447,13 +2312,7 @@
       </p:sp>
       <p:sp>
         <p:nvSpPr>
-          <p:cNvPr id="7" name="Slide Number Placeholder 6">
-            <a:extLst>
-              <a:ext uri="{FF2B5EF4-FFF2-40B4-BE49-F238E27FC236}">
-                <a16:creationId xmlns:a16="http://schemas.microsoft.com/office/drawing/2014/main" id="{CB7F8B33-8DF5-EB46-9316-AD426020AD73}"/>
-              </a:ext>
-            </a:extLst>
-          </p:cNvPr>
+          <p:cNvPr id="7" name="Slide Number Placeholder 6"/>
           <p:cNvSpPr>
             <a:spLocks noGrp="1"/>
           </p:cNvSpPr>
@@ -1477,7 +2336,7 @@
     </p:spTree>
     <p:extLst>
       <p:ext uri="{BB962C8B-B14F-4D97-AF65-F5344CB8AC3E}">
-        <p14:creationId xmlns:p14="http://schemas.microsoft.com/office/powerpoint/2010/main" val="3029280367"/>
+        <p14:creationId xmlns:p14="http://schemas.microsoft.com/office/powerpoint/2010/main" val="317734528"/>
       </p:ext>
     </p:extLst>
   </p:cSld>
@@ -1506,13 +2365,7 @@
       </p:grpSpPr>
       <p:sp>
         <p:nvSpPr>
-          <p:cNvPr id="2" name="Title 1">
-            <a:extLst>
-              <a:ext uri="{FF2B5EF4-FFF2-40B4-BE49-F238E27FC236}">
-                <a16:creationId xmlns:a16="http://schemas.microsoft.com/office/drawing/2014/main" id="{968CA58E-93F1-524F-A714-88163ACBF71F}"/>
-              </a:ext>
-            </a:extLst>
-          </p:cNvPr>
+          <p:cNvPr id="2" name="Title 1"/>
           <p:cNvSpPr>
             <a:spLocks noGrp="1"/>
           </p:cNvSpPr>
@@ -1522,8 +2375,8 @@
         </p:nvSpPr>
         <p:spPr>
           <a:xfrm>
-            <a:off x="839788" y="365127"/>
-            <a:ext cx="10515600" cy="1325563"/>
+            <a:off x="839788" y="228795"/>
+            <a:ext cx="10515600" cy="830625"/>
           </a:xfrm>
         </p:spPr>
         <p:txBody>
@@ -1534,18 +2387,13 @@
               <a:rPr lang="en-US"/>
               <a:t>Click to edit Master title style</a:t>
             </a:r>
-          </a:p>
-        </p:txBody>
-      </p:sp>
-      <p:sp>
-        <p:nvSpPr>
-          <p:cNvPr id="3" name="Text Placeholder 2">
-            <a:extLst>
-              <a:ext uri="{FF2B5EF4-FFF2-40B4-BE49-F238E27FC236}">
-                <a16:creationId xmlns:a16="http://schemas.microsoft.com/office/drawing/2014/main" id="{425AC7B9-511F-7247-9AC5-3A3C6873633D}"/>
-              </a:ext>
-            </a:extLst>
-          </p:cNvPr>
+            <a:endParaRPr lang="en-US" dirty="0"/>
+          </a:p>
+        </p:txBody>
+      </p:sp>
+      <p:sp>
+        <p:nvSpPr>
+          <p:cNvPr id="3" name="Text Placeholder 2"/>
           <p:cNvSpPr>
             <a:spLocks noGrp="1"/>
           </p:cNvSpPr>
@@ -1555,8 +2403,8 @@
         </p:nvSpPr>
         <p:spPr>
           <a:xfrm>
-            <a:off x="839789" y="1681163"/>
-            <a:ext cx="5157787" cy="823912"/>
+            <a:off x="839789" y="1053451"/>
+            <a:ext cx="5157787" cy="516280"/>
           </a:xfrm>
         </p:spPr>
         <p:txBody>
@@ -1564,39 +2412,39 @@
           <a:lstStyle>
             <a:lvl1pPr marL="0" indent="0">
               <a:buNone/>
-              <a:defRPr sz="2400" b="1"/>
+              <a:defRPr sz="1504" b="1"/>
             </a:lvl1pPr>
-            <a:lvl2pPr marL="457200" indent="0">
-              <a:buNone/>
-              <a:defRPr sz="2000" b="1"/>
+            <a:lvl2pPr marL="286482" indent="0">
+              <a:buNone/>
+              <a:defRPr sz="1253" b="1"/>
             </a:lvl2pPr>
-            <a:lvl3pPr marL="914400" indent="0">
-              <a:buNone/>
-              <a:defRPr sz="1800" b="1"/>
+            <a:lvl3pPr marL="572963" indent="0">
+              <a:buNone/>
+              <a:defRPr sz="1128" b="1"/>
             </a:lvl3pPr>
-            <a:lvl4pPr marL="1371600" indent="0">
-              <a:buNone/>
-              <a:defRPr sz="1600" b="1"/>
+            <a:lvl4pPr marL="859445" indent="0">
+              <a:buNone/>
+              <a:defRPr sz="1003" b="1"/>
             </a:lvl4pPr>
-            <a:lvl5pPr marL="1828800" indent="0">
-              <a:buNone/>
-              <a:defRPr sz="1600" b="1"/>
+            <a:lvl5pPr marL="1145926" indent="0">
+              <a:buNone/>
+              <a:defRPr sz="1003" b="1"/>
             </a:lvl5pPr>
-            <a:lvl6pPr marL="2286000" indent="0">
-              <a:buNone/>
-              <a:defRPr sz="1600" b="1"/>
+            <a:lvl6pPr marL="1432408" indent="0">
+              <a:buNone/>
+              <a:defRPr sz="1003" b="1"/>
             </a:lvl6pPr>
-            <a:lvl7pPr marL="2743200" indent="0">
-              <a:buNone/>
-              <a:defRPr sz="1600" b="1"/>
+            <a:lvl7pPr marL="1718889" indent="0">
+              <a:buNone/>
+              <a:defRPr sz="1003" b="1"/>
             </a:lvl7pPr>
-            <a:lvl8pPr marL="3200400" indent="0">
-              <a:buNone/>
-              <a:defRPr sz="1600" b="1"/>
+            <a:lvl8pPr marL="2005371" indent="0">
+              <a:buNone/>
+              <a:defRPr sz="1003" b="1"/>
             </a:lvl8pPr>
-            <a:lvl9pPr marL="3657600" indent="0">
-              <a:buNone/>
-              <a:defRPr sz="1600" b="1"/>
+            <a:lvl9pPr marL="2291852" indent="0">
+              <a:buNone/>
+              <a:defRPr sz="1003" b="1"/>
             </a:lvl9pPr>
           </a:lstStyle>
           <a:p>
@@ -1610,13 +2458,7 @@
       </p:sp>
       <p:sp>
         <p:nvSpPr>
-          <p:cNvPr id="4" name="Content Placeholder 3">
-            <a:extLst>
-              <a:ext uri="{FF2B5EF4-FFF2-40B4-BE49-F238E27FC236}">
-                <a16:creationId xmlns:a16="http://schemas.microsoft.com/office/drawing/2014/main" id="{6EACFB2F-EF95-3B47-96AE-0C8279FD6F5F}"/>
-              </a:ext>
-            </a:extLst>
-          </p:cNvPr>
+          <p:cNvPr id="4" name="Content Placeholder 3"/>
           <p:cNvSpPr>
             <a:spLocks noGrp="1"/>
           </p:cNvSpPr>
@@ -1626,8 +2468,8 @@
         </p:nvSpPr>
         <p:spPr>
           <a:xfrm>
-            <a:off x="839789" y="2505075"/>
-            <a:ext cx="5157787" cy="3684588"/>
+            <a:off x="839789" y="1569731"/>
+            <a:ext cx="5157787" cy="2308838"/>
           </a:xfrm>
         </p:spPr>
         <p:txBody>
@@ -1667,18 +2509,13 @@
               <a:rPr lang="en-US"/>
               <a:t>Fifth level</a:t>
             </a:r>
-          </a:p>
-        </p:txBody>
-      </p:sp>
-      <p:sp>
-        <p:nvSpPr>
-          <p:cNvPr id="5" name="Text Placeholder 4">
-            <a:extLst>
-              <a:ext uri="{FF2B5EF4-FFF2-40B4-BE49-F238E27FC236}">
-                <a16:creationId xmlns:a16="http://schemas.microsoft.com/office/drawing/2014/main" id="{F2C6B8B1-1646-ED4A-A835-9B6A1B3F51B4}"/>
-              </a:ext>
-            </a:extLst>
-          </p:cNvPr>
+            <a:endParaRPr lang="en-US" dirty="0"/>
+          </a:p>
+        </p:txBody>
+      </p:sp>
+      <p:sp>
+        <p:nvSpPr>
+          <p:cNvPr id="5" name="Text Placeholder 4"/>
           <p:cNvSpPr>
             <a:spLocks noGrp="1"/>
           </p:cNvSpPr>
@@ -1688,8 +2525,8 @@
         </p:nvSpPr>
         <p:spPr>
           <a:xfrm>
-            <a:off x="6172201" y="1681163"/>
-            <a:ext cx="5183188" cy="823912"/>
+            <a:off x="6172200" y="1053451"/>
+            <a:ext cx="5183188" cy="516280"/>
           </a:xfrm>
         </p:spPr>
         <p:txBody>
@@ -1697,39 +2534,39 @@
           <a:lstStyle>
             <a:lvl1pPr marL="0" indent="0">
               <a:buNone/>
-              <a:defRPr sz="2400" b="1"/>
+              <a:defRPr sz="1504" b="1"/>
             </a:lvl1pPr>
-            <a:lvl2pPr marL="457200" indent="0">
-              <a:buNone/>
-              <a:defRPr sz="2000" b="1"/>
+            <a:lvl2pPr marL="286482" indent="0">
+              <a:buNone/>
+              <a:defRPr sz="1253" b="1"/>
             </a:lvl2pPr>
-            <a:lvl3pPr marL="914400" indent="0">
-              <a:buNone/>
-              <a:defRPr sz="1800" b="1"/>
+            <a:lvl3pPr marL="572963" indent="0">
+              <a:buNone/>
+              <a:defRPr sz="1128" b="1"/>
             </a:lvl3pPr>
-            <a:lvl4pPr marL="1371600" indent="0">
-              <a:buNone/>
-              <a:defRPr sz="1600" b="1"/>
+            <a:lvl4pPr marL="859445" indent="0">
+              <a:buNone/>
+              <a:defRPr sz="1003" b="1"/>
             </a:lvl4pPr>
-            <a:lvl5pPr marL="1828800" indent="0">
-              <a:buNone/>
-              <a:defRPr sz="1600" b="1"/>
+            <a:lvl5pPr marL="1145926" indent="0">
+              <a:buNone/>
+              <a:defRPr sz="1003" b="1"/>
             </a:lvl5pPr>
-            <a:lvl6pPr marL="2286000" indent="0">
-              <a:buNone/>
-              <a:defRPr sz="1600" b="1"/>
+            <a:lvl6pPr marL="1432408" indent="0">
+              <a:buNone/>
+              <a:defRPr sz="1003" b="1"/>
             </a:lvl6pPr>
-            <a:lvl7pPr marL="2743200" indent="0">
-              <a:buNone/>
-              <a:defRPr sz="1600" b="1"/>
+            <a:lvl7pPr marL="1718889" indent="0">
+              <a:buNone/>
+              <a:defRPr sz="1003" b="1"/>
             </a:lvl7pPr>
-            <a:lvl8pPr marL="3200400" indent="0">
-              <a:buNone/>
-              <a:defRPr sz="1600" b="1"/>
+            <a:lvl8pPr marL="2005371" indent="0">
+              <a:buNone/>
+              <a:defRPr sz="1003" b="1"/>
             </a:lvl8pPr>
-            <a:lvl9pPr marL="3657600" indent="0">
-              <a:buNone/>
-              <a:defRPr sz="1600" b="1"/>
+            <a:lvl9pPr marL="2291852" indent="0">
+              <a:buNone/>
+              <a:defRPr sz="1003" b="1"/>
             </a:lvl9pPr>
           </a:lstStyle>
           <a:p>
@@ -1743,13 +2580,7 @@
       </p:sp>
       <p:sp>
         <p:nvSpPr>
-          <p:cNvPr id="6" name="Content Placeholder 5">
-            <a:extLst>
-              <a:ext uri="{FF2B5EF4-FFF2-40B4-BE49-F238E27FC236}">
-                <a16:creationId xmlns:a16="http://schemas.microsoft.com/office/drawing/2014/main" id="{A210DBCC-EEEF-434F-B4C2-6FBC06553900}"/>
-              </a:ext>
-            </a:extLst>
-          </p:cNvPr>
+          <p:cNvPr id="6" name="Content Placeholder 5"/>
           <p:cNvSpPr>
             <a:spLocks noGrp="1"/>
           </p:cNvSpPr>
@@ -1759,8 +2590,8 @@
         </p:nvSpPr>
         <p:spPr>
           <a:xfrm>
-            <a:off x="6172201" y="2505075"/>
-            <a:ext cx="5183188" cy="3684588"/>
+            <a:off x="6172200" y="1569731"/>
+            <a:ext cx="5183188" cy="2308838"/>
           </a:xfrm>
         </p:spPr>
         <p:txBody>
@@ -1800,18 +2631,13 @@
               <a:rPr lang="en-US"/>
               <a:t>Fifth level</a:t>
             </a:r>
-          </a:p>
-        </p:txBody>
-      </p:sp>
-      <p:sp>
-        <p:nvSpPr>
-          <p:cNvPr id="7" name="Date Placeholder 6">
-            <a:extLst>
-              <a:ext uri="{FF2B5EF4-FFF2-40B4-BE49-F238E27FC236}">
-                <a16:creationId xmlns:a16="http://schemas.microsoft.com/office/drawing/2014/main" id="{6B41905A-5C4D-FE42-B826-395C95E2615A}"/>
-              </a:ext>
-            </a:extLst>
-          </p:cNvPr>
+            <a:endParaRPr lang="en-US" dirty="0"/>
+          </a:p>
+        </p:txBody>
+      </p:sp>
+      <p:sp>
+        <p:nvSpPr>
+          <p:cNvPr id="7" name="Date Placeholder 6"/>
           <p:cNvSpPr>
             <a:spLocks noGrp="1"/>
           </p:cNvSpPr>
@@ -1834,13 +2660,7 @@
       </p:sp>
       <p:sp>
         <p:nvSpPr>
-          <p:cNvPr id="8" name="Footer Placeholder 7">
-            <a:extLst>
-              <a:ext uri="{FF2B5EF4-FFF2-40B4-BE49-F238E27FC236}">
-                <a16:creationId xmlns:a16="http://schemas.microsoft.com/office/drawing/2014/main" id="{414DE5C8-3344-F848-B6B3-A37FC906AAC4}"/>
-              </a:ext>
-            </a:extLst>
-          </p:cNvPr>
+          <p:cNvPr id="8" name="Footer Placeholder 7"/>
           <p:cNvSpPr>
             <a:spLocks noGrp="1"/>
           </p:cNvSpPr>
@@ -1859,13 +2679,7 @@
       </p:sp>
       <p:sp>
         <p:nvSpPr>
-          <p:cNvPr id="9" name="Slide Number Placeholder 8">
-            <a:extLst>
-              <a:ext uri="{FF2B5EF4-FFF2-40B4-BE49-F238E27FC236}">
-                <a16:creationId xmlns:a16="http://schemas.microsoft.com/office/drawing/2014/main" id="{EAE9C0B7-0B56-D645-B67E-966DA2BEE4A3}"/>
-              </a:ext>
-            </a:extLst>
-          </p:cNvPr>
+          <p:cNvPr id="9" name="Slide Number Placeholder 8"/>
           <p:cNvSpPr>
             <a:spLocks noGrp="1"/>
           </p:cNvSpPr>
@@ -1889,7 +2703,7 @@
     </p:spTree>
     <p:extLst>
       <p:ext uri="{BB962C8B-B14F-4D97-AF65-F5344CB8AC3E}">
-        <p14:creationId xmlns:p14="http://schemas.microsoft.com/office/powerpoint/2010/main" val="1760712501"/>
+        <p14:creationId xmlns:p14="http://schemas.microsoft.com/office/powerpoint/2010/main" val="993423812"/>
       </p:ext>
     </p:extLst>
   </p:cSld>
@@ -1918,13 +2732,7 @@
       </p:grpSpPr>
       <p:sp>
         <p:nvSpPr>
-          <p:cNvPr id="2" name="Title 1">
-            <a:extLst>
-              <a:ext uri="{FF2B5EF4-FFF2-40B4-BE49-F238E27FC236}">
-                <a16:creationId xmlns:a16="http://schemas.microsoft.com/office/drawing/2014/main" id="{2C5445F5-6E5E-3642-9294-743A83244C44}"/>
-              </a:ext>
-            </a:extLst>
-          </p:cNvPr>
+          <p:cNvPr id="2" name="Title 1"/>
           <p:cNvSpPr>
             <a:spLocks noGrp="1"/>
           </p:cNvSpPr>
@@ -1941,18 +2749,13 @@
               <a:rPr lang="en-US"/>
               <a:t>Click to edit Master title style</a:t>
             </a:r>
-          </a:p>
-        </p:txBody>
-      </p:sp>
-      <p:sp>
-        <p:nvSpPr>
-          <p:cNvPr id="3" name="Date Placeholder 2">
-            <a:extLst>
-              <a:ext uri="{FF2B5EF4-FFF2-40B4-BE49-F238E27FC236}">
-                <a16:creationId xmlns:a16="http://schemas.microsoft.com/office/drawing/2014/main" id="{D29E8C35-AFB1-1440-8098-0A8CF5CC2FA3}"/>
-              </a:ext>
-            </a:extLst>
-          </p:cNvPr>
+            <a:endParaRPr lang="en-US" dirty="0"/>
+          </a:p>
+        </p:txBody>
+      </p:sp>
+      <p:sp>
+        <p:nvSpPr>
+          <p:cNvPr id="3" name="Date Placeholder 2"/>
           <p:cNvSpPr>
             <a:spLocks noGrp="1"/>
           </p:cNvSpPr>
@@ -1975,13 +2778,7 @@
       </p:sp>
       <p:sp>
         <p:nvSpPr>
-          <p:cNvPr id="4" name="Footer Placeholder 3">
-            <a:extLst>
-              <a:ext uri="{FF2B5EF4-FFF2-40B4-BE49-F238E27FC236}">
-                <a16:creationId xmlns:a16="http://schemas.microsoft.com/office/drawing/2014/main" id="{A1397232-45EA-CA47-8C5D-97716426D2E8}"/>
-              </a:ext>
-            </a:extLst>
-          </p:cNvPr>
+          <p:cNvPr id="4" name="Footer Placeholder 3"/>
           <p:cNvSpPr>
             <a:spLocks noGrp="1"/>
           </p:cNvSpPr>
@@ -2000,13 +2797,7 @@
       </p:sp>
       <p:sp>
         <p:nvSpPr>
-          <p:cNvPr id="5" name="Slide Number Placeholder 4">
-            <a:extLst>
-              <a:ext uri="{FF2B5EF4-FFF2-40B4-BE49-F238E27FC236}">
-                <a16:creationId xmlns:a16="http://schemas.microsoft.com/office/drawing/2014/main" id="{B26A9770-0F95-744D-A47C-EDE0DD46ED5E}"/>
-              </a:ext>
-            </a:extLst>
-          </p:cNvPr>
+          <p:cNvPr id="5" name="Slide Number Placeholder 4"/>
           <p:cNvSpPr>
             <a:spLocks noGrp="1"/>
           </p:cNvSpPr>
@@ -2030,7 +2821,7 @@
     </p:spTree>
     <p:extLst>
       <p:ext uri="{BB962C8B-B14F-4D97-AF65-F5344CB8AC3E}">
-        <p14:creationId xmlns:p14="http://schemas.microsoft.com/office/powerpoint/2010/main" val="102128341"/>
+        <p14:creationId xmlns:p14="http://schemas.microsoft.com/office/powerpoint/2010/main" val="3394268686"/>
       </p:ext>
     </p:extLst>
   </p:cSld>
@@ -2059,13 +2850,7 @@
       </p:grpSpPr>
       <p:sp>
         <p:nvSpPr>
-          <p:cNvPr id="2" name="Date Placeholder 1">
-            <a:extLst>
-              <a:ext uri="{FF2B5EF4-FFF2-40B4-BE49-F238E27FC236}">
-                <a16:creationId xmlns:a16="http://schemas.microsoft.com/office/drawing/2014/main" id="{90B9D1E6-2210-694B-A667-6DE96D08E43A}"/>
-              </a:ext>
-            </a:extLst>
-          </p:cNvPr>
+          <p:cNvPr id="2" name="Date Placeholder 1"/>
           <p:cNvSpPr>
             <a:spLocks noGrp="1"/>
           </p:cNvSpPr>
@@ -2088,13 +2873,7 @@
       </p:sp>
       <p:sp>
         <p:nvSpPr>
-          <p:cNvPr id="3" name="Footer Placeholder 2">
-            <a:extLst>
-              <a:ext uri="{FF2B5EF4-FFF2-40B4-BE49-F238E27FC236}">
-                <a16:creationId xmlns:a16="http://schemas.microsoft.com/office/drawing/2014/main" id="{9608DB58-BDED-B645-B81C-430C42E5F132}"/>
-              </a:ext>
-            </a:extLst>
-          </p:cNvPr>
+          <p:cNvPr id="3" name="Footer Placeholder 2"/>
           <p:cNvSpPr>
             <a:spLocks noGrp="1"/>
           </p:cNvSpPr>
@@ -2113,13 +2892,7 @@
       </p:sp>
       <p:sp>
         <p:nvSpPr>
-          <p:cNvPr id="4" name="Slide Number Placeholder 3">
-            <a:extLst>
-              <a:ext uri="{FF2B5EF4-FFF2-40B4-BE49-F238E27FC236}">
-                <a16:creationId xmlns:a16="http://schemas.microsoft.com/office/drawing/2014/main" id="{0380588B-D270-1849-B76D-2AC378B64436}"/>
-              </a:ext>
-            </a:extLst>
-          </p:cNvPr>
+          <p:cNvPr id="4" name="Slide Number Placeholder 3"/>
           <p:cNvSpPr>
             <a:spLocks noGrp="1"/>
           </p:cNvSpPr>
@@ -2143,7 +2916,7 @@
     </p:spTree>
     <p:extLst>
       <p:ext uri="{BB962C8B-B14F-4D97-AF65-F5344CB8AC3E}">
-        <p14:creationId xmlns:p14="http://schemas.microsoft.com/office/powerpoint/2010/main" val="3617753497"/>
+        <p14:creationId xmlns:p14="http://schemas.microsoft.com/office/powerpoint/2010/main" val="1500214235"/>
       </p:ext>
     </p:extLst>
   </p:cSld>
@@ -2172,13 +2945,7 @@
       </p:grpSpPr>
       <p:sp>
         <p:nvSpPr>
-          <p:cNvPr id="2" name="Title 1">
-            <a:extLst>
-              <a:ext uri="{FF2B5EF4-FFF2-40B4-BE49-F238E27FC236}">
-                <a16:creationId xmlns:a16="http://schemas.microsoft.com/office/drawing/2014/main" id="{DDDBC59C-D487-C242-9ACF-E60BE15B56C3}"/>
-              </a:ext>
-            </a:extLst>
-          </p:cNvPr>
+          <p:cNvPr id="2" name="Title 1"/>
           <p:cNvSpPr>
             <a:spLocks noGrp="1"/>
           </p:cNvSpPr>
@@ -2188,15 +2955,15 @@
         </p:nvSpPr>
         <p:spPr>
           <a:xfrm>
-            <a:off x="839788" y="457200"/>
-            <a:ext cx="3932237" cy="1600200"/>
+            <a:off x="839789" y="286491"/>
+            <a:ext cx="3932237" cy="1002718"/>
           </a:xfrm>
         </p:spPr>
         <p:txBody>
           <a:bodyPr anchor="b"/>
           <a:lstStyle>
             <a:lvl1pPr>
-              <a:defRPr sz="3200"/>
+              <a:defRPr sz="2005"/>
             </a:lvl1pPr>
           </a:lstStyle>
           <a:p>
@@ -2204,18 +2971,13 @@
               <a:rPr lang="en-US"/>
               <a:t>Click to edit Master title style</a:t>
             </a:r>
-          </a:p>
-        </p:txBody>
-      </p:sp>
-      <p:sp>
-        <p:nvSpPr>
-          <p:cNvPr id="3" name="Content Placeholder 2">
-            <a:extLst>
-              <a:ext uri="{FF2B5EF4-FFF2-40B4-BE49-F238E27FC236}">
-                <a16:creationId xmlns:a16="http://schemas.microsoft.com/office/drawing/2014/main" id="{EFAB8420-DD75-A841-A9A4-AC3B707D4BAC}"/>
-              </a:ext>
-            </a:extLst>
-          </p:cNvPr>
+            <a:endParaRPr lang="en-US" dirty="0"/>
+          </a:p>
+        </p:txBody>
+      </p:sp>
+      <p:sp>
+        <p:nvSpPr>
+          <p:cNvPr id="3" name="Content Placeholder 2"/>
           <p:cNvSpPr>
             <a:spLocks noGrp="1"/>
           </p:cNvSpPr>
@@ -2225,39 +2987,39 @@
         </p:nvSpPr>
         <p:spPr>
           <a:xfrm>
-            <a:off x="5183188" y="987427"/>
-            <a:ext cx="6172200" cy="4873625"/>
+            <a:off x="5183188" y="618741"/>
+            <a:ext cx="6172200" cy="3053913"/>
           </a:xfrm>
         </p:spPr>
         <p:txBody>
           <a:bodyPr/>
           <a:lstStyle>
             <a:lvl1pPr>
-              <a:defRPr sz="3200"/>
+              <a:defRPr sz="2005"/>
             </a:lvl1pPr>
             <a:lvl2pPr>
-              <a:defRPr sz="2800"/>
+              <a:defRPr sz="1754"/>
             </a:lvl2pPr>
             <a:lvl3pPr>
-              <a:defRPr sz="2400"/>
+              <a:defRPr sz="1504"/>
             </a:lvl3pPr>
             <a:lvl4pPr>
-              <a:defRPr sz="2000"/>
+              <a:defRPr sz="1253"/>
             </a:lvl4pPr>
             <a:lvl5pPr>
-              <a:defRPr sz="2000"/>
+              <a:defRPr sz="1253"/>
             </a:lvl5pPr>
             <a:lvl6pPr>
-              <a:defRPr sz="2000"/>
+              <a:defRPr sz="1253"/>
             </a:lvl6pPr>
             <a:lvl7pPr>
-              <a:defRPr sz="2000"/>
+              <a:defRPr sz="1253"/>
             </a:lvl7pPr>
             <a:lvl8pPr>
-              <a:defRPr sz="2000"/>
+              <a:defRPr sz="1253"/>
             </a:lvl8pPr>
             <a:lvl9pPr>
-              <a:defRPr sz="2000"/>
+              <a:defRPr sz="1253"/>
             </a:lvl9pPr>
           </a:lstStyle>
           <a:p>
@@ -2294,18 +3056,13 @@
               <a:rPr lang="en-US"/>
               <a:t>Fifth level</a:t>
             </a:r>
-          </a:p>
-        </p:txBody>
-      </p:sp>
-      <p:sp>
-        <p:nvSpPr>
-          <p:cNvPr id="4" name="Text Placeholder 3">
-            <a:extLst>
-              <a:ext uri="{FF2B5EF4-FFF2-40B4-BE49-F238E27FC236}">
-                <a16:creationId xmlns:a16="http://schemas.microsoft.com/office/drawing/2014/main" id="{A2437F99-86C2-634B-8538-92F1293C57FC}"/>
-              </a:ext>
-            </a:extLst>
-          </p:cNvPr>
+            <a:endParaRPr lang="en-US" dirty="0"/>
+          </a:p>
+        </p:txBody>
+      </p:sp>
+      <p:sp>
+        <p:nvSpPr>
+          <p:cNvPr id="4" name="Text Placeholder 3"/>
           <p:cNvSpPr>
             <a:spLocks noGrp="1"/>
           </p:cNvSpPr>
@@ -2315,8 +3072,8 @@
         </p:nvSpPr>
         <p:spPr>
           <a:xfrm>
-            <a:off x="839788" y="2057400"/>
-            <a:ext cx="3932237" cy="3811588"/>
+            <a:off x="839789" y="1289209"/>
+            <a:ext cx="3932237" cy="2388419"/>
           </a:xfrm>
         </p:spPr>
         <p:txBody>
@@ -2324,39 +3081,39 @@
           <a:lstStyle>
             <a:lvl1pPr marL="0" indent="0">
               <a:buNone/>
-              <a:defRPr sz="1600"/>
+              <a:defRPr sz="1003"/>
             </a:lvl1pPr>
-            <a:lvl2pPr marL="457200" indent="0">
-              <a:buNone/>
-              <a:defRPr sz="1400"/>
+            <a:lvl2pPr marL="286482" indent="0">
+              <a:buNone/>
+              <a:defRPr sz="877"/>
             </a:lvl2pPr>
-            <a:lvl3pPr marL="914400" indent="0">
-              <a:buNone/>
-              <a:defRPr sz="1200"/>
+            <a:lvl3pPr marL="572963" indent="0">
+              <a:buNone/>
+              <a:defRPr sz="752"/>
             </a:lvl3pPr>
-            <a:lvl4pPr marL="1371600" indent="0">
-              <a:buNone/>
-              <a:defRPr sz="1000"/>
+            <a:lvl4pPr marL="859445" indent="0">
+              <a:buNone/>
+              <a:defRPr sz="627"/>
             </a:lvl4pPr>
-            <a:lvl5pPr marL="1828800" indent="0">
-              <a:buNone/>
-              <a:defRPr sz="1000"/>
+            <a:lvl5pPr marL="1145926" indent="0">
+              <a:buNone/>
+              <a:defRPr sz="627"/>
             </a:lvl5pPr>
-            <a:lvl6pPr marL="2286000" indent="0">
-              <a:buNone/>
-              <a:defRPr sz="1000"/>
+            <a:lvl6pPr marL="1432408" indent="0">
+              <a:buNone/>
+              <a:defRPr sz="627"/>
             </a:lvl6pPr>
-            <a:lvl7pPr marL="2743200" indent="0">
-              <a:buNone/>
-              <a:defRPr sz="1000"/>
+            <a:lvl7pPr marL="1718889" indent="0">
+              <a:buNone/>
+              <a:defRPr sz="627"/>
             </a:lvl7pPr>
-            <a:lvl8pPr marL="3200400" indent="0">
-              <a:buNone/>
-              <a:defRPr sz="1000"/>
+            <a:lvl8pPr marL="2005371" indent="0">
+              <a:buNone/>
+              <a:defRPr sz="627"/>
             </a:lvl8pPr>
-            <a:lvl9pPr marL="3657600" indent="0">
-              <a:buNone/>
-              <a:defRPr sz="1000"/>
+            <a:lvl9pPr marL="2291852" indent="0">
+              <a:buNone/>
+              <a:defRPr sz="627"/>
             </a:lvl9pPr>
           </a:lstStyle>
           <a:p>
@@ -2370,13 +3127,7 @@
       </p:sp>
       <p:sp>
         <p:nvSpPr>
-          <p:cNvPr id="5" name="Date Placeholder 4">
-            <a:extLst>
-              <a:ext uri="{FF2B5EF4-FFF2-40B4-BE49-F238E27FC236}">
-                <a16:creationId xmlns:a16="http://schemas.microsoft.com/office/drawing/2014/main" id="{D5E22C96-C50E-7C4D-97B0-ADA6FEC2640A}"/>
-              </a:ext>
-            </a:extLst>
-          </p:cNvPr>
+          <p:cNvPr id="5" name="Date Placeholder 4"/>
           <p:cNvSpPr>
             <a:spLocks noGrp="1"/>
           </p:cNvSpPr>
@@ -2399,13 +3150,7 @@
       </p:sp>
       <p:sp>
         <p:nvSpPr>
-          <p:cNvPr id="6" name="Footer Placeholder 5">
-            <a:extLst>
-              <a:ext uri="{FF2B5EF4-FFF2-40B4-BE49-F238E27FC236}">
-                <a16:creationId xmlns:a16="http://schemas.microsoft.com/office/drawing/2014/main" id="{5CB2C0B0-048F-1F48-A63E-89DD61302540}"/>
-              </a:ext>
-            </a:extLst>
-          </p:cNvPr>
+          <p:cNvPr id="6" name="Footer Placeholder 5"/>
           <p:cNvSpPr>
             <a:spLocks noGrp="1"/>
           </p:cNvSpPr>
@@ -2424,13 +3169,7 @@
       </p:sp>
       <p:sp>
         <p:nvSpPr>
-          <p:cNvPr id="7" name="Slide Number Placeholder 6">
-            <a:extLst>
-              <a:ext uri="{FF2B5EF4-FFF2-40B4-BE49-F238E27FC236}">
-                <a16:creationId xmlns:a16="http://schemas.microsoft.com/office/drawing/2014/main" id="{3E1BE2F9-15D9-6D4D-BFE5-B4AF16A24610}"/>
-              </a:ext>
-            </a:extLst>
-          </p:cNvPr>
+          <p:cNvPr id="7" name="Slide Number Placeholder 6"/>
           <p:cNvSpPr>
             <a:spLocks noGrp="1"/>
           </p:cNvSpPr>
@@ -2454,7 +3193,7 @@
     </p:spTree>
     <p:extLst>
       <p:ext uri="{BB962C8B-B14F-4D97-AF65-F5344CB8AC3E}">
-        <p14:creationId xmlns:p14="http://schemas.microsoft.com/office/powerpoint/2010/main" val="307566853"/>
+        <p14:creationId xmlns:p14="http://schemas.microsoft.com/office/powerpoint/2010/main" val="2017209573"/>
       </p:ext>
     </p:extLst>
   </p:cSld>
@@ -2483,13 +3222,7 @@
       </p:grpSpPr>
       <p:sp>
         <p:nvSpPr>
-          <p:cNvPr id="2" name="Title 1">
-            <a:extLst>
-              <a:ext uri="{FF2B5EF4-FFF2-40B4-BE49-F238E27FC236}">
-                <a16:creationId xmlns:a16="http://schemas.microsoft.com/office/drawing/2014/main" id="{E93D0A6D-4D63-9243-B20A-7A43B6B61295}"/>
-              </a:ext>
-            </a:extLst>
-          </p:cNvPr>
+          <p:cNvPr id="2" name="Title 1"/>
           <p:cNvSpPr>
             <a:spLocks noGrp="1"/>
           </p:cNvSpPr>
@@ -2499,15 +3232,15 @@
         </p:nvSpPr>
         <p:spPr>
           <a:xfrm>
-            <a:off x="839788" y="457200"/>
-            <a:ext cx="3932237" cy="1600200"/>
+            <a:off x="839789" y="286491"/>
+            <a:ext cx="3932237" cy="1002718"/>
           </a:xfrm>
         </p:spPr>
         <p:txBody>
           <a:bodyPr anchor="b"/>
           <a:lstStyle>
             <a:lvl1pPr>
-              <a:defRPr sz="3200"/>
+              <a:defRPr sz="2005"/>
             </a:lvl1pPr>
           </a:lstStyle>
           <a:p>
@@ -2515,20 +3248,15 @@
               <a:rPr lang="en-US"/>
               <a:t>Click to edit Master title style</a:t>
             </a:r>
-          </a:p>
-        </p:txBody>
-      </p:sp>
-      <p:sp>
-        <p:nvSpPr>
-          <p:cNvPr id="3" name="Picture Placeholder 2">
-            <a:extLst>
-              <a:ext uri="{FF2B5EF4-FFF2-40B4-BE49-F238E27FC236}">
-                <a16:creationId xmlns:a16="http://schemas.microsoft.com/office/drawing/2014/main" id="{A4643E54-F805-B741-9908-EACDD1E3D67B}"/>
-              </a:ext>
-            </a:extLst>
-          </p:cNvPr>
-          <p:cNvSpPr>
-            <a:spLocks noGrp="1"/>
+            <a:endParaRPr lang="en-US" dirty="0"/>
+          </a:p>
+        </p:txBody>
+      </p:sp>
+      <p:sp>
+        <p:nvSpPr>
+          <p:cNvPr id="3" name="Picture Placeholder 2"/>
+          <p:cNvSpPr>
+            <a:spLocks noGrp="1" noChangeAspect="1"/>
           </p:cNvSpPr>
           <p:nvPr>
             <p:ph type="pic" idx="1"/>
@@ -2536,8 +3264,73 @@
         </p:nvSpPr>
         <p:spPr>
           <a:xfrm>
-            <a:off x="5183188" y="987427"/>
-            <a:ext cx="6172200" cy="4873625"/>
+            <a:off x="5183188" y="618741"/>
+            <a:ext cx="6172200" cy="3053913"/>
+          </a:xfrm>
+        </p:spPr>
+        <p:txBody>
+          <a:bodyPr anchor="t"/>
+          <a:lstStyle>
+            <a:lvl1pPr marL="0" indent="0">
+              <a:buNone/>
+              <a:defRPr sz="2005"/>
+            </a:lvl1pPr>
+            <a:lvl2pPr marL="286482" indent="0">
+              <a:buNone/>
+              <a:defRPr sz="1754"/>
+            </a:lvl2pPr>
+            <a:lvl3pPr marL="572963" indent="0">
+              <a:buNone/>
+              <a:defRPr sz="1504"/>
+            </a:lvl3pPr>
+            <a:lvl4pPr marL="859445" indent="0">
+              <a:buNone/>
+              <a:defRPr sz="1253"/>
+            </a:lvl4pPr>
+            <a:lvl5pPr marL="1145926" indent="0">
+              <a:buNone/>
+              <a:defRPr sz="1253"/>
+            </a:lvl5pPr>
+            <a:lvl6pPr marL="1432408" indent="0">
+              <a:buNone/>
+              <a:defRPr sz="1253"/>
+            </a:lvl6pPr>
+            <a:lvl7pPr marL="1718889" indent="0">
+              <a:buNone/>
+              <a:defRPr sz="1253"/>
+            </a:lvl7pPr>
+            <a:lvl8pPr marL="2005371" indent="0">
+              <a:buNone/>
+              <a:defRPr sz="1253"/>
+            </a:lvl8pPr>
+            <a:lvl9pPr marL="2291852" indent="0">
+              <a:buNone/>
+              <a:defRPr sz="1253"/>
+            </a:lvl9pPr>
+          </a:lstStyle>
+          <a:p>
+            <a:r>
+              <a:rPr lang="en-US"/>
+              <a:t>Click icon to add picture</a:t>
+            </a:r>
+            <a:endParaRPr lang="en-US" dirty="0"/>
+          </a:p>
+        </p:txBody>
+      </p:sp>
+      <p:sp>
+        <p:nvSpPr>
+          <p:cNvPr id="4" name="Text Placeholder 3"/>
+          <p:cNvSpPr>
+            <a:spLocks noGrp="1"/>
+          </p:cNvSpPr>
+          <p:nvPr>
+            <p:ph type="body" sz="half" idx="2"/>
+          </p:nvPr>
+        </p:nvSpPr>
+        <p:spPr>
+          <a:xfrm>
+            <a:off x="839789" y="1289209"/>
+            <a:ext cx="3932237" cy="2388419"/>
           </a:xfrm>
         </p:spPr>
         <p:txBody>
@@ -2545,109 +3338,42 @@
           <a:lstStyle>
             <a:lvl1pPr marL="0" indent="0">
               <a:buNone/>
-              <a:defRPr sz="3200"/>
+              <a:defRPr sz="1003"/>
             </a:lvl1pPr>
-            <a:lvl2pPr marL="457200" indent="0">
-              <a:buNone/>
-              <a:defRPr sz="2800"/>
+            <a:lvl2pPr marL="286482" indent="0">
+              <a:buNone/>
+              <a:defRPr sz="877"/>
             </a:lvl2pPr>
-            <a:lvl3pPr marL="914400" indent="0">
-              <a:buNone/>
-              <a:defRPr sz="2400"/>
+            <a:lvl3pPr marL="572963" indent="0">
+              <a:buNone/>
+              <a:defRPr sz="752"/>
             </a:lvl3pPr>
-            <a:lvl4pPr marL="1371600" indent="0">
-              <a:buNone/>
-              <a:defRPr sz="2000"/>
+            <a:lvl4pPr marL="859445" indent="0">
+              <a:buNone/>
+              <a:defRPr sz="627"/>
             </a:lvl4pPr>
-            <a:lvl5pPr marL="1828800" indent="0">
-              <a:buNone/>
-              <a:defRPr sz="2000"/>
+            <a:lvl5pPr marL="1145926" indent="0">
+              <a:buNone/>
+              <a:defRPr sz="627"/>
             </a:lvl5pPr>
-            <a:lvl6pPr marL="2286000" indent="0">
-              <a:buNone/>
-              <a:defRPr sz="2000"/>
+            <a:lvl6pPr marL="1432408" indent="0">
+              <a:buNone/>
+              <a:defRPr sz="627"/>
             </a:lvl6pPr>
-            <a:lvl7pPr marL="2743200" indent="0">
-              <a:buNone/>
-              <a:defRPr sz="2000"/>
+            <a:lvl7pPr marL="1718889" indent="0">
+              <a:buNone/>
+              <a:defRPr sz="627"/>
             </a:lvl7pPr>
-            <a:lvl8pPr marL="3200400" indent="0">
-              <a:buNone/>
-              <a:defRPr sz="2000"/>
+            <a:lvl8pPr marL="2005371" indent="0">
+              <a:buNone/>
+              <a:defRPr sz="627"/>
             </a:lvl8pPr>
-            <a:lvl9pPr marL="3657600" indent="0">
-              <a:buNone/>
-              <a:defRPr sz="2000"/>
+            <a:lvl9pPr marL="2291852" indent="0">
+              <a:buNone/>
+              <a:defRPr sz="627"/>
             </a:lvl9pPr>
           </a:lstStyle>
           <a:p>
-            <a:endParaRPr lang="en-US"/>
-          </a:p>
-        </p:txBody>
-      </p:sp>
-      <p:sp>
-        <p:nvSpPr>
-          <p:cNvPr id="4" name="Text Placeholder 3">
-            <a:extLst>
-              <a:ext uri="{FF2B5EF4-FFF2-40B4-BE49-F238E27FC236}">
-                <a16:creationId xmlns:a16="http://schemas.microsoft.com/office/drawing/2014/main" id="{C740557C-F911-5F41-8B89-C9223CB94609}"/>
-              </a:ext>
-            </a:extLst>
-          </p:cNvPr>
-          <p:cNvSpPr>
-            <a:spLocks noGrp="1"/>
-          </p:cNvSpPr>
-          <p:nvPr>
-            <p:ph type="body" sz="half" idx="2"/>
-          </p:nvPr>
-        </p:nvSpPr>
-        <p:spPr>
-          <a:xfrm>
-            <a:off x="839788" y="2057400"/>
-            <a:ext cx="3932237" cy="3811588"/>
-          </a:xfrm>
-        </p:spPr>
-        <p:txBody>
-          <a:bodyPr/>
-          <a:lstStyle>
-            <a:lvl1pPr marL="0" indent="0">
-              <a:buNone/>
-              <a:defRPr sz="1600"/>
-            </a:lvl1pPr>
-            <a:lvl2pPr marL="457200" indent="0">
-              <a:buNone/>
-              <a:defRPr sz="1400"/>
-            </a:lvl2pPr>
-            <a:lvl3pPr marL="914400" indent="0">
-              <a:buNone/>
-              <a:defRPr sz="1200"/>
-            </a:lvl3pPr>
-            <a:lvl4pPr marL="1371600" indent="0">
-              <a:buNone/>
-              <a:defRPr sz="1000"/>
-            </a:lvl4pPr>
-            <a:lvl5pPr marL="1828800" indent="0">
-              <a:buNone/>
-              <a:defRPr sz="1000"/>
-            </a:lvl5pPr>
-            <a:lvl6pPr marL="2286000" indent="0">
-              <a:buNone/>
-              <a:defRPr sz="1000"/>
-            </a:lvl6pPr>
-            <a:lvl7pPr marL="2743200" indent="0">
-              <a:buNone/>
-              <a:defRPr sz="1000"/>
-            </a:lvl7pPr>
-            <a:lvl8pPr marL="3200400" indent="0">
-              <a:buNone/>
-              <a:defRPr sz="1000"/>
-            </a:lvl8pPr>
-            <a:lvl9pPr marL="3657600" indent="0">
-              <a:buNone/>
-              <a:defRPr sz="1000"/>
-            </a:lvl9pPr>
-          </a:lstStyle>
-          <a:p>
             <a:pPr lvl="0"/>
             <a:r>
               <a:rPr lang="en-US"/>
@@ -2658,13 +3384,7 @@
       </p:sp>
       <p:sp>
         <p:nvSpPr>
-          <p:cNvPr id="5" name="Date Placeholder 4">
-            <a:extLst>
-              <a:ext uri="{FF2B5EF4-FFF2-40B4-BE49-F238E27FC236}">
-                <a16:creationId xmlns:a16="http://schemas.microsoft.com/office/drawing/2014/main" id="{1901565A-10DB-FA4C-B68A-99EFFBE20CB4}"/>
-              </a:ext>
-            </a:extLst>
-          </p:cNvPr>
+          <p:cNvPr id="5" name="Date Placeholder 4"/>
           <p:cNvSpPr>
             <a:spLocks noGrp="1"/>
           </p:cNvSpPr>
@@ -2687,13 +3407,7 @@
       </p:sp>
       <p:sp>
         <p:nvSpPr>
-          <p:cNvPr id="6" name="Footer Placeholder 5">
-            <a:extLst>
-              <a:ext uri="{FF2B5EF4-FFF2-40B4-BE49-F238E27FC236}">
-                <a16:creationId xmlns:a16="http://schemas.microsoft.com/office/drawing/2014/main" id="{272D1B98-AADF-9A46-A8FF-4E73EA38708C}"/>
-              </a:ext>
-            </a:extLst>
-          </p:cNvPr>
+          <p:cNvPr id="6" name="Footer Placeholder 5"/>
           <p:cNvSpPr>
             <a:spLocks noGrp="1"/>
           </p:cNvSpPr>
@@ -2712,13 +3426,7 @@
       </p:sp>
       <p:sp>
         <p:nvSpPr>
-          <p:cNvPr id="7" name="Slide Number Placeholder 6">
-            <a:extLst>
-              <a:ext uri="{FF2B5EF4-FFF2-40B4-BE49-F238E27FC236}">
-                <a16:creationId xmlns:a16="http://schemas.microsoft.com/office/drawing/2014/main" id="{C7E4FBB5-A4E1-1346-AB43-712A31A72C37}"/>
-              </a:ext>
-            </a:extLst>
-          </p:cNvPr>
+          <p:cNvPr id="7" name="Slide Number Placeholder 6"/>
           <p:cNvSpPr>
             <a:spLocks noGrp="1"/>
           </p:cNvSpPr>
@@ -2742,7 +3450,7 @@
     </p:spTree>
     <p:extLst>
       <p:ext uri="{BB962C8B-B14F-4D97-AF65-F5344CB8AC3E}">
-        <p14:creationId xmlns:p14="http://schemas.microsoft.com/office/powerpoint/2010/main" val="2402241040"/>
+        <p14:creationId xmlns:p14="http://schemas.microsoft.com/office/powerpoint/2010/main" val="3421154661"/>
       </p:ext>
     </p:extLst>
   </p:cSld>
@@ -2776,13 +3484,7 @@
       </p:grpSpPr>
       <p:sp>
         <p:nvSpPr>
-          <p:cNvPr id="2" name="Title Placeholder 1">
-            <a:extLst>
-              <a:ext uri="{FF2B5EF4-FFF2-40B4-BE49-F238E27FC236}">
-                <a16:creationId xmlns:a16="http://schemas.microsoft.com/office/drawing/2014/main" id="{8F917708-077B-424A-8247-574FC47C7C85}"/>
-              </a:ext>
-            </a:extLst>
-          </p:cNvPr>
+          <p:cNvPr id="2" name="Title Placeholder 1"/>
           <p:cNvSpPr>
             <a:spLocks noGrp="1"/>
           </p:cNvSpPr>
@@ -2792,8 +3494,8 @@
         </p:nvSpPr>
         <p:spPr>
           <a:xfrm>
-            <a:off x="838200" y="365127"/>
-            <a:ext cx="10515600" cy="1325563"/>
+            <a:off x="838200" y="228795"/>
+            <a:ext cx="10515600" cy="830625"/>
           </a:xfrm>
           <a:prstGeom prst="rect">
             <a:avLst/>
@@ -2809,18 +3511,13 @@
               <a:rPr lang="en-US"/>
               <a:t>Click to edit Master title style</a:t>
             </a:r>
-          </a:p>
-        </p:txBody>
-      </p:sp>
-      <p:sp>
-        <p:nvSpPr>
-          <p:cNvPr id="3" name="Text Placeholder 2">
-            <a:extLst>
-              <a:ext uri="{FF2B5EF4-FFF2-40B4-BE49-F238E27FC236}">
-                <a16:creationId xmlns:a16="http://schemas.microsoft.com/office/drawing/2014/main" id="{14591573-FA67-4548-B010-619E87EF2F61}"/>
-              </a:ext>
-            </a:extLst>
-          </p:cNvPr>
+            <a:endParaRPr lang="en-US" dirty="0"/>
+          </a:p>
+        </p:txBody>
+      </p:sp>
+      <p:sp>
+        <p:nvSpPr>
+          <p:cNvPr id="3" name="Text Placeholder 2"/>
           <p:cNvSpPr>
             <a:spLocks noGrp="1"/>
           </p:cNvSpPr>
@@ -2830,8 +3527,8 @@
         </p:nvSpPr>
         <p:spPr>
           <a:xfrm>
-            <a:off x="838200" y="1825625"/>
-            <a:ext cx="10515600" cy="4351338"/>
+            <a:off x="838200" y="1143974"/>
+            <a:ext cx="10515600" cy="2726637"/>
           </a:xfrm>
           <a:prstGeom prst="rect">
             <a:avLst/>
@@ -2876,18 +3573,13 @@
               <a:rPr lang="en-US"/>
               <a:t>Fifth level</a:t>
             </a:r>
-          </a:p>
-        </p:txBody>
-      </p:sp>
-      <p:sp>
-        <p:nvSpPr>
-          <p:cNvPr id="4" name="Date Placeholder 3">
-            <a:extLst>
-              <a:ext uri="{FF2B5EF4-FFF2-40B4-BE49-F238E27FC236}">
-                <a16:creationId xmlns:a16="http://schemas.microsoft.com/office/drawing/2014/main" id="{F3DECA9E-7073-2249-9F93-B2A5A64B6FE1}"/>
-              </a:ext>
-            </a:extLst>
-          </p:cNvPr>
+            <a:endParaRPr lang="en-US" dirty="0"/>
+          </a:p>
+        </p:txBody>
+      </p:sp>
+      <p:sp>
+        <p:nvSpPr>
+          <p:cNvPr id="4" name="Date Placeholder 3"/>
           <p:cNvSpPr>
             <a:spLocks noGrp="1"/>
           </p:cNvSpPr>
@@ -2897,8 +3589,8 @@
         </p:nvSpPr>
         <p:spPr>
           <a:xfrm>
-            <a:off x="838200" y="6356352"/>
-            <a:ext cx="2743200" cy="365125"/>
+            <a:off x="838200" y="3983019"/>
+            <a:ext cx="2743200" cy="228795"/>
           </a:xfrm>
           <a:prstGeom prst="rect">
             <a:avLst/>
@@ -2908,7 +3600,7 @@
           <a:bodyPr vert="horz" lIns="91440" tIns="45720" rIns="91440" bIns="45720" rtlCol="0" anchor="ctr"/>
           <a:lstStyle>
             <a:lvl1pPr algn="l">
-              <a:defRPr sz="1200">
+              <a:defRPr sz="752">
                 <a:solidFill>
                   <a:schemeClr val="tx1">
                     <a:tint val="75000"/>
@@ -2928,13 +3620,7 @@
       </p:sp>
       <p:sp>
         <p:nvSpPr>
-          <p:cNvPr id="5" name="Footer Placeholder 4">
-            <a:extLst>
-              <a:ext uri="{FF2B5EF4-FFF2-40B4-BE49-F238E27FC236}">
-                <a16:creationId xmlns:a16="http://schemas.microsoft.com/office/drawing/2014/main" id="{2304D58B-5F9D-9C47-8147-4DDD6A4E2B00}"/>
-              </a:ext>
-            </a:extLst>
-          </p:cNvPr>
+          <p:cNvPr id="5" name="Footer Placeholder 4"/>
           <p:cNvSpPr>
             <a:spLocks noGrp="1"/>
           </p:cNvSpPr>
@@ -2944,8 +3630,8 @@
         </p:nvSpPr>
         <p:spPr>
           <a:xfrm>
-            <a:off x="4038600" y="6356352"/>
-            <a:ext cx="4114800" cy="365125"/>
+            <a:off x="4038600" y="3983019"/>
+            <a:ext cx="4114800" cy="228795"/>
           </a:xfrm>
           <a:prstGeom prst="rect">
             <a:avLst/>
@@ -2955,7 +3641,7 @@
           <a:bodyPr vert="horz" lIns="91440" tIns="45720" rIns="91440" bIns="45720" rtlCol="0" anchor="ctr"/>
           <a:lstStyle>
             <a:lvl1pPr algn="ctr">
-              <a:defRPr sz="1200">
+              <a:defRPr sz="752">
                 <a:solidFill>
                   <a:schemeClr val="tx1">
                     <a:tint val="75000"/>
@@ -2971,13 +3657,7 @@
       </p:sp>
       <p:sp>
         <p:nvSpPr>
-          <p:cNvPr id="6" name="Slide Number Placeholder 5">
-            <a:extLst>
-              <a:ext uri="{FF2B5EF4-FFF2-40B4-BE49-F238E27FC236}">
-                <a16:creationId xmlns:a16="http://schemas.microsoft.com/office/drawing/2014/main" id="{53C5D6CD-7E87-5C44-93A9-DC1FAA1FF6A1}"/>
-              </a:ext>
-            </a:extLst>
-          </p:cNvPr>
+          <p:cNvPr id="6" name="Slide Number Placeholder 5"/>
           <p:cNvSpPr>
             <a:spLocks noGrp="1"/>
           </p:cNvSpPr>
@@ -2987,8 +3667,8 @@
         </p:nvSpPr>
         <p:spPr>
           <a:xfrm>
-            <a:off x="8610600" y="6356352"/>
-            <a:ext cx="2743200" cy="365125"/>
+            <a:off x="8610600" y="3983019"/>
+            <a:ext cx="2743200" cy="228795"/>
           </a:xfrm>
           <a:prstGeom prst="rect">
             <a:avLst/>
@@ -2998,7 +3678,7 @@
           <a:bodyPr vert="horz" lIns="91440" tIns="45720" rIns="91440" bIns="45720" rtlCol="0" anchor="ctr"/>
           <a:lstStyle>
             <a:lvl1pPr algn="r">
-              <a:defRPr sz="1200">
+              <a:defRPr sz="752">
                 <a:solidFill>
                   <a:schemeClr val="tx1">
                     <a:tint val="75000"/>
@@ -3019,27 +3699,27 @@
     </p:spTree>
     <p:extLst>
       <p:ext uri="{BB962C8B-B14F-4D97-AF65-F5344CB8AC3E}">
-        <p14:creationId xmlns:p14="http://schemas.microsoft.com/office/powerpoint/2010/main" val="1699699990"/>
+        <p14:creationId xmlns:p14="http://schemas.microsoft.com/office/powerpoint/2010/main" val="3708391659"/>
       </p:ext>
     </p:extLst>
   </p:cSld>
   <p:clrMap bg1="lt1" tx1="dk1" bg2="lt2" tx2="dk2" accent1="accent1" accent2="accent2" accent3="accent3" accent4="accent4" accent5="accent5" accent6="accent6" hlink="hlink" folHlink="folHlink"/>
   <p:sldLayoutIdLst>
-    <p:sldLayoutId id="2147483649" r:id="rId1"/>
-    <p:sldLayoutId id="2147483650" r:id="rId2"/>
-    <p:sldLayoutId id="2147483651" r:id="rId3"/>
-    <p:sldLayoutId id="2147483652" r:id="rId4"/>
-    <p:sldLayoutId id="2147483653" r:id="rId5"/>
-    <p:sldLayoutId id="2147483654" r:id="rId6"/>
-    <p:sldLayoutId id="2147483655" r:id="rId7"/>
-    <p:sldLayoutId id="2147483656" r:id="rId8"/>
-    <p:sldLayoutId id="2147483657" r:id="rId9"/>
-    <p:sldLayoutId id="2147483658" r:id="rId10"/>
-    <p:sldLayoutId id="2147483659" r:id="rId11"/>
+    <p:sldLayoutId id="2147483673" r:id="rId1"/>
+    <p:sldLayoutId id="2147483674" r:id="rId2"/>
+    <p:sldLayoutId id="2147483675" r:id="rId3"/>
+    <p:sldLayoutId id="2147483676" r:id="rId4"/>
+    <p:sldLayoutId id="2147483677" r:id="rId5"/>
+    <p:sldLayoutId id="2147483678" r:id="rId6"/>
+    <p:sldLayoutId id="2147483679" r:id="rId7"/>
+    <p:sldLayoutId id="2147483680" r:id="rId8"/>
+    <p:sldLayoutId id="2147483681" r:id="rId9"/>
+    <p:sldLayoutId id="2147483682" r:id="rId10"/>
+    <p:sldLayoutId id="2147483683" r:id="rId11"/>
   </p:sldLayoutIdLst>
   <p:txStyles>
     <p:titleStyle>
-      <a:lvl1pPr algn="l" defTabSz="914400" rtl="0" eaLnBrk="1" latinLnBrk="0" hangingPunct="1">
+      <a:lvl1pPr algn="l" defTabSz="572963" rtl="0" eaLnBrk="1" latinLnBrk="0" hangingPunct="1">
         <a:lnSpc>
           <a:spcPct val="90000"/>
         </a:lnSpc>
@@ -3047,7 +3727,7 @@
           <a:spcPct val="0"/>
         </a:spcBef>
         <a:buNone/>
-        <a:defRPr sz="4400" kern="1200">
+        <a:defRPr sz="2757" kern="1200">
           <a:solidFill>
             <a:schemeClr val="tx1"/>
           </a:solidFill>
@@ -3058,16 +3738,16 @@
       </a:lvl1pPr>
     </p:titleStyle>
     <p:bodyStyle>
-      <a:lvl1pPr marL="228600" indent="-228600" algn="l" defTabSz="914400" rtl="0" eaLnBrk="1" latinLnBrk="0" hangingPunct="1">
+      <a:lvl1pPr marL="143241" indent="-143241" algn="l" defTabSz="572963" rtl="0" eaLnBrk="1" latinLnBrk="0" hangingPunct="1">
         <a:lnSpc>
           <a:spcPct val="90000"/>
         </a:lnSpc>
         <a:spcBef>
-          <a:spcPts val="1000"/>
+          <a:spcPts val="627"/>
         </a:spcBef>
         <a:buFont typeface="Arial" panose="020B0604020202020204" pitchFamily="34" charset="0"/>
         <a:buChar char="•"/>
-        <a:defRPr sz="2800" kern="1200">
+        <a:defRPr sz="1754" kern="1200">
           <a:solidFill>
             <a:schemeClr val="tx1"/>
           </a:solidFill>
@@ -3076,16 +3756,16 @@
           <a:cs typeface="+mn-cs"/>
         </a:defRPr>
       </a:lvl1pPr>
-      <a:lvl2pPr marL="685800" indent="-228600" algn="l" defTabSz="914400" rtl="0" eaLnBrk="1" latinLnBrk="0" hangingPunct="1">
+      <a:lvl2pPr marL="429722" indent="-143241" algn="l" defTabSz="572963" rtl="0" eaLnBrk="1" latinLnBrk="0" hangingPunct="1">
         <a:lnSpc>
           <a:spcPct val="90000"/>
         </a:lnSpc>
         <a:spcBef>
-          <a:spcPts val="500"/>
+          <a:spcPts val="313"/>
         </a:spcBef>
         <a:buFont typeface="Arial" panose="020B0604020202020204" pitchFamily="34" charset="0"/>
         <a:buChar char="•"/>
-        <a:defRPr sz="2400" kern="1200">
+        <a:defRPr sz="1504" kern="1200">
           <a:solidFill>
             <a:schemeClr val="tx1"/>
           </a:solidFill>
@@ -3094,16 +3774,16 @@
           <a:cs typeface="+mn-cs"/>
         </a:defRPr>
       </a:lvl2pPr>
-      <a:lvl3pPr marL="1143000" indent="-228600" algn="l" defTabSz="914400" rtl="0" eaLnBrk="1" latinLnBrk="0" hangingPunct="1">
+      <a:lvl3pPr marL="716204" indent="-143241" algn="l" defTabSz="572963" rtl="0" eaLnBrk="1" latinLnBrk="0" hangingPunct="1">
         <a:lnSpc>
           <a:spcPct val="90000"/>
         </a:lnSpc>
         <a:spcBef>
-          <a:spcPts val="500"/>
+          <a:spcPts val="313"/>
         </a:spcBef>
         <a:buFont typeface="Arial" panose="020B0604020202020204" pitchFamily="34" charset="0"/>
         <a:buChar char="•"/>
-        <a:defRPr sz="2000" kern="1200">
+        <a:defRPr sz="1253" kern="1200">
           <a:solidFill>
             <a:schemeClr val="tx1"/>
           </a:solidFill>
@@ -3112,16 +3792,16 @@
           <a:cs typeface="+mn-cs"/>
         </a:defRPr>
       </a:lvl3pPr>
-      <a:lvl4pPr marL="1600200" indent="-228600" algn="l" defTabSz="914400" rtl="0" eaLnBrk="1" latinLnBrk="0" hangingPunct="1">
+      <a:lvl4pPr marL="1002685" indent="-143241" algn="l" defTabSz="572963" rtl="0" eaLnBrk="1" latinLnBrk="0" hangingPunct="1">
         <a:lnSpc>
           <a:spcPct val="90000"/>
         </a:lnSpc>
         <a:spcBef>
-          <a:spcPts val="500"/>
+          <a:spcPts val="313"/>
         </a:spcBef>
         <a:buFont typeface="Arial" panose="020B0604020202020204" pitchFamily="34" charset="0"/>
         <a:buChar char="•"/>
-        <a:defRPr sz="1800" kern="1200">
+        <a:defRPr sz="1128" kern="1200">
           <a:solidFill>
             <a:schemeClr val="tx1"/>
           </a:solidFill>
@@ -3130,16 +3810,16 @@
           <a:cs typeface="+mn-cs"/>
         </a:defRPr>
       </a:lvl4pPr>
-      <a:lvl5pPr marL="2057400" indent="-228600" algn="l" defTabSz="914400" rtl="0" eaLnBrk="1" latinLnBrk="0" hangingPunct="1">
+      <a:lvl5pPr marL="1289167" indent="-143241" algn="l" defTabSz="572963" rtl="0" eaLnBrk="1" latinLnBrk="0" hangingPunct="1">
         <a:lnSpc>
           <a:spcPct val="90000"/>
         </a:lnSpc>
         <a:spcBef>
-          <a:spcPts val="500"/>
+          <a:spcPts val="313"/>
         </a:spcBef>
         <a:buFont typeface="Arial" panose="020B0604020202020204" pitchFamily="34" charset="0"/>
         <a:buChar char="•"/>
-        <a:defRPr sz="1800" kern="1200">
+        <a:defRPr sz="1128" kern="1200">
           <a:solidFill>
             <a:schemeClr val="tx1"/>
           </a:solidFill>
@@ -3148,16 +3828,16 @@
           <a:cs typeface="+mn-cs"/>
         </a:defRPr>
       </a:lvl5pPr>
-      <a:lvl6pPr marL="2514600" indent="-228600" algn="l" defTabSz="914400" rtl="0" eaLnBrk="1" latinLnBrk="0" hangingPunct="1">
+      <a:lvl6pPr marL="1575648" indent="-143241" algn="l" defTabSz="572963" rtl="0" eaLnBrk="1" latinLnBrk="0" hangingPunct="1">
         <a:lnSpc>
           <a:spcPct val="90000"/>
         </a:lnSpc>
         <a:spcBef>
-          <a:spcPts val="500"/>
+          <a:spcPts val="313"/>
         </a:spcBef>
         <a:buFont typeface="Arial" panose="020B0604020202020204" pitchFamily="34" charset="0"/>
         <a:buChar char="•"/>
-        <a:defRPr sz="1800" kern="1200">
+        <a:defRPr sz="1128" kern="1200">
           <a:solidFill>
             <a:schemeClr val="tx1"/>
           </a:solidFill>
@@ -3166,16 +3846,16 @@
           <a:cs typeface="+mn-cs"/>
         </a:defRPr>
       </a:lvl6pPr>
-      <a:lvl7pPr marL="2971800" indent="-228600" algn="l" defTabSz="914400" rtl="0" eaLnBrk="1" latinLnBrk="0" hangingPunct="1">
+      <a:lvl7pPr marL="1862130" indent="-143241" algn="l" defTabSz="572963" rtl="0" eaLnBrk="1" latinLnBrk="0" hangingPunct="1">
         <a:lnSpc>
           <a:spcPct val="90000"/>
         </a:lnSpc>
         <a:spcBef>
-          <a:spcPts val="500"/>
+          <a:spcPts val="313"/>
         </a:spcBef>
         <a:buFont typeface="Arial" panose="020B0604020202020204" pitchFamily="34" charset="0"/>
         <a:buChar char="•"/>
-        <a:defRPr sz="1800" kern="1200">
+        <a:defRPr sz="1128" kern="1200">
           <a:solidFill>
             <a:schemeClr val="tx1"/>
           </a:solidFill>
@@ -3184,16 +3864,16 @@
           <a:cs typeface="+mn-cs"/>
         </a:defRPr>
       </a:lvl7pPr>
-      <a:lvl8pPr marL="3429000" indent="-228600" algn="l" defTabSz="914400" rtl="0" eaLnBrk="1" latinLnBrk="0" hangingPunct="1">
+      <a:lvl8pPr marL="2148611" indent="-143241" algn="l" defTabSz="572963" rtl="0" eaLnBrk="1" latinLnBrk="0" hangingPunct="1">
         <a:lnSpc>
           <a:spcPct val="90000"/>
         </a:lnSpc>
         <a:spcBef>
-          <a:spcPts val="500"/>
+          <a:spcPts val="313"/>
         </a:spcBef>
         <a:buFont typeface="Arial" panose="020B0604020202020204" pitchFamily="34" charset="0"/>
         <a:buChar char="•"/>
-        <a:defRPr sz="1800" kern="1200">
+        <a:defRPr sz="1128" kern="1200">
           <a:solidFill>
             <a:schemeClr val="tx1"/>
           </a:solidFill>
@@ -3202,16 +3882,16 @@
           <a:cs typeface="+mn-cs"/>
         </a:defRPr>
       </a:lvl8pPr>
-      <a:lvl9pPr marL="3886200" indent="-228600" algn="l" defTabSz="914400" rtl="0" eaLnBrk="1" latinLnBrk="0" hangingPunct="1">
+      <a:lvl9pPr marL="2435093" indent="-143241" algn="l" defTabSz="572963" rtl="0" eaLnBrk="1" latinLnBrk="0" hangingPunct="1">
         <a:lnSpc>
           <a:spcPct val="90000"/>
         </a:lnSpc>
         <a:spcBef>
-          <a:spcPts val="500"/>
+          <a:spcPts val="313"/>
         </a:spcBef>
         <a:buFont typeface="Arial" panose="020B0604020202020204" pitchFamily="34" charset="0"/>
         <a:buChar char="•"/>
-        <a:defRPr sz="1800" kern="1200">
+        <a:defRPr sz="1128" kern="1200">
           <a:solidFill>
             <a:schemeClr val="tx1"/>
           </a:solidFill>
@@ -3225,8 +3905,8 @@
       <a:defPPr>
         <a:defRPr lang="en-US"/>
       </a:defPPr>
-      <a:lvl1pPr marL="0" algn="l" defTabSz="914400" rtl="0" eaLnBrk="1" latinLnBrk="0" hangingPunct="1">
-        <a:defRPr sz="1800" kern="1200">
+      <a:lvl1pPr marL="0" algn="l" defTabSz="572963" rtl="0" eaLnBrk="1" latinLnBrk="0" hangingPunct="1">
+        <a:defRPr sz="1128" kern="1200">
           <a:solidFill>
             <a:schemeClr val="tx1"/>
           </a:solidFill>
@@ -3235,8 +3915,8 @@
           <a:cs typeface="+mn-cs"/>
         </a:defRPr>
       </a:lvl1pPr>
-      <a:lvl2pPr marL="457200" algn="l" defTabSz="914400" rtl="0" eaLnBrk="1" latinLnBrk="0" hangingPunct="1">
-        <a:defRPr sz="1800" kern="1200">
+      <a:lvl2pPr marL="286482" algn="l" defTabSz="572963" rtl="0" eaLnBrk="1" latinLnBrk="0" hangingPunct="1">
+        <a:defRPr sz="1128" kern="1200">
           <a:solidFill>
             <a:schemeClr val="tx1"/>
           </a:solidFill>
@@ -3245,8 +3925,8 @@
           <a:cs typeface="+mn-cs"/>
         </a:defRPr>
       </a:lvl2pPr>
-      <a:lvl3pPr marL="914400" algn="l" defTabSz="914400" rtl="0" eaLnBrk="1" latinLnBrk="0" hangingPunct="1">
-        <a:defRPr sz="1800" kern="1200">
+      <a:lvl3pPr marL="572963" algn="l" defTabSz="572963" rtl="0" eaLnBrk="1" latinLnBrk="0" hangingPunct="1">
+        <a:defRPr sz="1128" kern="1200">
           <a:solidFill>
             <a:schemeClr val="tx1"/>
           </a:solidFill>
@@ -3255,8 +3935,8 @@
           <a:cs typeface="+mn-cs"/>
         </a:defRPr>
       </a:lvl3pPr>
-      <a:lvl4pPr marL="1371600" algn="l" defTabSz="914400" rtl="0" eaLnBrk="1" latinLnBrk="0" hangingPunct="1">
-        <a:defRPr sz="1800" kern="1200">
+      <a:lvl4pPr marL="859445" algn="l" defTabSz="572963" rtl="0" eaLnBrk="1" latinLnBrk="0" hangingPunct="1">
+        <a:defRPr sz="1128" kern="1200">
           <a:solidFill>
             <a:schemeClr val="tx1"/>
           </a:solidFill>
@@ -3265,8 +3945,8 @@
           <a:cs typeface="+mn-cs"/>
         </a:defRPr>
       </a:lvl4pPr>
-      <a:lvl5pPr marL="1828800" algn="l" defTabSz="914400" rtl="0" eaLnBrk="1" latinLnBrk="0" hangingPunct="1">
-        <a:defRPr sz="1800" kern="1200">
+      <a:lvl5pPr marL="1145926" algn="l" defTabSz="572963" rtl="0" eaLnBrk="1" latinLnBrk="0" hangingPunct="1">
+        <a:defRPr sz="1128" kern="1200">
           <a:solidFill>
             <a:schemeClr val="tx1"/>
           </a:solidFill>
@@ -3275,8 +3955,8 @@
           <a:cs typeface="+mn-cs"/>
         </a:defRPr>
       </a:lvl5pPr>
-      <a:lvl6pPr marL="2286000" algn="l" defTabSz="914400" rtl="0" eaLnBrk="1" latinLnBrk="0" hangingPunct="1">
-        <a:defRPr sz="1800" kern="1200">
+      <a:lvl6pPr marL="1432408" algn="l" defTabSz="572963" rtl="0" eaLnBrk="1" latinLnBrk="0" hangingPunct="1">
+        <a:defRPr sz="1128" kern="1200">
           <a:solidFill>
             <a:schemeClr val="tx1"/>
           </a:solidFill>
@@ -3285,8 +3965,8 @@
           <a:cs typeface="+mn-cs"/>
         </a:defRPr>
       </a:lvl6pPr>
-      <a:lvl7pPr marL="2743200" algn="l" defTabSz="914400" rtl="0" eaLnBrk="1" latinLnBrk="0" hangingPunct="1">
-        <a:defRPr sz="1800" kern="1200">
+      <a:lvl7pPr marL="1718889" algn="l" defTabSz="572963" rtl="0" eaLnBrk="1" latinLnBrk="0" hangingPunct="1">
+        <a:defRPr sz="1128" kern="1200">
           <a:solidFill>
             <a:schemeClr val="tx1"/>
           </a:solidFill>
@@ -3295,8 +3975,8 @@
           <a:cs typeface="+mn-cs"/>
         </a:defRPr>
       </a:lvl7pPr>
-      <a:lvl8pPr marL="3200400" algn="l" defTabSz="914400" rtl="0" eaLnBrk="1" latinLnBrk="0" hangingPunct="1">
-        <a:defRPr sz="1800" kern="1200">
+      <a:lvl8pPr marL="2005371" algn="l" defTabSz="572963" rtl="0" eaLnBrk="1" latinLnBrk="0" hangingPunct="1">
+        <a:defRPr sz="1128" kern="1200">
           <a:solidFill>
             <a:schemeClr val="tx1"/>
           </a:solidFill>
@@ -3305,8 +3985,8 @@
           <a:cs typeface="+mn-cs"/>
         </a:defRPr>
       </a:lvl8pPr>
-      <a:lvl9pPr marL="3657600" algn="l" defTabSz="914400" rtl="0" eaLnBrk="1" latinLnBrk="0" hangingPunct="1">
-        <a:defRPr sz="1800" kern="1200">
+      <a:lvl9pPr marL="2291852" algn="l" defTabSz="572963" rtl="0" eaLnBrk="1" latinLnBrk="0" hangingPunct="1">
+        <a:defRPr sz="1128" kern="1200">
           <a:solidFill>
             <a:schemeClr val="tx1"/>
           </a:solidFill>
@@ -3339,10 +4019,10 @@
       </p:grpSpPr>
       <p:grpSp>
         <p:nvGrpSpPr>
-          <p:cNvPr id="54" name="Group 53">
+          <p:cNvPr id="70" name="Group 69">
             <a:extLst>
               <a:ext uri="{FF2B5EF4-FFF2-40B4-BE49-F238E27FC236}">
-                <a16:creationId xmlns:a16="http://schemas.microsoft.com/office/drawing/2014/main" id="{F63EB59B-5179-D54F-9453-40CE530D9D79}"/>
+                <a16:creationId xmlns:a16="http://schemas.microsoft.com/office/drawing/2014/main" id="{2CC2D490-FB9A-814D-9B02-7A48780F9355}"/>
               </a:ext>
             </a:extLst>
           </p:cNvPr>
@@ -3359,10 +4039,10 @@
         </p:grpSpPr>
         <p:pic>
           <p:nvPicPr>
-            <p:cNvPr id="3" name="Picture 2" descr="A close up of a logo&#10;&#10;Description automatically generated">
+            <p:cNvPr id="71" name="Picture 70" descr="A close up of a logo&#10;&#10;Description automatically generated">
               <a:extLst>
                 <a:ext uri="{FF2B5EF4-FFF2-40B4-BE49-F238E27FC236}">
-                  <a16:creationId xmlns:a16="http://schemas.microsoft.com/office/drawing/2014/main" id="{9DB29891-2710-E040-86A8-BDEE5243C8A6}"/>
+                  <a16:creationId xmlns:a16="http://schemas.microsoft.com/office/drawing/2014/main" id="{EF86D33E-52E6-5943-AF52-B965E43154F2}"/>
                 </a:ext>
               </a:extLst>
             </p:cNvPr>
@@ -3389,10 +4069,10 @@
         </p:pic>
         <p:grpSp>
           <p:nvGrpSpPr>
-            <p:cNvPr id="32" name="Group 31">
+            <p:cNvPr id="72" name="Group 71">
               <a:extLst>
                 <a:ext uri="{FF2B5EF4-FFF2-40B4-BE49-F238E27FC236}">
-                  <a16:creationId xmlns:a16="http://schemas.microsoft.com/office/drawing/2014/main" id="{73AF3747-2FEE-0E46-A41F-691F3B157DC0}"/>
+                  <a16:creationId xmlns:a16="http://schemas.microsoft.com/office/drawing/2014/main" id="{3AF85463-1FE1-534D-8189-16C044F23930}"/>
                 </a:ext>
               </a:extLst>
             </p:cNvPr>
@@ -3409,10 +4089,10 @@
           </p:grpSpPr>
           <p:grpSp>
             <p:nvGrpSpPr>
-              <p:cNvPr id="16" name="Group 15">
+              <p:cNvPr id="89" name="Group 88">
                 <a:extLst>
                   <a:ext uri="{FF2B5EF4-FFF2-40B4-BE49-F238E27FC236}">
-                    <a16:creationId xmlns:a16="http://schemas.microsoft.com/office/drawing/2014/main" id="{A466165F-47D3-1B4D-A913-B9BF30F80048}"/>
+                    <a16:creationId xmlns:a16="http://schemas.microsoft.com/office/drawing/2014/main" id="{33365247-A6DB-0147-9A01-F3B8A8F2051D}"/>
                   </a:ext>
                 </a:extLst>
               </p:cNvPr>
@@ -3429,10 +4109,10 @@
             </p:grpSpPr>
             <p:sp>
               <p:nvSpPr>
-                <p:cNvPr id="15" name="Rectangle 14">
+                <p:cNvPr id="96" name="Rectangle 95">
                   <a:extLst>
                     <a:ext uri="{FF2B5EF4-FFF2-40B4-BE49-F238E27FC236}">
-                      <a16:creationId xmlns:a16="http://schemas.microsoft.com/office/drawing/2014/main" id="{8571AE90-5EAF-E94F-BEE6-2D64BD8B5DB7}"/>
+                      <a16:creationId xmlns:a16="http://schemas.microsoft.com/office/drawing/2014/main" id="{B172B6DD-580D-B44E-912E-7001D0B00D77}"/>
                     </a:ext>
                   </a:extLst>
                 </p:cNvPr>
@@ -3486,10 +4166,10 @@
             </p:sp>
             <p:sp>
               <p:nvSpPr>
-                <p:cNvPr id="14" name="TextBox 13">
+                <p:cNvPr id="97" name="TextBox 96">
                   <a:extLst>
                     <a:ext uri="{FF2B5EF4-FFF2-40B4-BE49-F238E27FC236}">
-                      <a16:creationId xmlns:a16="http://schemas.microsoft.com/office/drawing/2014/main" id="{5BC300F2-E2A2-E74C-9E4E-EBE52316215F}"/>
+                      <a16:creationId xmlns:a16="http://schemas.microsoft.com/office/drawing/2014/main" id="{4D04D4D6-C9CE-B348-B1E2-A1C5B3380ED1}"/>
                     </a:ext>
                   </a:extLst>
                 </p:cNvPr>
@@ -3524,10 +4204,10 @@
           </p:grpSp>
           <p:grpSp>
             <p:nvGrpSpPr>
-              <p:cNvPr id="17" name="Group 16">
+              <p:cNvPr id="90" name="Group 89">
                 <a:extLst>
                   <a:ext uri="{FF2B5EF4-FFF2-40B4-BE49-F238E27FC236}">
-                    <a16:creationId xmlns:a16="http://schemas.microsoft.com/office/drawing/2014/main" id="{95D22B9C-3935-904E-96C9-E5CDE9BA38FC}"/>
+                    <a16:creationId xmlns:a16="http://schemas.microsoft.com/office/drawing/2014/main" id="{17A89CFF-58F7-E44E-8BFC-BDC90C22A3D5}"/>
                   </a:ext>
                 </a:extLst>
               </p:cNvPr>
@@ -3544,10 +4224,10 @@
             </p:grpSpPr>
             <p:sp>
               <p:nvSpPr>
-                <p:cNvPr id="18" name="Rectangle 17">
+                <p:cNvPr id="94" name="Rectangle 93">
                   <a:extLst>
                     <a:ext uri="{FF2B5EF4-FFF2-40B4-BE49-F238E27FC236}">
-                      <a16:creationId xmlns:a16="http://schemas.microsoft.com/office/drawing/2014/main" id="{E4129BC9-D03F-4F43-BDFA-2BEC2E992274}"/>
+                      <a16:creationId xmlns:a16="http://schemas.microsoft.com/office/drawing/2014/main" id="{CD93ED97-A20A-8249-B2FA-978CA34F6197}"/>
                     </a:ext>
                   </a:extLst>
                 </p:cNvPr>
@@ -3601,10 +4281,10 @@
             </p:sp>
             <p:sp>
               <p:nvSpPr>
-                <p:cNvPr id="19" name="TextBox 18">
+                <p:cNvPr id="95" name="TextBox 94">
                   <a:extLst>
                     <a:ext uri="{FF2B5EF4-FFF2-40B4-BE49-F238E27FC236}">
-                      <a16:creationId xmlns:a16="http://schemas.microsoft.com/office/drawing/2014/main" id="{68295819-7C05-B246-9D4A-C3417ECB9F78}"/>
+                      <a16:creationId xmlns:a16="http://schemas.microsoft.com/office/drawing/2014/main" id="{6C92275D-4293-AD42-8DC7-175C8A9017F1}"/>
                     </a:ext>
                   </a:extLst>
                 </p:cNvPr>
@@ -3639,10 +4319,10 @@
           </p:grpSp>
           <p:grpSp>
             <p:nvGrpSpPr>
-              <p:cNvPr id="20" name="Group 19">
+              <p:cNvPr id="91" name="Group 90">
                 <a:extLst>
                   <a:ext uri="{FF2B5EF4-FFF2-40B4-BE49-F238E27FC236}">
-                    <a16:creationId xmlns:a16="http://schemas.microsoft.com/office/drawing/2014/main" id="{B584272C-808E-3A47-BF36-32771A31CAE0}"/>
+                    <a16:creationId xmlns:a16="http://schemas.microsoft.com/office/drawing/2014/main" id="{26B26385-F39D-9E45-AAC1-0DAF15418F32}"/>
                   </a:ext>
                 </a:extLst>
               </p:cNvPr>
@@ -3659,10 +4339,10 @@
             </p:grpSpPr>
             <p:sp>
               <p:nvSpPr>
-                <p:cNvPr id="21" name="Rectangle 20">
+                <p:cNvPr id="92" name="Rectangle 91">
                   <a:extLst>
                     <a:ext uri="{FF2B5EF4-FFF2-40B4-BE49-F238E27FC236}">
-                      <a16:creationId xmlns:a16="http://schemas.microsoft.com/office/drawing/2014/main" id="{4A41C815-B779-C046-ABAF-8BE7CA869C79}"/>
+                      <a16:creationId xmlns:a16="http://schemas.microsoft.com/office/drawing/2014/main" id="{428DB490-98AC-024C-8BE0-99569C9765B9}"/>
                     </a:ext>
                   </a:extLst>
                 </p:cNvPr>
@@ -3716,10 +4396,10 @@
             </p:sp>
             <p:sp>
               <p:nvSpPr>
-                <p:cNvPr id="22" name="TextBox 21">
+                <p:cNvPr id="93" name="TextBox 92">
                   <a:extLst>
                     <a:ext uri="{FF2B5EF4-FFF2-40B4-BE49-F238E27FC236}">
-                      <a16:creationId xmlns:a16="http://schemas.microsoft.com/office/drawing/2014/main" id="{ED772C2D-2AD8-8748-AB74-F4896D8B7C82}"/>
+                      <a16:creationId xmlns:a16="http://schemas.microsoft.com/office/drawing/2014/main" id="{332D57CA-487C-714F-AFDF-381FF9F187B8}"/>
                     </a:ext>
                   </a:extLst>
                 </p:cNvPr>
@@ -3756,10 +4436,10 @@
         </p:grpSp>
         <p:sp>
           <p:nvSpPr>
-            <p:cNvPr id="24" name="TextBox 23">
+            <p:cNvPr id="73" name="TextBox 72">
               <a:extLst>
                 <a:ext uri="{FF2B5EF4-FFF2-40B4-BE49-F238E27FC236}">
-                  <a16:creationId xmlns:a16="http://schemas.microsoft.com/office/drawing/2014/main" id="{3C695BBA-2EC7-BF4F-87AD-BBCD46BA4862}"/>
+                  <a16:creationId xmlns:a16="http://schemas.microsoft.com/office/drawing/2014/main" id="{CE940DD5-530C-4549-9588-D7247D0948BB}"/>
                 </a:ext>
               </a:extLst>
             </p:cNvPr>
@@ -3792,10 +4472,10 @@
         </p:sp>
         <p:sp>
           <p:nvSpPr>
-            <p:cNvPr id="25" name="TextBox 24">
+            <p:cNvPr id="74" name="TextBox 73">
               <a:extLst>
                 <a:ext uri="{FF2B5EF4-FFF2-40B4-BE49-F238E27FC236}">
-                  <a16:creationId xmlns:a16="http://schemas.microsoft.com/office/drawing/2014/main" id="{6B66B998-2304-5743-BA19-0DD6E0305591}"/>
+                  <a16:creationId xmlns:a16="http://schemas.microsoft.com/office/drawing/2014/main" id="{A5032028-B4E4-3447-88E9-AB66851BFD6D}"/>
                 </a:ext>
               </a:extLst>
             </p:cNvPr>
@@ -3828,10 +4508,10 @@
         </p:sp>
         <p:sp>
           <p:nvSpPr>
-            <p:cNvPr id="33" name="TextBox 32">
+            <p:cNvPr id="75" name="TextBox 74">
               <a:extLst>
                 <a:ext uri="{FF2B5EF4-FFF2-40B4-BE49-F238E27FC236}">
-                  <a16:creationId xmlns:a16="http://schemas.microsoft.com/office/drawing/2014/main" id="{EBA48315-3CBE-6F45-909C-99B48B65748C}"/>
+                  <a16:creationId xmlns:a16="http://schemas.microsoft.com/office/drawing/2014/main" id="{4D079CCF-E585-AB47-B069-7F37B5843E16}"/>
                 </a:ext>
               </a:extLst>
             </p:cNvPr>
@@ -3863,10 +4543,10 @@
         </p:sp>
         <p:sp>
           <p:nvSpPr>
-            <p:cNvPr id="34" name="TextBox 33">
+            <p:cNvPr id="76" name="TextBox 75">
               <a:extLst>
                 <a:ext uri="{FF2B5EF4-FFF2-40B4-BE49-F238E27FC236}">
-                  <a16:creationId xmlns:a16="http://schemas.microsoft.com/office/drawing/2014/main" id="{507EA388-573B-E845-8631-B4812B1687E1}"/>
+                  <a16:creationId xmlns:a16="http://schemas.microsoft.com/office/drawing/2014/main" id="{D44EF819-353F-B84C-885D-4B85EDDE003C}"/>
                 </a:ext>
               </a:extLst>
             </p:cNvPr>
@@ -3898,10 +4578,10 @@
         </p:sp>
         <p:sp>
           <p:nvSpPr>
-            <p:cNvPr id="35" name="TextBox 34">
+            <p:cNvPr id="77" name="TextBox 76">
               <a:extLst>
                 <a:ext uri="{FF2B5EF4-FFF2-40B4-BE49-F238E27FC236}">
-                  <a16:creationId xmlns:a16="http://schemas.microsoft.com/office/drawing/2014/main" id="{5BFC600C-8C94-E945-A745-6E67074998A7}"/>
+                  <a16:creationId xmlns:a16="http://schemas.microsoft.com/office/drawing/2014/main" id="{8AC39CD9-1319-654B-A20E-2E8745F3CC4A}"/>
                 </a:ext>
               </a:extLst>
             </p:cNvPr>
@@ -3934,10 +4614,10 @@
         </p:sp>
         <p:sp>
           <p:nvSpPr>
-            <p:cNvPr id="36" name="TextBox 35">
+            <p:cNvPr id="78" name="TextBox 77">
               <a:extLst>
                 <a:ext uri="{FF2B5EF4-FFF2-40B4-BE49-F238E27FC236}">
-                  <a16:creationId xmlns:a16="http://schemas.microsoft.com/office/drawing/2014/main" id="{2BAB72F2-0CE4-7244-9682-402A0C7B4D50}"/>
+                  <a16:creationId xmlns:a16="http://schemas.microsoft.com/office/drawing/2014/main" id="{4E42B301-6280-2840-A969-CDC50E4512BA}"/>
                 </a:ext>
               </a:extLst>
             </p:cNvPr>
@@ -3970,10 +4650,10 @@
         </p:sp>
         <p:pic>
           <p:nvPicPr>
-            <p:cNvPr id="4" name="Picture 3" descr="A picture containing indoor, object, laptop, green&#10;&#10;Description automatically generated">
+            <p:cNvPr id="79" name="Picture 78" descr="A picture containing indoor, object, laptop, green&#10;&#10;Description automatically generated">
               <a:extLst>
                 <a:ext uri="{FF2B5EF4-FFF2-40B4-BE49-F238E27FC236}">
-                  <a16:creationId xmlns:a16="http://schemas.microsoft.com/office/drawing/2014/main" id="{564DD75B-27F7-1E46-AFB3-2C9B59FDF3FB}"/>
+                  <a16:creationId xmlns:a16="http://schemas.microsoft.com/office/drawing/2014/main" id="{1D6D2E8E-BF3E-194F-AD2B-180F8CB28C29}"/>
                 </a:ext>
               </a:extLst>
             </p:cNvPr>
@@ -4012,10 +4692,10 @@
         </p:pic>
         <p:pic>
           <p:nvPicPr>
-            <p:cNvPr id="6" name="Picture 5" descr="A picture containing food, white, flower&#10;&#10;Description automatically generated">
+            <p:cNvPr id="80" name="Picture 79" descr="A picture containing food, white, flower&#10;&#10;Description automatically generated">
               <a:extLst>
                 <a:ext uri="{FF2B5EF4-FFF2-40B4-BE49-F238E27FC236}">
-                  <a16:creationId xmlns:a16="http://schemas.microsoft.com/office/drawing/2014/main" id="{FF0309D5-238A-4942-B987-FB98DDBABB4F}"/>
+                  <a16:creationId xmlns:a16="http://schemas.microsoft.com/office/drawing/2014/main" id="{9A270CFE-F746-5F4A-A95A-550B74F2B4D2}"/>
                 </a:ext>
               </a:extLst>
             </p:cNvPr>
@@ -4054,10 +4734,10 @@
         </p:pic>
         <p:sp>
           <p:nvSpPr>
-            <p:cNvPr id="29" name="TextBox 28">
+            <p:cNvPr id="81" name="TextBox 80">
               <a:extLst>
                 <a:ext uri="{FF2B5EF4-FFF2-40B4-BE49-F238E27FC236}">
-                  <a16:creationId xmlns:a16="http://schemas.microsoft.com/office/drawing/2014/main" id="{6E3A636D-E9F1-EC4F-940D-E34D5E225D0E}"/>
+                  <a16:creationId xmlns:a16="http://schemas.microsoft.com/office/drawing/2014/main" id="{0959EFE3-8476-134E-9676-BF5E8FB88C44}"/>
                 </a:ext>
               </a:extLst>
             </p:cNvPr>
@@ -4090,10 +4770,10 @@
         </p:sp>
         <p:pic>
           <p:nvPicPr>
-            <p:cNvPr id="8" name="Picture 7" descr="A picture containing food&#10;&#10;Description automatically generated">
+            <p:cNvPr id="82" name="Picture 81" descr="A picture containing food&#10;&#10;Description automatically generated">
               <a:extLst>
                 <a:ext uri="{FF2B5EF4-FFF2-40B4-BE49-F238E27FC236}">
-                  <a16:creationId xmlns:a16="http://schemas.microsoft.com/office/drawing/2014/main" id="{87ECCEDD-9C34-AC48-8495-15F0D3E388ED}"/>
+                  <a16:creationId xmlns:a16="http://schemas.microsoft.com/office/drawing/2014/main" id="{9003552E-E384-1440-B8AF-568BBAB2497D}"/>
                 </a:ext>
               </a:extLst>
             </p:cNvPr>
@@ -4132,10 +4812,10 @@
         </p:pic>
         <p:pic>
           <p:nvPicPr>
-            <p:cNvPr id="31" name="Picture 30" descr="A picture containing green, indoor, light, laptop&#10;&#10;Description automatically generated">
+            <p:cNvPr id="83" name="Picture 82" descr="A picture containing green, indoor, light, laptop&#10;&#10;Description automatically generated">
               <a:extLst>
                 <a:ext uri="{FF2B5EF4-FFF2-40B4-BE49-F238E27FC236}">
-                  <a16:creationId xmlns:a16="http://schemas.microsoft.com/office/drawing/2014/main" id="{4E6EAA59-5488-E349-8CC7-365DD0E126F3}"/>
+                  <a16:creationId xmlns:a16="http://schemas.microsoft.com/office/drawing/2014/main" id="{4FCD2AAA-FC84-7F4C-B276-41720EECD003}"/>
                 </a:ext>
               </a:extLst>
             </p:cNvPr>
@@ -4174,10 +4854,10 @@
         </p:pic>
         <p:pic>
           <p:nvPicPr>
-            <p:cNvPr id="38" name="Picture 37" descr="A close up of a logo&#10;&#10;Description automatically generated">
+            <p:cNvPr id="84" name="Picture 83" descr="A close up of a logo&#10;&#10;Description automatically generated">
               <a:extLst>
                 <a:ext uri="{FF2B5EF4-FFF2-40B4-BE49-F238E27FC236}">
-                  <a16:creationId xmlns:a16="http://schemas.microsoft.com/office/drawing/2014/main" id="{033100BD-6BF1-4742-AA91-63D8CD3EA381}"/>
+                  <a16:creationId xmlns:a16="http://schemas.microsoft.com/office/drawing/2014/main" id="{0C918422-FE28-004C-B24A-F72883A33784}"/>
                 </a:ext>
               </a:extLst>
             </p:cNvPr>
@@ -4216,10 +4896,10 @@
         </p:pic>
         <p:pic>
           <p:nvPicPr>
-            <p:cNvPr id="44" name="Picture 43" descr="A picture containing outdoor, green, sitting, apple&#10;&#10;Description automatically generated">
+            <p:cNvPr id="85" name="Picture 84" descr="A picture containing outdoor, green, sitting, apple&#10;&#10;Description automatically generated">
               <a:extLst>
                 <a:ext uri="{FF2B5EF4-FFF2-40B4-BE49-F238E27FC236}">
-                  <a16:creationId xmlns:a16="http://schemas.microsoft.com/office/drawing/2014/main" id="{86A775EF-CFAC-E443-8497-AFF6D668E1A0}"/>
+                  <a16:creationId xmlns:a16="http://schemas.microsoft.com/office/drawing/2014/main" id="{BF7907FB-5D83-BA4E-9587-ACA9CF1158D4}"/>
                 </a:ext>
               </a:extLst>
             </p:cNvPr>
@@ -4258,10 +4938,10 @@
         </p:pic>
         <p:pic>
           <p:nvPicPr>
-            <p:cNvPr id="46" name="Picture 45" descr="A picture containing outdoor, grass, apple, sitting&#10;&#10;Description automatically generated">
+            <p:cNvPr id="86" name="Picture 85" descr="A picture containing outdoor, grass, apple, sitting&#10;&#10;Description automatically generated">
               <a:extLst>
                 <a:ext uri="{FF2B5EF4-FFF2-40B4-BE49-F238E27FC236}">
-                  <a16:creationId xmlns:a16="http://schemas.microsoft.com/office/drawing/2014/main" id="{43B1BCF8-FADF-8040-AC00-DDF8A85DC10F}"/>
+                  <a16:creationId xmlns:a16="http://schemas.microsoft.com/office/drawing/2014/main" id="{D937654F-E457-EF4C-9153-E51B1B75B78D}"/>
                 </a:ext>
               </a:extLst>
             </p:cNvPr>
@@ -4300,10 +4980,10 @@
         </p:pic>
         <p:sp>
           <p:nvSpPr>
-            <p:cNvPr id="47" name="TextBox 46">
+            <p:cNvPr id="87" name="TextBox 86">
               <a:extLst>
                 <a:ext uri="{FF2B5EF4-FFF2-40B4-BE49-F238E27FC236}">
-                  <a16:creationId xmlns:a16="http://schemas.microsoft.com/office/drawing/2014/main" id="{D15B1F03-6806-CA4B-ADB1-D7E221F32981}"/>
+                  <a16:creationId xmlns:a16="http://schemas.microsoft.com/office/drawing/2014/main" id="{AAF567C8-666B-DA45-A072-FF6E6253DCF3}"/>
                 </a:ext>
               </a:extLst>
             </p:cNvPr>
@@ -4336,10 +5016,10 @@
         </p:sp>
         <p:pic>
           <p:nvPicPr>
-            <p:cNvPr id="53" name="Picture 52" descr="A picture containing object, indoor, sitting, laptop&#10;&#10;Description automatically generated">
+            <p:cNvPr id="88" name="Picture 87" descr="A picture containing object, indoor, sitting, laptop&#10;&#10;Description automatically generated">
               <a:extLst>
                 <a:ext uri="{FF2B5EF4-FFF2-40B4-BE49-F238E27FC236}">
-                  <a16:creationId xmlns:a16="http://schemas.microsoft.com/office/drawing/2014/main" id="{9CB71709-8F32-C942-8825-6023034861DA}"/>
+                  <a16:creationId xmlns:a16="http://schemas.microsoft.com/office/drawing/2014/main" id="{D211E6C9-9674-7D40-BDCE-1BFFDD167F34}"/>
                 </a:ext>
               </a:extLst>
             </p:cNvPr>
@@ -4393,7 +5073,7 @@
 <file path=ppt/theme/theme1.xml><?xml version="1.0" encoding="utf-8"?>
 <a:theme xmlns:a="http://schemas.openxmlformats.org/drawingml/2006/main" name="Office Theme">
   <a:themeElements>
-    <a:clrScheme name="Office">
+    <a:clrScheme name="Office Theme">
       <a:dk1>
         <a:sysClr val="windowText" lastClr="000000"/>
       </a:dk1>
@@ -4431,7 +5111,7 @@
         <a:srgbClr val="954F72"/>
       </a:folHlink>
     </a:clrScheme>
-    <a:fontScheme name="Office">
+    <a:fontScheme name="Office Theme">
       <a:majorFont>
         <a:latin typeface="Calibri Light" panose="020F0302020204030204"/>
         <a:ea typeface=""/>
@@ -4466,23 +5146,6 @@
         <a:font script="Viet" typeface="Times New Roman"/>
         <a:font script="Uigh" typeface="Microsoft Uighur"/>
         <a:font script="Geor" typeface="Sylfaen"/>
-        <a:font script="Armn" typeface="Arial"/>
-        <a:font script="Bugi" typeface="Leelawadee UI"/>
-        <a:font script="Bopo" typeface="Microsoft JhengHei"/>
-        <a:font script="Java" typeface="Javanese Text"/>
-        <a:font script="Lisu" typeface="Segoe UI"/>
-        <a:font script="Mymr" typeface="Myanmar Text"/>
-        <a:font script="Nkoo" typeface="Ebrima"/>
-        <a:font script="Olck" typeface="Nirmala UI"/>
-        <a:font script="Osma" typeface="Ebrima"/>
-        <a:font script="Phag" typeface="Phagspa"/>
-        <a:font script="Syrn" typeface="Estrangelo Edessa"/>
-        <a:font script="Syrj" typeface="Estrangelo Edessa"/>
-        <a:font script="Syre" typeface="Estrangelo Edessa"/>
-        <a:font script="Sora" typeface="Nirmala UI"/>
-        <a:font script="Tale" typeface="Microsoft Tai Le"/>
-        <a:font script="Talu" typeface="Microsoft New Tai Lue"/>
-        <a:font script="Tfng" typeface="Ebrima"/>
       </a:majorFont>
       <a:minorFont>
         <a:latin typeface="Calibri" panose="020F0502020204030204"/>
@@ -4518,26 +5181,9 @@
         <a:font script="Viet" typeface="Arial"/>
         <a:font script="Uigh" typeface="Microsoft Uighur"/>
         <a:font script="Geor" typeface="Sylfaen"/>
-        <a:font script="Armn" typeface="Arial"/>
-        <a:font script="Bugi" typeface="Leelawadee UI"/>
-        <a:font script="Bopo" typeface="Microsoft JhengHei"/>
-        <a:font script="Java" typeface="Javanese Text"/>
-        <a:font script="Lisu" typeface="Segoe UI"/>
-        <a:font script="Mymr" typeface="Myanmar Text"/>
-        <a:font script="Nkoo" typeface="Ebrima"/>
-        <a:font script="Olck" typeface="Nirmala UI"/>
-        <a:font script="Osma" typeface="Ebrima"/>
-        <a:font script="Phag" typeface="Phagspa"/>
-        <a:font script="Syrn" typeface="Estrangelo Edessa"/>
-        <a:font script="Syrj" typeface="Estrangelo Edessa"/>
-        <a:font script="Syre" typeface="Estrangelo Edessa"/>
-        <a:font script="Sora" typeface="Nirmala UI"/>
-        <a:font script="Tale" typeface="Microsoft Tai Le"/>
-        <a:font script="Talu" typeface="Microsoft New Tai Lue"/>
-        <a:font script="Tfng" typeface="Ebrima"/>
       </a:minorFont>
     </a:fontScheme>
-    <a:fmtScheme name="Office">
+    <a:fmtScheme name="Office Theme">
       <a:fillStyleLst>
         <a:solidFill>
           <a:schemeClr val="phClr"/>

</xml_diff>